<commit_message>
Started work on slides
</commit_message>
<xml_diff>
--- a/2 - Slides/UAV Route Planning Strategies.pptx
+++ b/2 - Slides/UAV Route Planning Strategies.pptx
@@ -5,12 +5,22 @@
     <p:sldMasterId id="2147483660" r:id="rId1"/>
   </p:sldMasterIdLst>
   <p:notesMasterIdLst>
-    <p:notesMasterId r:id="rId5"/>
+    <p:notesMasterId r:id="rId15"/>
   </p:notesMasterIdLst>
   <p:sldIdLst>
     <p:sldId id="256" r:id="rId2"/>
     <p:sldId id="258" r:id="rId3"/>
     <p:sldId id="259" r:id="rId4"/>
+    <p:sldId id="260" r:id="rId5"/>
+    <p:sldId id="261" r:id="rId6"/>
+    <p:sldId id="262" r:id="rId7"/>
+    <p:sldId id="263" r:id="rId8"/>
+    <p:sldId id="264" r:id="rId9"/>
+    <p:sldId id="265" r:id="rId10"/>
+    <p:sldId id="266" r:id="rId11"/>
+    <p:sldId id="267" r:id="rId12"/>
+    <p:sldId id="268" r:id="rId13"/>
+    <p:sldId id="269" r:id="rId14"/>
   </p:sldIdLst>
   <p:sldSz cx="9144000" cy="6858000" type="screen4x3"/>
   <p:notesSz cx="6858000" cy="9144000"/>
@@ -1883,6 +1893,602 @@
 </p:sld>
 </file>
 
+<file path=ppt/slides/slide10.xml><?xml version="1.0" encoding="utf-8"?>
+<p:sld xmlns:a="http://schemas.openxmlformats.org/drawingml/2006/main" xmlns:r="http://schemas.openxmlformats.org/officeDocument/2006/relationships" xmlns:p="http://schemas.openxmlformats.org/presentationml/2006/main">
+  <p:cSld>
+    <p:spTree>
+      <p:nvGrpSpPr>
+        <p:cNvPr id="1" name=""/>
+        <p:cNvGrpSpPr/>
+        <p:nvPr/>
+      </p:nvGrpSpPr>
+      <p:grpSpPr>
+        <a:xfrm>
+          <a:off x="0" y="0"/>
+          <a:ext cx="0" cy="0"/>
+          <a:chOff x="0" y="0"/>
+          <a:chExt cx="0" cy="0"/>
+        </a:xfrm>
+      </p:grpSpPr>
+      <p:sp>
+        <p:nvSpPr>
+          <p:cNvPr id="2" name="Title 1">
+            <a:extLst>
+              <a:ext uri="{FF2B5EF4-FFF2-40B4-BE49-F238E27FC236}">
+                <a16:creationId xmlns:a16="http://schemas.microsoft.com/office/drawing/2014/main" id="{A20241D5-7C6B-45F6-9B01-BE455CD8AD0B}"/>
+              </a:ext>
+            </a:extLst>
+          </p:cNvPr>
+          <p:cNvSpPr>
+            <a:spLocks noGrp="1"/>
+          </p:cNvSpPr>
+          <p:nvPr>
+            <p:ph type="title"/>
+          </p:nvPr>
+        </p:nvSpPr>
+        <p:spPr>
+          <a:xfrm>
+            <a:off x="0" y="26902"/>
+            <a:ext cx="7061507" cy="1114425"/>
+          </a:xfrm>
+        </p:spPr>
+        <p:txBody>
+          <a:bodyPr>
+            <a:normAutofit/>
+          </a:bodyPr>
+          <a:lstStyle/>
+          <a:p>
+            <a:r>
+              <a:rPr lang="en-US" dirty="0">
+                <a:latin typeface="Segoe UI" panose="020B0502040204020203" pitchFamily="34" charset="0"/>
+                <a:cs typeface="Segoe UI" panose="020B0502040204020203" pitchFamily="34" charset="0"/>
+              </a:rPr>
+              <a:t>Military applications</a:t>
+            </a:r>
+          </a:p>
+        </p:txBody>
+      </p:sp>
+      <p:sp>
+        <p:nvSpPr>
+          <p:cNvPr id="4" name="Slide Number Placeholder 3">
+            <a:extLst>
+              <a:ext uri="{FF2B5EF4-FFF2-40B4-BE49-F238E27FC236}">
+                <a16:creationId xmlns:a16="http://schemas.microsoft.com/office/drawing/2014/main" id="{0FD64D78-A03B-45A9-9177-047825E632C0}"/>
+              </a:ext>
+            </a:extLst>
+          </p:cNvPr>
+          <p:cNvSpPr>
+            <a:spLocks noGrp="1"/>
+          </p:cNvSpPr>
+          <p:nvPr>
+            <p:ph type="sldNum" sz="quarter" idx="4"/>
+          </p:nvPr>
+        </p:nvSpPr>
+        <p:spPr>
+          <a:xfrm>
+            <a:off x="6143105" y="6365195"/>
+            <a:ext cx="2841321" cy="365125"/>
+          </a:xfrm>
+        </p:spPr>
+        <p:txBody>
+          <a:bodyPr/>
+          <a:lstStyle/>
+          <a:p>
+            <a:r>
+              <a:rPr lang="en-US" sz="1200" dirty="0">
+                <a:latin typeface="Segoe UI" panose="020B0502040204020203" pitchFamily="34" charset="0"/>
+                <a:cs typeface="Segoe UI" panose="020B0502040204020203" pitchFamily="34" charset="0"/>
+              </a:rPr>
+              <a:t>UAV Route Planning Strategies – 10/13</a:t>
+            </a:r>
+          </a:p>
+        </p:txBody>
+      </p:sp>
+      <p:sp>
+        <p:nvSpPr>
+          <p:cNvPr id="6" name="CasellaDiTesto 5">
+            <a:extLst>
+              <a:ext uri="{FF2B5EF4-FFF2-40B4-BE49-F238E27FC236}">
+                <a16:creationId xmlns:a16="http://schemas.microsoft.com/office/drawing/2014/main" id="{0C3825A1-BC2D-A575-E5DA-F3AAE95E3E9E}"/>
+              </a:ext>
+            </a:extLst>
+          </p:cNvPr>
+          <p:cNvSpPr txBox="1"/>
+          <p:nvPr/>
+        </p:nvSpPr>
+        <p:spPr>
+          <a:xfrm>
+            <a:off x="262647" y="1391055"/>
+            <a:ext cx="8528062" cy="400110"/>
+          </a:xfrm>
+          <a:prstGeom prst="rect">
+            <a:avLst/>
+          </a:prstGeom>
+          <a:noFill/>
+        </p:spPr>
+        <p:txBody>
+          <a:bodyPr wrap="square" rtlCol="0">
+            <a:spAutoFit/>
+          </a:bodyPr>
+          <a:lstStyle/>
+          <a:p>
+            <a:pPr marL="342900" indent="-342900">
+              <a:spcAft>
+                <a:spcPts val="500"/>
+              </a:spcAft>
+              <a:buFont typeface="Arial" panose="020B0604020202020204" pitchFamily="34" charset="0"/>
+              <a:buChar char="•"/>
+            </a:pPr>
+            <a:r>
+              <a:rPr lang="it-IT" sz="2000" dirty="0">
+                <a:latin typeface="Segoe UI" panose="020B0502040204020203" pitchFamily="34" charset="0"/>
+                <a:cs typeface="Segoe UI" panose="020B0502040204020203" pitchFamily="34" charset="0"/>
+              </a:rPr>
+              <a:t>aa</a:t>
+            </a:r>
+          </a:p>
+        </p:txBody>
+      </p:sp>
+    </p:spTree>
+    <p:extLst>
+      <p:ext uri="{BB962C8B-B14F-4D97-AF65-F5344CB8AC3E}">
+        <p14:creationId xmlns:p14="http://schemas.microsoft.com/office/powerpoint/2010/main" val="495620899"/>
+      </p:ext>
+    </p:extLst>
+  </p:cSld>
+  <p:clrMapOvr>
+    <a:masterClrMapping/>
+  </p:clrMapOvr>
+</p:sld>
+</file>
+
+<file path=ppt/slides/slide11.xml><?xml version="1.0" encoding="utf-8"?>
+<p:sld xmlns:a="http://schemas.openxmlformats.org/drawingml/2006/main" xmlns:r="http://schemas.openxmlformats.org/officeDocument/2006/relationships" xmlns:p="http://schemas.openxmlformats.org/presentationml/2006/main">
+  <p:cSld>
+    <p:spTree>
+      <p:nvGrpSpPr>
+        <p:cNvPr id="1" name=""/>
+        <p:cNvGrpSpPr/>
+        <p:nvPr/>
+      </p:nvGrpSpPr>
+      <p:grpSpPr>
+        <a:xfrm>
+          <a:off x="0" y="0"/>
+          <a:ext cx="0" cy="0"/>
+          <a:chOff x="0" y="0"/>
+          <a:chExt cx="0" cy="0"/>
+        </a:xfrm>
+      </p:grpSpPr>
+      <p:sp>
+        <p:nvSpPr>
+          <p:cNvPr id="2" name="Title 1">
+            <a:extLst>
+              <a:ext uri="{FF2B5EF4-FFF2-40B4-BE49-F238E27FC236}">
+                <a16:creationId xmlns:a16="http://schemas.microsoft.com/office/drawing/2014/main" id="{A20241D5-7C6B-45F6-9B01-BE455CD8AD0B}"/>
+              </a:ext>
+            </a:extLst>
+          </p:cNvPr>
+          <p:cNvSpPr>
+            <a:spLocks noGrp="1"/>
+          </p:cNvSpPr>
+          <p:nvPr>
+            <p:ph type="title"/>
+          </p:nvPr>
+        </p:nvSpPr>
+        <p:spPr>
+          <a:xfrm>
+            <a:off x="0" y="26902"/>
+            <a:ext cx="7061507" cy="1114425"/>
+          </a:xfrm>
+        </p:spPr>
+        <p:txBody>
+          <a:bodyPr>
+            <a:normAutofit/>
+          </a:bodyPr>
+          <a:lstStyle/>
+          <a:p>
+            <a:r>
+              <a:rPr lang="en-US" dirty="0">
+                <a:latin typeface="Segoe UI" panose="020B0502040204020203" pitchFamily="34" charset="0"/>
+                <a:cs typeface="Segoe UI" panose="020B0502040204020203" pitchFamily="34" charset="0"/>
+              </a:rPr>
+              <a:t>Comparison of approaches</a:t>
+            </a:r>
+          </a:p>
+        </p:txBody>
+      </p:sp>
+      <p:sp>
+        <p:nvSpPr>
+          <p:cNvPr id="4" name="Slide Number Placeholder 3">
+            <a:extLst>
+              <a:ext uri="{FF2B5EF4-FFF2-40B4-BE49-F238E27FC236}">
+                <a16:creationId xmlns:a16="http://schemas.microsoft.com/office/drawing/2014/main" id="{0FD64D78-A03B-45A9-9177-047825E632C0}"/>
+              </a:ext>
+            </a:extLst>
+          </p:cNvPr>
+          <p:cNvSpPr>
+            <a:spLocks noGrp="1"/>
+          </p:cNvSpPr>
+          <p:nvPr>
+            <p:ph type="sldNum" sz="quarter" idx="4"/>
+          </p:nvPr>
+        </p:nvSpPr>
+        <p:spPr>
+          <a:xfrm>
+            <a:off x="6143105" y="6365195"/>
+            <a:ext cx="2841321" cy="365125"/>
+          </a:xfrm>
+        </p:spPr>
+        <p:txBody>
+          <a:bodyPr/>
+          <a:lstStyle/>
+          <a:p>
+            <a:r>
+              <a:rPr lang="en-US" sz="1200" dirty="0">
+                <a:latin typeface="Segoe UI" panose="020B0502040204020203" pitchFamily="34" charset="0"/>
+                <a:cs typeface="Segoe UI" panose="020B0502040204020203" pitchFamily="34" charset="0"/>
+              </a:rPr>
+              <a:t>UAV Route Planning Strategies – 11/13</a:t>
+            </a:r>
+          </a:p>
+        </p:txBody>
+      </p:sp>
+      <p:sp>
+        <p:nvSpPr>
+          <p:cNvPr id="6" name="CasellaDiTesto 5">
+            <a:extLst>
+              <a:ext uri="{FF2B5EF4-FFF2-40B4-BE49-F238E27FC236}">
+                <a16:creationId xmlns:a16="http://schemas.microsoft.com/office/drawing/2014/main" id="{0C3825A1-BC2D-A575-E5DA-F3AAE95E3E9E}"/>
+              </a:ext>
+            </a:extLst>
+          </p:cNvPr>
+          <p:cNvSpPr txBox="1"/>
+          <p:nvPr/>
+        </p:nvSpPr>
+        <p:spPr>
+          <a:xfrm>
+            <a:off x="262647" y="1391055"/>
+            <a:ext cx="8528062" cy="400110"/>
+          </a:xfrm>
+          <a:prstGeom prst="rect">
+            <a:avLst/>
+          </a:prstGeom>
+          <a:noFill/>
+        </p:spPr>
+        <p:txBody>
+          <a:bodyPr wrap="square" rtlCol="0">
+            <a:spAutoFit/>
+          </a:bodyPr>
+          <a:lstStyle/>
+          <a:p>
+            <a:pPr marL="342900" indent="-342900">
+              <a:spcAft>
+                <a:spcPts val="500"/>
+              </a:spcAft>
+              <a:buFont typeface="Arial" panose="020B0604020202020204" pitchFamily="34" charset="0"/>
+              <a:buChar char="•"/>
+            </a:pPr>
+            <a:r>
+              <a:rPr lang="it-IT" sz="2000" dirty="0">
+                <a:latin typeface="Segoe UI" panose="020B0502040204020203" pitchFamily="34" charset="0"/>
+                <a:cs typeface="Segoe UI" panose="020B0502040204020203" pitchFamily="34" charset="0"/>
+              </a:rPr>
+              <a:t>aa</a:t>
+            </a:r>
+          </a:p>
+        </p:txBody>
+      </p:sp>
+    </p:spTree>
+    <p:extLst>
+      <p:ext uri="{BB962C8B-B14F-4D97-AF65-F5344CB8AC3E}">
+        <p14:creationId xmlns:p14="http://schemas.microsoft.com/office/powerpoint/2010/main" val="2428486781"/>
+      </p:ext>
+    </p:extLst>
+  </p:cSld>
+  <p:clrMapOvr>
+    <a:masterClrMapping/>
+  </p:clrMapOvr>
+</p:sld>
+</file>
+
+<file path=ppt/slides/slide12.xml><?xml version="1.0" encoding="utf-8"?>
+<p:sld xmlns:a="http://schemas.openxmlformats.org/drawingml/2006/main" xmlns:r="http://schemas.openxmlformats.org/officeDocument/2006/relationships" xmlns:p="http://schemas.openxmlformats.org/presentationml/2006/main">
+  <p:cSld>
+    <p:spTree>
+      <p:nvGrpSpPr>
+        <p:cNvPr id="1" name=""/>
+        <p:cNvGrpSpPr/>
+        <p:nvPr/>
+      </p:nvGrpSpPr>
+      <p:grpSpPr>
+        <a:xfrm>
+          <a:off x="0" y="0"/>
+          <a:ext cx="0" cy="0"/>
+          <a:chOff x="0" y="0"/>
+          <a:chExt cx="0" cy="0"/>
+        </a:xfrm>
+      </p:grpSpPr>
+      <p:sp>
+        <p:nvSpPr>
+          <p:cNvPr id="2" name="Title 1">
+            <a:extLst>
+              <a:ext uri="{FF2B5EF4-FFF2-40B4-BE49-F238E27FC236}">
+                <a16:creationId xmlns:a16="http://schemas.microsoft.com/office/drawing/2014/main" id="{A20241D5-7C6B-45F6-9B01-BE455CD8AD0B}"/>
+              </a:ext>
+            </a:extLst>
+          </p:cNvPr>
+          <p:cNvSpPr>
+            <a:spLocks noGrp="1"/>
+          </p:cNvSpPr>
+          <p:nvPr>
+            <p:ph type="title"/>
+          </p:nvPr>
+        </p:nvSpPr>
+        <p:spPr>
+          <a:xfrm>
+            <a:off x="0" y="26902"/>
+            <a:ext cx="7061507" cy="1114425"/>
+          </a:xfrm>
+        </p:spPr>
+        <p:txBody>
+          <a:bodyPr>
+            <a:noAutofit/>
+          </a:bodyPr>
+          <a:lstStyle/>
+          <a:p>
+            <a:r>
+              <a:rPr lang="en-US" sz="2800" dirty="0">
+                <a:latin typeface="Segoe UI" panose="020B0502040204020203" pitchFamily="34" charset="0"/>
+                <a:cs typeface="Segoe UI" panose="020B0502040204020203" pitchFamily="34" charset="0"/>
+              </a:rPr>
+              <a:t>Future challenges and research directions</a:t>
+            </a:r>
+          </a:p>
+        </p:txBody>
+      </p:sp>
+      <p:sp>
+        <p:nvSpPr>
+          <p:cNvPr id="4" name="Slide Number Placeholder 3">
+            <a:extLst>
+              <a:ext uri="{FF2B5EF4-FFF2-40B4-BE49-F238E27FC236}">
+                <a16:creationId xmlns:a16="http://schemas.microsoft.com/office/drawing/2014/main" id="{0FD64D78-A03B-45A9-9177-047825E632C0}"/>
+              </a:ext>
+            </a:extLst>
+          </p:cNvPr>
+          <p:cNvSpPr>
+            <a:spLocks noGrp="1"/>
+          </p:cNvSpPr>
+          <p:nvPr>
+            <p:ph type="sldNum" sz="quarter" idx="4"/>
+          </p:nvPr>
+        </p:nvSpPr>
+        <p:spPr>
+          <a:xfrm>
+            <a:off x="6143105" y="6365195"/>
+            <a:ext cx="2841321" cy="365125"/>
+          </a:xfrm>
+        </p:spPr>
+        <p:txBody>
+          <a:bodyPr/>
+          <a:lstStyle/>
+          <a:p>
+            <a:r>
+              <a:rPr lang="en-US" sz="1200" dirty="0">
+                <a:latin typeface="Segoe UI" panose="020B0502040204020203" pitchFamily="34" charset="0"/>
+                <a:cs typeface="Segoe UI" panose="020B0502040204020203" pitchFamily="34" charset="0"/>
+              </a:rPr>
+              <a:t>UAV Route Planning Strategies – 12/13</a:t>
+            </a:r>
+          </a:p>
+        </p:txBody>
+      </p:sp>
+      <p:sp>
+        <p:nvSpPr>
+          <p:cNvPr id="6" name="CasellaDiTesto 5">
+            <a:extLst>
+              <a:ext uri="{FF2B5EF4-FFF2-40B4-BE49-F238E27FC236}">
+                <a16:creationId xmlns:a16="http://schemas.microsoft.com/office/drawing/2014/main" id="{0C3825A1-BC2D-A575-E5DA-F3AAE95E3E9E}"/>
+              </a:ext>
+            </a:extLst>
+          </p:cNvPr>
+          <p:cNvSpPr txBox="1"/>
+          <p:nvPr/>
+        </p:nvSpPr>
+        <p:spPr>
+          <a:xfrm>
+            <a:off x="262647" y="1391055"/>
+            <a:ext cx="8528062" cy="400110"/>
+          </a:xfrm>
+          <a:prstGeom prst="rect">
+            <a:avLst/>
+          </a:prstGeom>
+          <a:noFill/>
+        </p:spPr>
+        <p:txBody>
+          <a:bodyPr wrap="square" rtlCol="0">
+            <a:spAutoFit/>
+          </a:bodyPr>
+          <a:lstStyle/>
+          <a:p>
+            <a:pPr marL="342900" indent="-342900">
+              <a:spcAft>
+                <a:spcPts val="500"/>
+              </a:spcAft>
+              <a:buFont typeface="Arial" panose="020B0604020202020204" pitchFamily="34" charset="0"/>
+              <a:buChar char="•"/>
+            </a:pPr>
+            <a:r>
+              <a:rPr lang="it-IT" sz="2000" dirty="0">
+                <a:latin typeface="Segoe UI" panose="020B0502040204020203" pitchFamily="34" charset="0"/>
+                <a:cs typeface="Segoe UI" panose="020B0502040204020203" pitchFamily="34" charset="0"/>
+              </a:rPr>
+              <a:t>aa</a:t>
+            </a:r>
+          </a:p>
+        </p:txBody>
+      </p:sp>
+    </p:spTree>
+    <p:extLst>
+      <p:ext uri="{BB962C8B-B14F-4D97-AF65-F5344CB8AC3E}">
+        <p14:creationId xmlns:p14="http://schemas.microsoft.com/office/powerpoint/2010/main" val="1946740304"/>
+      </p:ext>
+    </p:extLst>
+  </p:cSld>
+  <p:clrMapOvr>
+    <a:masterClrMapping/>
+  </p:clrMapOvr>
+</p:sld>
+</file>
+
+<file path=ppt/slides/slide13.xml><?xml version="1.0" encoding="utf-8"?>
+<p:sld xmlns:a="http://schemas.openxmlformats.org/drawingml/2006/main" xmlns:r="http://schemas.openxmlformats.org/officeDocument/2006/relationships" xmlns:p="http://schemas.openxmlformats.org/presentationml/2006/main">
+  <p:cSld>
+    <p:spTree>
+      <p:nvGrpSpPr>
+        <p:cNvPr id="1" name=""/>
+        <p:cNvGrpSpPr/>
+        <p:nvPr/>
+      </p:nvGrpSpPr>
+      <p:grpSpPr>
+        <a:xfrm>
+          <a:off x="0" y="0"/>
+          <a:ext cx="0" cy="0"/>
+          <a:chOff x="0" y="0"/>
+          <a:chExt cx="0" cy="0"/>
+        </a:xfrm>
+      </p:grpSpPr>
+      <p:sp>
+        <p:nvSpPr>
+          <p:cNvPr id="2" name="Title 1">
+            <a:extLst>
+              <a:ext uri="{FF2B5EF4-FFF2-40B4-BE49-F238E27FC236}">
+                <a16:creationId xmlns:a16="http://schemas.microsoft.com/office/drawing/2014/main" id="{A20241D5-7C6B-45F6-9B01-BE455CD8AD0B}"/>
+              </a:ext>
+            </a:extLst>
+          </p:cNvPr>
+          <p:cNvSpPr>
+            <a:spLocks noGrp="1"/>
+          </p:cNvSpPr>
+          <p:nvPr>
+            <p:ph type="title"/>
+          </p:nvPr>
+        </p:nvSpPr>
+        <p:spPr>
+          <a:xfrm>
+            <a:off x="0" y="26902"/>
+            <a:ext cx="7061507" cy="1114425"/>
+          </a:xfrm>
+        </p:spPr>
+        <p:txBody>
+          <a:bodyPr>
+            <a:noAutofit/>
+          </a:bodyPr>
+          <a:lstStyle/>
+          <a:p>
+            <a:r>
+              <a:rPr lang="en-US" dirty="0">
+                <a:latin typeface="Segoe UI" panose="020B0502040204020203" pitchFamily="34" charset="0"/>
+                <a:cs typeface="Segoe UI" panose="020B0502040204020203" pitchFamily="34" charset="0"/>
+              </a:rPr>
+              <a:t>Conclusions</a:t>
+            </a:r>
+          </a:p>
+        </p:txBody>
+      </p:sp>
+      <p:sp>
+        <p:nvSpPr>
+          <p:cNvPr id="4" name="Slide Number Placeholder 3">
+            <a:extLst>
+              <a:ext uri="{FF2B5EF4-FFF2-40B4-BE49-F238E27FC236}">
+                <a16:creationId xmlns:a16="http://schemas.microsoft.com/office/drawing/2014/main" id="{0FD64D78-A03B-45A9-9177-047825E632C0}"/>
+              </a:ext>
+            </a:extLst>
+          </p:cNvPr>
+          <p:cNvSpPr>
+            <a:spLocks noGrp="1"/>
+          </p:cNvSpPr>
+          <p:nvPr>
+            <p:ph type="sldNum" sz="quarter" idx="4"/>
+          </p:nvPr>
+        </p:nvSpPr>
+        <p:spPr>
+          <a:xfrm>
+            <a:off x="6143105" y="6365195"/>
+            <a:ext cx="2841321" cy="365125"/>
+          </a:xfrm>
+        </p:spPr>
+        <p:txBody>
+          <a:bodyPr/>
+          <a:lstStyle/>
+          <a:p>
+            <a:r>
+              <a:rPr lang="en-US" sz="1200" dirty="0">
+                <a:latin typeface="Segoe UI" panose="020B0502040204020203" pitchFamily="34" charset="0"/>
+                <a:cs typeface="Segoe UI" panose="020B0502040204020203" pitchFamily="34" charset="0"/>
+              </a:rPr>
+              <a:t>UAV Route Planning Strategies – 13/13</a:t>
+            </a:r>
+          </a:p>
+        </p:txBody>
+      </p:sp>
+      <p:sp>
+        <p:nvSpPr>
+          <p:cNvPr id="6" name="CasellaDiTesto 5">
+            <a:extLst>
+              <a:ext uri="{FF2B5EF4-FFF2-40B4-BE49-F238E27FC236}">
+                <a16:creationId xmlns:a16="http://schemas.microsoft.com/office/drawing/2014/main" id="{0C3825A1-BC2D-A575-E5DA-F3AAE95E3E9E}"/>
+              </a:ext>
+            </a:extLst>
+          </p:cNvPr>
+          <p:cNvSpPr txBox="1"/>
+          <p:nvPr/>
+        </p:nvSpPr>
+        <p:spPr>
+          <a:xfrm>
+            <a:off x="262647" y="1391055"/>
+            <a:ext cx="8528062" cy="400110"/>
+          </a:xfrm>
+          <a:prstGeom prst="rect">
+            <a:avLst/>
+          </a:prstGeom>
+          <a:noFill/>
+        </p:spPr>
+        <p:txBody>
+          <a:bodyPr wrap="square" rtlCol="0">
+            <a:spAutoFit/>
+          </a:bodyPr>
+          <a:lstStyle/>
+          <a:p>
+            <a:pPr marL="342900" indent="-342900">
+              <a:spcAft>
+                <a:spcPts val="500"/>
+              </a:spcAft>
+              <a:buFont typeface="Arial" panose="020B0604020202020204" pitchFamily="34" charset="0"/>
+              <a:buChar char="•"/>
+            </a:pPr>
+            <a:r>
+              <a:rPr lang="it-IT" sz="2000" dirty="0">
+                <a:latin typeface="Segoe UI" panose="020B0502040204020203" pitchFamily="34" charset="0"/>
+                <a:cs typeface="Segoe UI" panose="020B0502040204020203" pitchFamily="34" charset="0"/>
+              </a:rPr>
+              <a:t>aa</a:t>
+            </a:r>
+          </a:p>
+        </p:txBody>
+      </p:sp>
+    </p:spTree>
+    <p:extLst>
+      <p:ext uri="{BB962C8B-B14F-4D97-AF65-F5344CB8AC3E}">
+        <p14:creationId xmlns:p14="http://schemas.microsoft.com/office/powerpoint/2010/main" val="645045590"/>
+      </p:ext>
+    </p:extLst>
+  </p:cSld>
+  <p:clrMapOvr>
+    <a:masterClrMapping/>
+  </p:clrMapOvr>
+</p:sld>
+</file>
+
 <file path=ppt/slides/slide2.xml><?xml version="1.0" encoding="utf-8"?>
 <p:sld xmlns:a="http://schemas.openxmlformats.org/drawingml/2006/main" xmlns:r="http://schemas.openxmlformats.org/officeDocument/2006/relationships" xmlns:p="http://schemas.openxmlformats.org/presentationml/2006/main">
   <p:cSld>
@@ -1969,7 +2575,7 @@
                 <a:latin typeface="Segoe UI" panose="020B0502040204020203" pitchFamily="34" charset="0"/>
                 <a:cs typeface="Segoe UI" panose="020B0502040204020203" pitchFamily="34" charset="0"/>
               </a:rPr>
-              <a:t>UAV Route Planning Strategies– 2/10</a:t>
+              <a:t>UAV Route Planning Strategies – 2/13</a:t>
             </a:r>
           </a:p>
         </p:txBody>
@@ -1988,8 +2594,8 @@
         </p:nvSpPr>
         <p:spPr>
           <a:xfrm>
-            <a:off x="400050" y="1860435"/>
-            <a:ext cx="8343900" cy="707886"/>
+            <a:off x="400050" y="1378522"/>
+            <a:ext cx="4468512" cy="4708981"/>
           </a:xfrm>
           <a:prstGeom prst="rect">
             <a:avLst/>
@@ -2007,26 +2613,277 @@
               <a:buAutoNum type="arabicPeriod"/>
             </a:pPr>
             <a:r>
-              <a:rPr lang="it-IT" sz="2000">
-                <a:latin typeface="Segoe UI" panose="020B0502040204020203" pitchFamily="34" charset="0"/>
-                <a:cs typeface="Segoe UI" panose="020B0502040204020203" pitchFamily="34" charset="0"/>
-              </a:rPr>
-              <a:t>AA</a:t>
-            </a:r>
-            <a:endParaRPr lang="it-IT" sz="2000" dirty="0">
-              <a:latin typeface="Segoe UI" panose="020B0502040204020203" pitchFamily="34" charset="0"/>
-              <a:cs typeface="Segoe UI" panose="020B0502040204020203" pitchFamily="34" charset="0"/>
-            </a:endParaRPr>
-          </a:p>
-          <a:p>
-            <a:pPr marL="285750" indent="-285750">
-              <a:buFontTx/>
-              <a:buChar char="-"/>
+              <a:rPr lang="it-IT" sz="2000" dirty="0">
+                <a:latin typeface="Segoe UI" panose="020B0502040204020203" pitchFamily="34" charset="0"/>
+                <a:cs typeface="Segoe UI" panose="020B0502040204020203" pitchFamily="34" charset="0"/>
+              </a:rPr>
+              <a:t>Introduction</a:t>
+            </a:r>
+          </a:p>
+          <a:p>
+            <a:pPr marL="457200" indent="-457200">
+              <a:buFont typeface="+mj-lt"/>
+              <a:buAutoNum type="arabicPeriod"/>
             </a:pPr>
             <a:endParaRPr lang="it-IT" sz="2000" dirty="0">
               <a:latin typeface="Segoe UI" panose="020B0502040204020203" pitchFamily="34" charset="0"/>
               <a:cs typeface="Segoe UI" panose="020B0502040204020203" pitchFamily="34" charset="0"/>
             </a:endParaRPr>
+          </a:p>
+          <a:p>
+            <a:pPr marL="457200" indent="-457200">
+              <a:buFont typeface="+mj-lt"/>
+              <a:buAutoNum type="arabicPeriod"/>
+            </a:pPr>
+            <a:r>
+              <a:rPr lang="it-IT" sz="2000" dirty="0">
+                <a:latin typeface="Segoe UI" panose="020B0502040204020203" pitchFamily="34" charset="0"/>
+                <a:cs typeface="Segoe UI" panose="020B0502040204020203" pitchFamily="34" charset="0"/>
+              </a:rPr>
+              <a:t>Overview of approaches</a:t>
+            </a:r>
+          </a:p>
+          <a:p>
+            <a:pPr marL="457200" indent="-457200">
+              <a:buFont typeface="+mj-lt"/>
+              <a:buAutoNum type="arabicPeriod"/>
+            </a:pPr>
+            <a:endParaRPr lang="it-IT" sz="2000" dirty="0">
+              <a:latin typeface="Segoe UI" panose="020B0502040204020203" pitchFamily="34" charset="0"/>
+              <a:cs typeface="Segoe UI" panose="020B0502040204020203" pitchFamily="34" charset="0"/>
+            </a:endParaRPr>
+          </a:p>
+          <a:p>
+            <a:pPr marL="457200" indent="-457200">
+              <a:buFont typeface="+mj-lt"/>
+              <a:buAutoNum type="arabicPeriod"/>
+            </a:pPr>
+            <a:r>
+              <a:rPr lang="it-IT" sz="2000" dirty="0">
+                <a:latin typeface="Segoe UI" panose="020B0502040204020203" pitchFamily="34" charset="0"/>
+                <a:cs typeface="Segoe UI" panose="020B0502040204020203" pitchFamily="34" charset="0"/>
+              </a:rPr>
+              <a:t>Classical approaches</a:t>
+            </a:r>
+          </a:p>
+          <a:p>
+            <a:pPr marL="457200" indent="-457200">
+              <a:buFont typeface="+mj-lt"/>
+              <a:buAutoNum type="arabicPeriod"/>
+            </a:pPr>
+            <a:endParaRPr lang="it-IT" sz="2000" dirty="0">
+              <a:latin typeface="Segoe UI" panose="020B0502040204020203" pitchFamily="34" charset="0"/>
+              <a:cs typeface="Segoe UI" panose="020B0502040204020203" pitchFamily="34" charset="0"/>
+            </a:endParaRPr>
+          </a:p>
+          <a:p>
+            <a:pPr marL="457200" indent="-457200">
+              <a:buFont typeface="+mj-lt"/>
+              <a:buAutoNum type="arabicPeriod"/>
+            </a:pPr>
+            <a:r>
+              <a:rPr lang="it-IT" sz="2000" dirty="0">
+                <a:latin typeface="Segoe UI" panose="020B0502040204020203" pitchFamily="34" charset="0"/>
+                <a:cs typeface="Segoe UI" panose="020B0502040204020203" pitchFamily="34" charset="0"/>
+              </a:rPr>
+              <a:t>Probabilistic methods</a:t>
+            </a:r>
+          </a:p>
+          <a:p>
+            <a:pPr marL="457200" indent="-457200">
+              <a:buFont typeface="+mj-lt"/>
+              <a:buAutoNum type="arabicPeriod"/>
+            </a:pPr>
+            <a:endParaRPr lang="it-IT" sz="2000" dirty="0">
+              <a:latin typeface="Segoe UI" panose="020B0502040204020203" pitchFamily="34" charset="0"/>
+              <a:cs typeface="Segoe UI" panose="020B0502040204020203" pitchFamily="34" charset="0"/>
+            </a:endParaRPr>
+          </a:p>
+          <a:p>
+            <a:pPr marL="457200" indent="-457200">
+              <a:buFont typeface="+mj-lt"/>
+              <a:buAutoNum type="arabicPeriod"/>
+            </a:pPr>
+            <a:r>
+              <a:rPr lang="it-IT" sz="2000" dirty="0">
+                <a:latin typeface="Segoe UI" panose="020B0502040204020203" pitchFamily="34" charset="0"/>
+                <a:cs typeface="Segoe UI" panose="020B0502040204020203" pitchFamily="34" charset="0"/>
+              </a:rPr>
+              <a:t>Nature-inspired algorithms</a:t>
+            </a:r>
+          </a:p>
+          <a:p>
+            <a:pPr marL="457200" indent="-457200">
+              <a:buFont typeface="+mj-lt"/>
+              <a:buAutoNum type="arabicPeriod"/>
+            </a:pPr>
+            <a:endParaRPr lang="it-IT" sz="2000" dirty="0">
+              <a:latin typeface="Segoe UI" panose="020B0502040204020203" pitchFamily="34" charset="0"/>
+              <a:cs typeface="Segoe UI" panose="020B0502040204020203" pitchFamily="34" charset="0"/>
+            </a:endParaRPr>
+          </a:p>
+          <a:p>
+            <a:pPr marL="457200" indent="-457200">
+              <a:buFont typeface="+mj-lt"/>
+              <a:buAutoNum type="arabicPeriod"/>
+            </a:pPr>
+            <a:r>
+              <a:rPr lang="it-IT" sz="2000" dirty="0">
+                <a:latin typeface="Segoe UI" panose="020B0502040204020203" pitchFamily="34" charset="0"/>
+                <a:cs typeface="Segoe UI" panose="020B0502040204020203" pitchFamily="34" charset="0"/>
+              </a:rPr>
+              <a:t>Multi-UAV coordination</a:t>
+            </a:r>
+          </a:p>
+          <a:p>
+            <a:pPr marL="457200" indent="-457200">
+              <a:buFont typeface="+mj-lt"/>
+              <a:buAutoNum type="arabicPeriod"/>
+            </a:pPr>
+            <a:endParaRPr lang="it-IT" sz="2000" dirty="0">
+              <a:latin typeface="Segoe UI" panose="020B0502040204020203" pitchFamily="34" charset="0"/>
+              <a:cs typeface="Segoe UI" panose="020B0502040204020203" pitchFamily="34" charset="0"/>
+            </a:endParaRPr>
+          </a:p>
+          <a:p>
+            <a:pPr marL="457200" indent="-457200">
+              <a:buFont typeface="+mj-lt"/>
+              <a:buAutoNum type="arabicPeriod"/>
+            </a:pPr>
+            <a:r>
+              <a:rPr lang="it-IT" sz="2000" dirty="0">
+                <a:latin typeface="Segoe UI" panose="020B0502040204020203" pitchFamily="34" charset="0"/>
+                <a:cs typeface="Segoe UI" panose="020B0502040204020203" pitchFamily="34" charset="0"/>
+              </a:rPr>
+              <a:t>Environment-specific approaches</a:t>
+            </a:r>
+          </a:p>
+          <a:p>
+            <a:pPr marL="457200" indent="-457200">
+              <a:buFont typeface="+mj-lt"/>
+              <a:buAutoNum type="arabicPeriod"/>
+            </a:pPr>
+            <a:endParaRPr lang="it-IT" sz="2000" dirty="0">
+              <a:latin typeface="Segoe UI" panose="020B0502040204020203" pitchFamily="34" charset="0"/>
+              <a:cs typeface="Segoe UI" panose="020B0502040204020203" pitchFamily="34" charset="0"/>
+            </a:endParaRPr>
+          </a:p>
+          <a:p>
+            <a:pPr marL="457200" indent="-457200">
+              <a:buFont typeface="+mj-lt"/>
+              <a:buAutoNum type="arabicPeriod"/>
+            </a:pPr>
+            <a:r>
+              <a:rPr lang="it-IT" sz="2000" dirty="0">
+                <a:latin typeface="Segoe UI" panose="020B0502040204020203" pitchFamily="34" charset="0"/>
+                <a:cs typeface="Segoe UI" panose="020B0502040204020203" pitchFamily="34" charset="0"/>
+              </a:rPr>
+              <a:t>Military applications</a:t>
+            </a:r>
+          </a:p>
+        </p:txBody>
+      </p:sp>
+      <p:sp>
+        <p:nvSpPr>
+          <p:cNvPr id="3" name="CasellaDiTesto 2">
+            <a:extLst>
+              <a:ext uri="{FF2B5EF4-FFF2-40B4-BE49-F238E27FC236}">
+                <a16:creationId xmlns:a16="http://schemas.microsoft.com/office/drawing/2014/main" id="{74AB3E0E-BD4D-DD37-5D49-D762C41EA92E}"/>
+              </a:ext>
+            </a:extLst>
+          </p:cNvPr>
+          <p:cNvSpPr txBox="1"/>
+          <p:nvPr/>
+        </p:nvSpPr>
+        <p:spPr>
+          <a:xfrm>
+            <a:off x="4868562" y="1378522"/>
+            <a:ext cx="4468512" cy="2554545"/>
+          </a:xfrm>
+          <a:prstGeom prst="rect">
+            <a:avLst/>
+          </a:prstGeom>
+          <a:noFill/>
+        </p:spPr>
+        <p:txBody>
+          <a:bodyPr wrap="square" rtlCol="0">
+            <a:spAutoFit/>
+          </a:bodyPr>
+          <a:lstStyle/>
+          <a:p>
+            <a:pPr marL="457200" indent="-457200">
+              <a:buAutoNum type="arabicPeriod" startAt="9"/>
+            </a:pPr>
+            <a:r>
+              <a:rPr lang="it-IT" sz="2000" dirty="0">
+                <a:latin typeface="Segoe UI" panose="020B0502040204020203" pitchFamily="34" charset="0"/>
+                <a:cs typeface="Segoe UI" panose="020B0502040204020203" pitchFamily="34" charset="0"/>
+              </a:rPr>
+              <a:t>Military applications</a:t>
+            </a:r>
+          </a:p>
+          <a:p>
+            <a:pPr marL="457200" indent="-457200">
+              <a:buAutoNum type="arabicPeriod" startAt="9"/>
+            </a:pPr>
+            <a:endParaRPr lang="it-IT" sz="2000" dirty="0">
+              <a:latin typeface="Segoe UI" panose="020B0502040204020203" pitchFamily="34" charset="0"/>
+              <a:cs typeface="Segoe UI" panose="020B0502040204020203" pitchFamily="34" charset="0"/>
+            </a:endParaRPr>
+          </a:p>
+          <a:p>
+            <a:pPr marL="457200" indent="-457200">
+              <a:buAutoNum type="arabicPeriod" startAt="9"/>
+            </a:pPr>
+            <a:r>
+              <a:rPr lang="it-IT" sz="2000" dirty="0">
+                <a:latin typeface="Segoe UI" panose="020B0502040204020203" pitchFamily="34" charset="0"/>
+                <a:cs typeface="Segoe UI" panose="020B0502040204020203" pitchFamily="34" charset="0"/>
+              </a:rPr>
+              <a:t>Comparison of approaches</a:t>
+            </a:r>
+          </a:p>
+          <a:p>
+            <a:pPr marL="457200" indent="-457200">
+              <a:buAutoNum type="arabicPeriod" startAt="9"/>
+            </a:pPr>
+            <a:endParaRPr lang="it-IT" sz="2000" dirty="0">
+              <a:latin typeface="Segoe UI" panose="020B0502040204020203" pitchFamily="34" charset="0"/>
+              <a:cs typeface="Segoe UI" panose="020B0502040204020203" pitchFamily="34" charset="0"/>
+            </a:endParaRPr>
+          </a:p>
+          <a:p>
+            <a:pPr marL="457200" indent="-457200">
+              <a:buAutoNum type="arabicPeriod" startAt="9"/>
+            </a:pPr>
+            <a:r>
+              <a:rPr lang="it-IT" sz="2000" dirty="0">
+                <a:latin typeface="Segoe UI" panose="020B0502040204020203" pitchFamily="34" charset="0"/>
+                <a:cs typeface="Segoe UI" panose="020B0502040204020203" pitchFamily="34" charset="0"/>
+              </a:rPr>
+              <a:t>Future challenges and research directions</a:t>
+            </a:r>
+          </a:p>
+          <a:p>
+            <a:pPr marL="457200" indent="-457200">
+              <a:buAutoNum type="arabicPeriod" startAt="9"/>
+            </a:pPr>
+            <a:endParaRPr lang="it-IT" sz="2000" dirty="0">
+              <a:latin typeface="Segoe UI" panose="020B0502040204020203" pitchFamily="34" charset="0"/>
+              <a:cs typeface="Segoe UI" panose="020B0502040204020203" pitchFamily="34" charset="0"/>
+            </a:endParaRPr>
+          </a:p>
+          <a:p>
+            <a:pPr marL="457200" indent="-457200">
+              <a:buAutoNum type="arabicPeriod" startAt="9"/>
+            </a:pPr>
+            <a:r>
+              <a:rPr lang="it-IT" sz="2000" dirty="0">
+                <a:latin typeface="Segoe UI" panose="020B0502040204020203" pitchFamily="34" charset="0"/>
+                <a:cs typeface="Segoe UI" panose="020B0502040204020203" pitchFamily="34" charset="0"/>
+              </a:rPr>
+              <a:t>Conclusions</a:t>
+            </a:r>
           </a:p>
         </p:txBody>
       </p:sp>
@@ -2093,7 +2950,7 @@
                 <a:latin typeface="Segoe UI" panose="020B0502040204020203" pitchFamily="34" charset="0"/>
                 <a:cs typeface="Segoe UI" panose="020B0502040204020203" pitchFamily="34" charset="0"/>
               </a:rPr>
-              <a:t>Title</a:t>
+              <a:t>UAV Route Planning</a:t>
             </a:r>
           </a:p>
         </p:txBody>
@@ -2129,17 +2986,125 @@
                 <a:latin typeface="Segoe UI" panose="020B0502040204020203" pitchFamily="34" charset="0"/>
                 <a:cs typeface="Segoe UI" panose="020B0502040204020203" pitchFamily="34" charset="0"/>
               </a:rPr>
-              <a:t>UAV Route Planning Strategies– 3/10</a:t>
-            </a:r>
-          </a:p>
-        </p:txBody>
-      </p:sp>
-      <p:sp>
-        <p:nvSpPr>
-          <p:cNvPr id="6" name="CasellaDiTesto 5">
-            <a:extLst>
-              <a:ext uri="{FF2B5EF4-FFF2-40B4-BE49-F238E27FC236}">
-                <a16:creationId xmlns:a16="http://schemas.microsoft.com/office/drawing/2014/main" id="{0C3825A1-BC2D-A575-E5DA-F3AAE95E3E9E}"/>
+              <a:t>UAV Route Planning Strategies – 3/13</a:t>
+            </a:r>
+          </a:p>
+        </p:txBody>
+      </p:sp>
+      <p:pic>
+        <p:nvPicPr>
+          <p:cNvPr id="6" name="Immagine 5" descr="Immagine che contiene diagramma, cerchio, linea, schizzo&#10;&#10;Descrizione generata automaticamente">
+            <a:extLst>
+              <a:ext uri="{FF2B5EF4-FFF2-40B4-BE49-F238E27FC236}">
+                <a16:creationId xmlns:a16="http://schemas.microsoft.com/office/drawing/2014/main" id="{031AA6C4-834F-7C7F-138A-5E0BEB1AF480}"/>
+              </a:ext>
+            </a:extLst>
+          </p:cNvPr>
+          <p:cNvPicPr>
+            <a:picLocks noChangeAspect="1"/>
+          </p:cNvPicPr>
+          <p:nvPr/>
+        </p:nvPicPr>
+        <p:blipFill>
+          <a:blip r:embed="rId2">
+            <a:extLst>
+              <a:ext uri="{28A0092B-C50C-407E-A947-70E740481C1C}">
+                <a14:useLocalDpi xmlns:a14="http://schemas.microsoft.com/office/drawing/2010/main" val="0"/>
+              </a:ext>
+            </a:extLst>
+          </a:blip>
+          <a:stretch>
+            <a:fillRect/>
+          </a:stretch>
+        </p:blipFill>
+        <p:spPr>
+          <a:xfrm>
+            <a:off x="5726902" y="3298332"/>
+            <a:ext cx="3083203" cy="1982059"/>
+          </a:xfrm>
+          <a:prstGeom prst="rect">
+            <a:avLst/>
+          </a:prstGeom>
+        </p:spPr>
+      </p:pic>
+      <p:pic>
+        <p:nvPicPr>
+          <p:cNvPr id="8" name="Immagine 7" descr="Immagine che contiene testo, schermata, design&#10;&#10;Descrizione generata automaticamente">
+            <a:extLst>
+              <a:ext uri="{FF2B5EF4-FFF2-40B4-BE49-F238E27FC236}">
+                <a16:creationId xmlns:a16="http://schemas.microsoft.com/office/drawing/2014/main" id="{9D993DE7-9995-DDE5-A88C-58810E435D6F}"/>
+              </a:ext>
+            </a:extLst>
+          </p:cNvPr>
+          <p:cNvPicPr>
+            <a:picLocks noChangeAspect="1"/>
+          </p:cNvPicPr>
+          <p:nvPr/>
+        </p:nvPicPr>
+        <p:blipFill>
+          <a:blip r:embed="rId3">
+            <a:extLst>
+              <a:ext uri="{28A0092B-C50C-407E-A947-70E740481C1C}">
+                <a14:useLocalDpi xmlns:a14="http://schemas.microsoft.com/office/drawing/2010/main" val="0"/>
+              </a:ext>
+            </a:extLst>
+          </a:blip>
+          <a:stretch>
+            <a:fillRect/>
+          </a:stretch>
+        </p:blipFill>
+        <p:spPr>
+          <a:xfrm>
+            <a:off x="1166812" y="1370478"/>
+            <a:ext cx="7081622" cy="1686100"/>
+          </a:xfrm>
+          <a:prstGeom prst="rect">
+            <a:avLst/>
+          </a:prstGeom>
+        </p:spPr>
+      </p:pic>
+      <p:pic>
+        <p:nvPicPr>
+          <p:cNvPr id="10" name="Immagine 9" descr="Immagine che contiene testo, schermata, Carattere, diagramma&#10;&#10;Descrizione generata automaticamente">
+            <a:extLst>
+              <a:ext uri="{FF2B5EF4-FFF2-40B4-BE49-F238E27FC236}">
+                <a16:creationId xmlns:a16="http://schemas.microsoft.com/office/drawing/2014/main" id="{497C444F-B2C7-5E3E-0955-E0099943D0D1}"/>
+              </a:ext>
+            </a:extLst>
+          </p:cNvPr>
+          <p:cNvPicPr>
+            <a:picLocks noChangeAspect="1"/>
+          </p:cNvPicPr>
+          <p:nvPr/>
+        </p:nvPicPr>
+        <p:blipFill>
+          <a:blip r:embed="rId4">
+            <a:extLst>
+              <a:ext uri="{28A0092B-C50C-407E-A947-70E740481C1C}">
+                <a14:useLocalDpi xmlns:a14="http://schemas.microsoft.com/office/drawing/2010/main" val="0"/>
+              </a:ext>
+            </a:extLst>
+          </a:blip>
+          <a:stretch>
+            <a:fillRect/>
+          </a:stretch>
+        </p:blipFill>
+        <p:spPr>
+          <a:xfrm>
+            <a:off x="333895" y="3298332"/>
+            <a:ext cx="5092685" cy="2181292"/>
+          </a:xfrm>
+          <a:prstGeom prst="rect">
+            <a:avLst/>
+          </a:prstGeom>
+        </p:spPr>
+      </p:pic>
+      <p:sp>
+        <p:nvSpPr>
+          <p:cNvPr id="11" name="CasellaDiTesto 10">
+            <a:extLst>
+              <a:ext uri="{FF2B5EF4-FFF2-40B4-BE49-F238E27FC236}">
+                <a16:creationId xmlns:a16="http://schemas.microsoft.com/office/drawing/2014/main" id="{9B03CE57-CE6F-1A55-D3F4-5083C0164047}"/>
               </a:ext>
             </a:extLst>
           </p:cNvPr>
@@ -2148,8 +3113,8 @@
         </p:nvSpPr>
         <p:spPr>
           <a:xfrm>
-            <a:off x="262647" y="1391055"/>
-            <a:ext cx="8528062" cy="400110"/>
+            <a:off x="1393897" y="5643250"/>
+            <a:ext cx="6356206" cy="307777"/>
           </a:xfrm>
           <a:prstGeom prst="rect">
             <a:avLst/>
@@ -2162,17 +3127,19 @@
           </a:bodyPr>
           <a:lstStyle/>
           <a:p>
-            <a:pPr>
-              <a:spcAft>
-                <a:spcPts val="500"/>
-              </a:spcAft>
-            </a:pPr>
-            <a:r>
-              <a:rPr lang="it-IT" sz="2000" dirty="0">
-                <a:latin typeface="Segoe UI" panose="020B0502040204020203" pitchFamily="34" charset="0"/>
-                <a:cs typeface="Segoe UI" panose="020B0502040204020203" pitchFamily="34" charset="0"/>
-              </a:rPr>
-              <a:t>AAA</a:t>
+            <a:r>
+              <a:rPr lang="it-IT" sz="1400" dirty="0"/>
+              <a:t>Reference: </a:t>
+            </a:r>
+            <a:r>
+              <a:rPr lang="it-IT" sz="1400" dirty="0">
+                <a:hlinkClick r:id="rId5"/>
+              </a:rPr>
+              <a:t>https://www.sciencedirect.com/science/article/pii/S0140366419308539</a:t>
+            </a:r>
+            <a:r>
+              <a:rPr lang="it-IT" sz="1400" dirty="0"/>
+              <a:t> </a:t>
             </a:r>
           </a:p>
         </p:txBody>
@@ -2181,6 +3148,1127 @@
     <p:extLst>
       <p:ext uri="{BB962C8B-B14F-4D97-AF65-F5344CB8AC3E}">
         <p14:creationId xmlns:p14="http://schemas.microsoft.com/office/powerpoint/2010/main" val="1172087263"/>
+      </p:ext>
+    </p:extLst>
+  </p:cSld>
+  <p:clrMapOvr>
+    <a:masterClrMapping/>
+  </p:clrMapOvr>
+</p:sld>
+</file>
+
+<file path=ppt/slides/slide4.xml><?xml version="1.0" encoding="utf-8"?>
+<p:sld xmlns:a="http://schemas.openxmlformats.org/drawingml/2006/main" xmlns:r="http://schemas.openxmlformats.org/officeDocument/2006/relationships" xmlns:p="http://schemas.openxmlformats.org/presentationml/2006/main">
+  <p:cSld>
+    <p:spTree>
+      <p:nvGrpSpPr>
+        <p:cNvPr id="1" name=""/>
+        <p:cNvGrpSpPr/>
+        <p:nvPr/>
+      </p:nvGrpSpPr>
+      <p:grpSpPr>
+        <a:xfrm>
+          <a:off x="0" y="0"/>
+          <a:ext cx="0" cy="0"/>
+          <a:chOff x="0" y="0"/>
+          <a:chExt cx="0" cy="0"/>
+        </a:xfrm>
+      </p:grpSpPr>
+      <p:sp>
+        <p:nvSpPr>
+          <p:cNvPr id="2" name="Title 1">
+            <a:extLst>
+              <a:ext uri="{FF2B5EF4-FFF2-40B4-BE49-F238E27FC236}">
+                <a16:creationId xmlns:a16="http://schemas.microsoft.com/office/drawing/2014/main" id="{A20241D5-7C6B-45F6-9B01-BE455CD8AD0B}"/>
+              </a:ext>
+            </a:extLst>
+          </p:cNvPr>
+          <p:cNvSpPr>
+            <a:spLocks noGrp="1"/>
+          </p:cNvSpPr>
+          <p:nvPr>
+            <p:ph type="title"/>
+          </p:nvPr>
+        </p:nvSpPr>
+        <p:spPr>
+          <a:xfrm>
+            <a:off x="0" y="26902"/>
+            <a:ext cx="7061507" cy="1114425"/>
+          </a:xfrm>
+        </p:spPr>
+        <p:txBody>
+          <a:bodyPr>
+            <a:normAutofit/>
+          </a:bodyPr>
+          <a:lstStyle/>
+          <a:p>
+            <a:r>
+              <a:rPr lang="en-US" dirty="0">
+                <a:latin typeface="Segoe UI" panose="020B0502040204020203" pitchFamily="34" charset="0"/>
+                <a:cs typeface="Segoe UI" panose="020B0502040204020203" pitchFamily="34" charset="0"/>
+              </a:rPr>
+              <a:t>Overview of approaches</a:t>
+            </a:r>
+          </a:p>
+        </p:txBody>
+      </p:sp>
+      <p:sp>
+        <p:nvSpPr>
+          <p:cNvPr id="4" name="Slide Number Placeholder 3">
+            <a:extLst>
+              <a:ext uri="{FF2B5EF4-FFF2-40B4-BE49-F238E27FC236}">
+                <a16:creationId xmlns:a16="http://schemas.microsoft.com/office/drawing/2014/main" id="{0FD64D78-A03B-45A9-9177-047825E632C0}"/>
+              </a:ext>
+            </a:extLst>
+          </p:cNvPr>
+          <p:cNvSpPr>
+            <a:spLocks noGrp="1"/>
+          </p:cNvSpPr>
+          <p:nvPr>
+            <p:ph type="sldNum" sz="quarter" idx="4"/>
+          </p:nvPr>
+        </p:nvSpPr>
+        <p:spPr>
+          <a:xfrm>
+            <a:off x="6143105" y="6365195"/>
+            <a:ext cx="2841321" cy="365125"/>
+          </a:xfrm>
+        </p:spPr>
+        <p:txBody>
+          <a:bodyPr/>
+          <a:lstStyle/>
+          <a:p>
+            <a:r>
+              <a:rPr lang="en-US" sz="1200" dirty="0">
+                <a:latin typeface="Segoe UI" panose="020B0502040204020203" pitchFamily="34" charset="0"/>
+                <a:cs typeface="Segoe UI" panose="020B0502040204020203" pitchFamily="34" charset="0"/>
+              </a:rPr>
+              <a:t>UAV Route Planning Strategies – 4/13</a:t>
+            </a:r>
+          </a:p>
+        </p:txBody>
+      </p:sp>
+      <p:sp>
+        <p:nvSpPr>
+          <p:cNvPr id="6" name="CasellaDiTesto 5">
+            <a:extLst>
+              <a:ext uri="{FF2B5EF4-FFF2-40B4-BE49-F238E27FC236}">
+                <a16:creationId xmlns:a16="http://schemas.microsoft.com/office/drawing/2014/main" id="{0C3825A1-BC2D-A575-E5DA-F3AAE95E3E9E}"/>
+              </a:ext>
+            </a:extLst>
+          </p:cNvPr>
+          <p:cNvSpPr txBox="1"/>
+          <p:nvPr/>
+        </p:nvSpPr>
+        <p:spPr>
+          <a:xfrm>
+            <a:off x="262647" y="1391055"/>
+            <a:ext cx="8528062" cy="4119076"/>
+          </a:xfrm>
+          <a:prstGeom prst="rect">
+            <a:avLst/>
+          </a:prstGeom>
+          <a:noFill/>
+        </p:spPr>
+        <p:txBody>
+          <a:bodyPr wrap="square" rtlCol="0">
+            <a:spAutoFit/>
+          </a:bodyPr>
+          <a:lstStyle/>
+          <a:p>
+            <a:pPr marL="342900" indent="-342900">
+              <a:spcAft>
+                <a:spcPts val="500"/>
+              </a:spcAft>
+              <a:buFont typeface="Arial" panose="020B0604020202020204" pitchFamily="34" charset="0"/>
+              <a:buChar char="•"/>
+            </a:pPr>
+            <a:r>
+              <a:rPr lang="it-IT" sz="2000" dirty="0">
+                <a:latin typeface="Segoe UI" panose="020B0502040204020203" pitchFamily="34" charset="0"/>
+                <a:cs typeface="Segoe UI" panose="020B0502040204020203" pitchFamily="34" charset="0"/>
+              </a:rPr>
+              <a:t>Classical algorithms</a:t>
+            </a:r>
+          </a:p>
+          <a:p>
+            <a:pPr marL="342900" indent="-342900">
+              <a:spcAft>
+                <a:spcPts val="500"/>
+              </a:spcAft>
+              <a:buFont typeface="Arial" panose="020B0604020202020204" pitchFamily="34" charset="0"/>
+              <a:buChar char="•"/>
+            </a:pPr>
+            <a:endParaRPr lang="it-IT" sz="2000" dirty="0">
+              <a:latin typeface="Segoe UI" panose="020B0502040204020203" pitchFamily="34" charset="0"/>
+              <a:cs typeface="Segoe UI" panose="020B0502040204020203" pitchFamily="34" charset="0"/>
+            </a:endParaRPr>
+          </a:p>
+          <a:p>
+            <a:pPr marL="342900" indent="-342900">
+              <a:spcAft>
+                <a:spcPts val="500"/>
+              </a:spcAft>
+              <a:buFont typeface="Arial" panose="020B0604020202020204" pitchFamily="34" charset="0"/>
+              <a:buChar char="•"/>
+            </a:pPr>
+            <a:r>
+              <a:rPr lang="it-IT" sz="2000" dirty="0">
+                <a:latin typeface="Segoe UI" panose="020B0502040204020203" pitchFamily="34" charset="0"/>
+                <a:cs typeface="Segoe UI" panose="020B0502040204020203" pitchFamily="34" charset="0"/>
+              </a:rPr>
+              <a:t>Probabilistic methods</a:t>
+            </a:r>
+          </a:p>
+          <a:p>
+            <a:pPr marL="342900" indent="-342900">
+              <a:spcAft>
+                <a:spcPts val="500"/>
+              </a:spcAft>
+              <a:buFont typeface="Arial" panose="020B0604020202020204" pitchFamily="34" charset="0"/>
+              <a:buChar char="•"/>
+            </a:pPr>
+            <a:endParaRPr lang="it-IT" sz="2000" dirty="0">
+              <a:latin typeface="Segoe UI" panose="020B0502040204020203" pitchFamily="34" charset="0"/>
+              <a:cs typeface="Segoe UI" panose="020B0502040204020203" pitchFamily="34" charset="0"/>
+            </a:endParaRPr>
+          </a:p>
+          <a:p>
+            <a:pPr marL="342900" indent="-342900">
+              <a:spcAft>
+                <a:spcPts val="500"/>
+              </a:spcAft>
+              <a:buFont typeface="Arial" panose="020B0604020202020204" pitchFamily="34" charset="0"/>
+              <a:buChar char="•"/>
+            </a:pPr>
+            <a:r>
+              <a:rPr lang="it-IT" sz="2000" dirty="0">
+                <a:latin typeface="Segoe UI" panose="020B0502040204020203" pitchFamily="34" charset="0"/>
+                <a:cs typeface="Segoe UI" panose="020B0502040204020203" pitchFamily="34" charset="0"/>
+              </a:rPr>
+              <a:t>Nature-inspired algorithms</a:t>
+            </a:r>
+          </a:p>
+          <a:p>
+            <a:pPr marL="342900" indent="-342900">
+              <a:spcAft>
+                <a:spcPts val="500"/>
+              </a:spcAft>
+              <a:buFont typeface="Arial" panose="020B0604020202020204" pitchFamily="34" charset="0"/>
+              <a:buChar char="•"/>
+            </a:pPr>
+            <a:endParaRPr lang="it-IT" sz="2000" dirty="0">
+              <a:latin typeface="Segoe UI" panose="020B0502040204020203" pitchFamily="34" charset="0"/>
+              <a:cs typeface="Segoe UI" panose="020B0502040204020203" pitchFamily="34" charset="0"/>
+            </a:endParaRPr>
+          </a:p>
+          <a:p>
+            <a:pPr marL="342900" indent="-342900">
+              <a:spcAft>
+                <a:spcPts val="500"/>
+              </a:spcAft>
+              <a:buFont typeface="Arial" panose="020B0604020202020204" pitchFamily="34" charset="0"/>
+              <a:buChar char="•"/>
+            </a:pPr>
+            <a:r>
+              <a:rPr lang="it-IT" sz="2000" dirty="0">
+                <a:latin typeface="Segoe UI" panose="020B0502040204020203" pitchFamily="34" charset="0"/>
+                <a:cs typeface="Segoe UI" panose="020B0502040204020203" pitchFamily="34" charset="0"/>
+              </a:rPr>
+              <a:t>Multi-UAV coordination</a:t>
+            </a:r>
+          </a:p>
+          <a:p>
+            <a:pPr marL="342900" indent="-342900">
+              <a:spcAft>
+                <a:spcPts val="500"/>
+              </a:spcAft>
+              <a:buFont typeface="Arial" panose="020B0604020202020204" pitchFamily="34" charset="0"/>
+              <a:buChar char="•"/>
+            </a:pPr>
+            <a:endParaRPr lang="it-IT" sz="2000" dirty="0">
+              <a:latin typeface="Segoe UI" panose="020B0502040204020203" pitchFamily="34" charset="0"/>
+              <a:cs typeface="Segoe UI" panose="020B0502040204020203" pitchFamily="34" charset="0"/>
+            </a:endParaRPr>
+          </a:p>
+          <a:p>
+            <a:pPr marL="342900" indent="-342900">
+              <a:spcAft>
+                <a:spcPts val="500"/>
+              </a:spcAft>
+              <a:buFont typeface="Arial" panose="020B0604020202020204" pitchFamily="34" charset="0"/>
+              <a:buChar char="•"/>
+            </a:pPr>
+            <a:r>
+              <a:rPr lang="it-IT" sz="2000" dirty="0">
+                <a:latin typeface="Segoe UI" panose="020B0502040204020203" pitchFamily="34" charset="0"/>
+                <a:cs typeface="Segoe UI" panose="020B0502040204020203" pitchFamily="34" charset="0"/>
+              </a:rPr>
+              <a:t>Environment-specific approaches</a:t>
+            </a:r>
+          </a:p>
+          <a:p>
+            <a:pPr marL="342900" indent="-342900">
+              <a:spcAft>
+                <a:spcPts val="500"/>
+              </a:spcAft>
+              <a:buFont typeface="Arial" panose="020B0604020202020204" pitchFamily="34" charset="0"/>
+              <a:buChar char="•"/>
+            </a:pPr>
+            <a:endParaRPr lang="it-IT" sz="2000" dirty="0">
+              <a:latin typeface="Segoe UI" panose="020B0502040204020203" pitchFamily="34" charset="0"/>
+              <a:cs typeface="Segoe UI" panose="020B0502040204020203" pitchFamily="34" charset="0"/>
+            </a:endParaRPr>
+          </a:p>
+          <a:p>
+            <a:pPr marL="342900" indent="-342900">
+              <a:spcAft>
+                <a:spcPts val="500"/>
+              </a:spcAft>
+              <a:buFont typeface="Arial" panose="020B0604020202020204" pitchFamily="34" charset="0"/>
+              <a:buChar char="•"/>
+            </a:pPr>
+            <a:r>
+              <a:rPr lang="it-IT" sz="2000" dirty="0">
+                <a:latin typeface="Segoe UI" panose="020B0502040204020203" pitchFamily="34" charset="0"/>
+                <a:cs typeface="Segoe UI" panose="020B0502040204020203" pitchFamily="34" charset="0"/>
+              </a:rPr>
+              <a:t>Military applications</a:t>
+            </a:r>
+          </a:p>
+        </p:txBody>
+      </p:sp>
+    </p:spTree>
+    <p:extLst>
+      <p:ext uri="{BB962C8B-B14F-4D97-AF65-F5344CB8AC3E}">
+        <p14:creationId xmlns:p14="http://schemas.microsoft.com/office/powerpoint/2010/main" val="1980155586"/>
+      </p:ext>
+    </p:extLst>
+  </p:cSld>
+  <p:clrMapOvr>
+    <a:masterClrMapping/>
+  </p:clrMapOvr>
+</p:sld>
+</file>
+
+<file path=ppt/slides/slide5.xml><?xml version="1.0" encoding="utf-8"?>
+<p:sld xmlns:a="http://schemas.openxmlformats.org/drawingml/2006/main" xmlns:r="http://schemas.openxmlformats.org/officeDocument/2006/relationships" xmlns:p="http://schemas.openxmlformats.org/presentationml/2006/main">
+  <p:cSld>
+    <p:spTree>
+      <p:nvGrpSpPr>
+        <p:cNvPr id="1" name=""/>
+        <p:cNvGrpSpPr/>
+        <p:nvPr/>
+      </p:nvGrpSpPr>
+      <p:grpSpPr>
+        <a:xfrm>
+          <a:off x="0" y="0"/>
+          <a:ext cx="0" cy="0"/>
+          <a:chOff x="0" y="0"/>
+          <a:chExt cx="0" cy="0"/>
+        </a:xfrm>
+      </p:grpSpPr>
+      <p:sp>
+        <p:nvSpPr>
+          <p:cNvPr id="2" name="Title 1">
+            <a:extLst>
+              <a:ext uri="{FF2B5EF4-FFF2-40B4-BE49-F238E27FC236}">
+                <a16:creationId xmlns:a16="http://schemas.microsoft.com/office/drawing/2014/main" id="{A20241D5-7C6B-45F6-9B01-BE455CD8AD0B}"/>
+              </a:ext>
+            </a:extLst>
+          </p:cNvPr>
+          <p:cNvSpPr>
+            <a:spLocks noGrp="1"/>
+          </p:cNvSpPr>
+          <p:nvPr>
+            <p:ph type="title"/>
+          </p:nvPr>
+        </p:nvSpPr>
+        <p:spPr>
+          <a:xfrm>
+            <a:off x="0" y="26902"/>
+            <a:ext cx="7061507" cy="1114425"/>
+          </a:xfrm>
+        </p:spPr>
+        <p:txBody>
+          <a:bodyPr>
+            <a:normAutofit/>
+          </a:bodyPr>
+          <a:lstStyle/>
+          <a:p>
+            <a:r>
+              <a:rPr lang="en-US" dirty="0">
+                <a:latin typeface="Segoe UI" panose="020B0502040204020203" pitchFamily="34" charset="0"/>
+                <a:cs typeface="Segoe UI" panose="020B0502040204020203" pitchFamily="34" charset="0"/>
+              </a:rPr>
+              <a:t>Classical approaches</a:t>
+            </a:r>
+          </a:p>
+        </p:txBody>
+      </p:sp>
+      <p:sp>
+        <p:nvSpPr>
+          <p:cNvPr id="4" name="Slide Number Placeholder 3">
+            <a:extLst>
+              <a:ext uri="{FF2B5EF4-FFF2-40B4-BE49-F238E27FC236}">
+                <a16:creationId xmlns:a16="http://schemas.microsoft.com/office/drawing/2014/main" id="{0FD64D78-A03B-45A9-9177-047825E632C0}"/>
+              </a:ext>
+            </a:extLst>
+          </p:cNvPr>
+          <p:cNvSpPr>
+            <a:spLocks noGrp="1"/>
+          </p:cNvSpPr>
+          <p:nvPr>
+            <p:ph type="sldNum" sz="quarter" idx="4"/>
+          </p:nvPr>
+        </p:nvSpPr>
+        <p:spPr>
+          <a:xfrm>
+            <a:off x="6143105" y="6365195"/>
+            <a:ext cx="2841321" cy="365125"/>
+          </a:xfrm>
+        </p:spPr>
+        <p:txBody>
+          <a:bodyPr/>
+          <a:lstStyle/>
+          <a:p>
+            <a:r>
+              <a:rPr lang="en-US" sz="1200" dirty="0">
+                <a:latin typeface="Segoe UI" panose="020B0502040204020203" pitchFamily="34" charset="0"/>
+                <a:cs typeface="Segoe UI" panose="020B0502040204020203" pitchFamily="34" charset="0"/>
+              </a:rPr>
+              <a:t>UAV Route Planning Strategies – 5/13</a:t>
+            </a:r>
+          </a:p>
+        </p:txBody>
+      </p:sp>
+      <p:sp>
+        <p:nvSpPr>
+          <p:cNvPr id="6" name="CasellaDiTesto 5">
+            <a:extLst>
+              <a:ext uri="{FF2B5EF4-FFF2-40B4-BE49-F238E27FC236}">
+                <a16:creationId xmlns:a16="http://schemas.microsoft.com/office/drawing/2014/main" id="{0C3825A1-BC2D-A575-E5DA-F3AAE95E3E9E}"/>
+              </a:ext>
+            </a:extLst>
+          </p:cNvPr>
+          <p:cNvSpPr txBox="1"/>
+          <p:nvPr/>
+        </p:nvSpPr>
+        <p:spPr>
+          <a:xfrm>
+            <a:off x="262647" y="1391055"/>
+            <a:ext cx="8528062" cy="400110"/>
+          </a:xfrm>
+          <a:prstGeom prst="rect">
+            <a:avLst/>
+          </a:prstGeom>
+          <a:noFill/>
+        </p:spPr>
+        <p:txBody>
+          <a:bodyPr wrap="square" rtlCol="0">
+            <a:spAutoFit/>
+          </a:bodyPr>
+          <a:lstStyle/>
+          <a:p>
+            <a:pPr marL="342900" indent="-342900">
+              <a:spcAft>
+                <a:spcPts val="500"/>
+              </a:spcAft>
+              <a:buFont typeface="Arial" panose="020B0604020202020204" pitchFamily="34" charset="0"/>
+              <a:buChar char="•"/>
+            </a:pPr>
+            <a:r>
+              <a:rPr lang="it-IT" sz="2000" dirty="0">
+                <a:latin typeface="Segoe UI" panose="020B0502040204020203" pitchFamily="34" charset="0"/>
+                <a:cs typeface="Segoe UI" panose="020B0502040204020203" pitchFamily="34" charset="0"/>
+              </a:rPr>
+              <a:t>aa</a:t>
+            </a:r>
+          </a:p>
+        </p:txBody>
+      </p:sp>
+    </p:spTree>
+    <p:extLst>
+      <p:ext uri="{BB962C8B-B14F-4D97-AF65-F5344CB8AC3E}">
+        <p14:creationId xmlns:p14="http://schemas.microsoft.com/office/powerpoint/2010/main" val="3602065225"/>
+      </p:ext>
+    </p:extLst>
+  </p:cSld>
+  <p:clrMapOvr>
+    <a:masterClrMapping/>
+  </p:clrMapOvr>
+</p:sld>
+</file>
+
+<file path=ppt/slides/slide6.xml><?xml version="1.0" encoding="utf-8"?>
+<p:sld xmlns:a="http://schemas.openxmlformats.org/drawingml/2006/main" xmlns:r="http://schemas.openxmlformats.org/officeDocument/2006/relationships" xmlns:p="http://schemas.openxmlformats.org/presentationml/2006/main">
+  <p:cSld>
+    <p:spTree>
+      <p:nvGrpSpPr>
+        <p:cNvPr id="1" name=""/>
+        <p:cNvGrpSpPr/>
+        <p:nvPr/>
+      </p:nvGrpSpPr>
+      <p:grpSpPr>
+        <a:xfrm>
+          <a:off x="0" y="0"/>
+          <a:ext cx="0" cy="0"/>
+          <a:chOff x="0" y="0"/>
+          <a:chExt cx="0" cy="0"/>
+        </a:xfrm>
+      </p:grpSpPr>
+      <p:sp>
+        <p:nvSpPr>
+          <p:cNvPr id="2" name="Title 1">
+            <a:extLst>
+              <a:ext uri="{FF2B5EF4-FFF2-40B4-BE49-F238E27FC236}">
+                <a16:creationId xmlns:a16="http://schemas.microsoft.com/office/drawing/2014/main" id="{A20241D5-7C6B-45F6-9B01-BE455CD8AD0B}"/>
+              </a:ext>
+            </a:extLst>
+          </p:cNvPr>
+          <p:cNvSpPr>
+            <a:spLocks noGrp="1"/>
+          </p:cNvSpPr>
+          <p:nvPr>
+            <p:ph type="title"/>
+          </p:nvPr>
+        </p:nvSpPr>
+        <p:spPr>
+          <a:xfrm>
+            <a:off x="0" y="26902"/>
+            <a:ext cx="7061507" cy="1114425"/>
+          </a:xfrm>
+        </p:spPr>
+        <p:txBody>
+          <a:bodyPr>
+            <a:normAutofit/>
+          </a:bodyPr>
+          <a:lstStyle/>
+          <a:p>
+            <a:r>
+              <a:rPr lang="en-US" dirty="0">
+                <a:latin typeface="Segoe UI" panose="020B0502040204020203" pitchFamily="34" charset="0"/>
+                <a:cs typeface="Segoe UI" panose="020B0502040204020203" pitchFamily="34" charset="0"/>
+              </a:rPr>
+              <a:t>Probabilistic methods</a:t>
+            </a:r>
+          </a:p>
+        </p:txBody>
+      </p:sp>
+      <p:sp>
+        <p:nvSpPr>
+          <p:cNvPr id="4" name="Slide Number Placeholder 3">
+            <a:extLst>
+              <a:ext uri="{FF2B5EF4-FFF2-40B4-BE49-F238E27FC236}">
+                <a16:creationId xmlns:a16="http://schemas.microsoft.com/office/drawing/2014/main" id="{0FD64D78-A03B-45A9-9177-047825E632C0}"/>
+              </a:ext>
+            </a:extLst>
+          </p:cNvPr>
+          <p:cNvSpPr>
+            <a:spLocks noGrp="1"/>
+          </p:cNvSpPr>
+          <p:nvPr>
+            <p:ph type="sldNum" sz="quarter" idx="4"/>
+          </p:nvPr>
+        </p:nvSpPr>
+        <p:spPr>
+          <a:xfrm>
+            <a:off x="6143105" y="6365195"/>
+            <a:ext cx="2841321" cy="365125"/>
+          </a:xfrm>
+        </p:spPr>
+        <p:txBody>
+          <a:bodyPr/>
+          <a:lstStyle/>
+          <a:p>
+            <a:r>
+              <a:rPr lang="en-US" sz="1200" dirty="0">
+                <a:latin typeface="Segoe UI" panose="020B0502040204020203" pitchFamily="34" charset="0"/>
+                <a:cs typeface="Segoe UI" panose="020B0502040204020203" pitchFamily="34" charset="0"/>
+              </a:rPr>
+              <a:t>UAV Route Planning Strategies – 6/13</a:t>
+            </a:r>
+          </a:p>
+        </p:txBody>
+      </p:sp>
+      <p:sp>
+        <p:nvSpPr>
+          <p:cNvPr id="6" name="CasellaDiTesto 5">
+            <a:extLst>
+              <a:ext uri="{FF2B5EF4-FFF2-40B4-BE49-F238E27FC236}">
+                <a16:creationId xmlns:a16="http://schemas.microsoft.com/office/drawing/2014/main" id="{0C3825A1-BC2D-A575-E5DA-F3AAE95E3E9E}"/>
+              </a:ext>
+            </a:extLst>
+          </p:cNvPr>
+          <p:cNvSpPr txBox="1"/>
+          <p:nvPr/>
+        </p:nvSpPr>
+        <p:spPr>
+          <a:xfrm>
+            <a:off x="262647" y="1391055"/>
+            <a:ext cx="8528062" cy="400110"/>
+          </a:xfrm>
+          <a:prstGeom prst="rect">
+            <a:avLst/>
+          </a:prstGeom>
+          <a:noFill/>
+        </p:spPr>
+        <p:txBody>
+          <a:bodyPr wrap="square" rtlCol="0">
+            <a:spAutoFit/>
+          </a:bodyPr>
+          <a:lstStyle/>
+          <a:p>
+            <a:pPr marL="342900" indent="-342900">
+              <a:spcAft>
+                <a:spcPts val="500"/>
+              </a:spcAft>
+              <a:buFont typeface="Arial" panose="020B0604020202020204" pitchFamily="34" charset="0"/>
+              <a:buChar char="•"/>
+            </a:pPr>
+            <a:r>
+              <a:rPr lang="it-IT" sz="2000" dirty="0">
+                <a:latin typeface="Segoe UI" panose="020B0502040204020203" pitchFamily="34" charset="0"/>
+                <a:cs typeface="Segoe UI" panose="020B0502040204020203" pitchFamily="34" charset="0"/>
+              </a:rPr>
+              <a:t>aa</a:t>
+            </a:r>
+          </a:p>
+        </p:txBody>
+      </p:sp>
+      <p:pic>
+        <p:nvPicPr>
+          <p:cNvPr id="5" name="Immagine 4" descr="Immagine che contiene schizzo, arte, Simmetria, Arti creative&#10;&#10;Descrizione generata automaticamente">
+            <a:extLst>
+              <a:ext uri="{FF2B5EF4-FFF2-40B4-BE49-F238E27FC236}">
+                <a16:creationId xmlns:a16="http://schemas.microsoft.com/office/drawing/2014/main" id="{90466893-DE8A-8282-49F5-D1F1BDA52A01}"/>
+              </a:ext>
+            </a:extLst>
+          </p:cNvPr>
+          <p:cNvPicPr>
+            <a:picLocks noChangeAspect="1"/>
+          </p:cNvPicPr>
+          <p:nvPr/>
+        </p:nvPicPr>
+        <p:blipFill>
+          <a:blip r:embed="rId2">
+            <a:extLst>
+              <a:ext uri="{28A0092B-C50C-407E-A947-70E740481C1C}">
+                <a14:useLocalDpi xmlns:a14="http://schemas.microsoft.com/office/drawing/2010/main" val="0"/>
+              </a:ext>
+            </a:extLst>
+          </a:blip>
+          <a:stretch>
+            <a:fillRect/>
+          </a:stretch>
+        </p:blipFill>
+        <p:spPr>
+          <a:xfrm>
+            <a:off x="5353241" y="2195150"/>
+            <a:ext cx="2905041" cy="2638004"/>
+          </a:xfrm>
+          <a:prstGeom prst="rect">
+            <a:avLst/>
+          </a:prstGeom>
+        </p:spPr>
+      </p:pic>
+      <p:sp>
+        <p:nvSpPr>
+          <p:cNvPr id="7" name="CasellaDiTesto 6">
+            <a:extLst>
+              <a:ext uri="{FF2B5EF4-FFF2-40B4-BE49-F238E27FC236}">
+                <a16:creationId xmlns:a16="http://schemas.microsoft.com/office/drawing/2014/main" id="{1F15D23C-26FE-8D08-D7C1-13B0D7CFEA09}"/>
+              </a:ext>
+            </a:extLst>
+          </p:cNvPr>
+          <p:cNvSpPr txBox="1"/>
+          <p:nvPr/>
+        </p:nvSpPr>
+        <p:spPr>
+          <a:xfrm>
+            <a:off x="5416961" y="5097613"/>
+            <a:ext cx="2841321" cy="738664"/>
+          </a:xfrm>
+          <a:prstGeom prst="rect">
+            <a:avLst/>
+          </a:prstGeom>
+          <a:noFill/>
+        </p:spPr>
+        <p:txBody>
+          <a:bodyPr wrap="square" rtlCol="0">
+            <a:spAutoFit/>
+          </a:bodyPr>
+          <a:lstStyle/>
+          <a:p>
+            <a:pPr algn="ctr"/>
+            <a:r>
+              <a:rPr lang="it-IT" sz="1400" dirty="0"/>
+              <a:t>Reference: </a:t>
+            </a:r>
+            <a:r>
+              <a:rPr lang="it-IT" sz="1400" dirty="0">
+                <a:hlinkClick r:id="rId3"/>
+              </a:rPr>
+              <a:t>https://www.sciencedirect.com/science/article/pii/S0140366419308539</a:t>
+            </a:r>
+            <a:r>
+              <a:rPr lang="it-IT" sz="1400" dirty="0"/>
+              <a:t> </a:t>
+            </a:r>
+          </a:p>
+        </p:txBody>
+      </p:sp>
+    </p:spTree>
+    <p:extLst>
+      <p:ext uri="{BB962C8B-B14F-4D97-AF65-F5344CB8AC3E}">
+        <p14:creationId xmlns:p14="http://schemas.microsoft.com/office/powerpoint/2010/main" val="2621752494"/>
+      </p:ext>
+    </p:extLst>
+  </p:cSld>
+  <p:clrMapOvr>
+    <a:masterClrMapping/>
+  </p:clrMapOvr>
+</p:sld>
+</file>
+
+<file path=ppt/slides/slide7.xml><?xml version="1.0" encoding="utf-8"?>
+<p:sld xmlns:a="http://schemas.openxmlformats.org/drawingml/2006/main" xmlns:r="http://schemas.openxmlformats.org/officeDocument/2006/relationships" xmlns:p="http://schemas.openxmlformats.org/presentationml/2006/main">
+  <p:cSld>
+    <p:spTree>
+      <p:nvGrpSpPr>
+        <p:cNvPr id="1" name=""/>
+        <p:cNvGrpSpPr/>
+        <p:nvPr/>
+      </p:nvGrpSpPr>
+      <p:grpSpPr>
+        <a:xfrm>
+          <a:off x="0" y="0"/>
+          <a:ext cx="0" cy="0"/>
+          <a:chOff x="0" y="0"/>
+          <a:chExt cx="0" cy="0"/>
+        </a:xfrm>
+      </p:grpSpPr>
+      <p:sp>
+        <p:nvSpPr>
+          <p:cNvPr id="2" name="Title 1">
+            <a:extLst>
+              <a:ext uri="{FF2B5EF4-FFF2-40B4-BE49-F238E27FC236}">
+                <a16:creationId xmlns:a16="http://schemas.microsoft.com/office/drawing/2014/main" id="{A20241D5-7C6B-45F6-9B01-BE455CD8AD0B}"/>
+              </a:ext>
+            </a:extLst>
+          </p:cNvPr>
+          <p:cNvSpPr>
+            <a:spLocks noGrp="1"/>
+          </p:cNvSpPr>
+          <p:nvPr>
+            <p:ph type="title"/>
+          </p:nvPr>
+        </p:nvSpPr>
+        <p:spPr>
+          <a:xfrm>
+            <a:off x="0" y="26902"/>
+            <a:ext cx="7061507" cy="1114425"/>
+          </a:xfrm>
+        </p:spPr>
+        <p:txBody>
+          <a:bodyPr>
+            <a:normAutofit/>
+          </a:bodyPr>
+          <a:lstStyle/>
+          <a:p>
+            <a:r>
+              <a:rPr lang="en-US" dirty="0">
+                <a:latin typeface="Segoe UI" panose="020B0502040204020203" pitchFamily="34" charset="0"/>
+                <a:cs typeface="Segoe UI" panose="020B0502040204020203" pitchFamily="34" charset="0"/>
+              </a:rPr>
+              <a:t>Nature-inspired algorithms</a:t>
+            </a:r>
+          </a:p>
+        </p:txBody>
+      </p:sp>
+      <p:sp>
+        <p:nvSpPr>
+          <p:cNvPr id="4" name="Slide Number Placeholder 3">
+            <a:extLst>
+              <a:ext uri="{FF2B5EF4-FFF2-40B4-BE49-F238E27FC236}">
+                <a16:creationId xmlns:a16="http://schemas.microsoft.com/office/drawing/2014/main" id="{0FD64D78-A03B-45A9-9177-047825E632C0}"/>
+              </a:ext>
+            </a:extLst>
+          </p:cNvPr>
+          <p:cNvSpPr>
+            <a:spLocks noGrp="1"/>
+          </p:cNvSpPr>
+          <p:nvPr>
+            <p:ph type="sldNum" sz="quarter" idx="4"/>
+          </p:nvPr>
+        </p:nvSpPr>
+        <p:spPr>
+          <a:xfrm>
+            <a:off x="6143105" y="6365195"/>
+            <a:ext cx="2841321" cy="365125"/>
+          </a:xfrm>
+        </p:spPr>
+        <p:txBody>
+          <a:bodyPr/>
+          <a:lstStyle/>
+          <a:p>
+            <a:r>
+              <a:rPr lang="en-US" sz="1200" dirty="0">
+                <a:latin typeface="Segoe UI" panose="020B0502040204020203" pitchFamily="34" charset="0"/>
+                <a:cs typeface="Segoe UI" panose="020B0502040204020203" pitchFamily="34" charset="0"/>
+              </a:rPr>
+              <a:t>UAV Route Planning Strategies – 7/13</a:t>
+            </a:r>
+          </a:p>
+        </p:txBody>
+      </p:sp>
+      <p:sp>
+        <p:nvSpPr>
+          <p:cNvPr id="6" name="CasellaDiTesto 5">
+            <a:extLst>
+              <a:ext uri="{FF2B5EF4-FFF2-40B4-BE49-F238E27FC236}">
+                <a16:creationId xmlns:a16="http://schemas.microsoft.com/office/drawing/2014/main" id="{0C3825A1-BC2D-A575-E5DA-F3AAE95E3E9E}"/>
+              </a:ext>
+            </a:extLst>
+          </p:cNvPr>
+          <p:cNvSpPr txBox="1"/>
+          <p:nvPr/>
+        </p:nvSpPr>
+        <p:spPr>
+          <a:xfrm>
+            <a:off x="262647" y="1391055"/>
+            <a:ext cx="8528062" cy="400110"/>
+          </a:xfrm>
+          <a:prstGeom prst="rect">
+            <a:avLst/>
+          </a:prstGeom>
+          <a:noFill/>
+        </p:spPr>
+        <p:txBody>
+          <a:bodyPr wrap="square" rtlCol="0">
+            <a:spAutoFit/>
+          </a:bodyPr>
+          <a:lstStyle/>
+          <a:p>
+            <a:pPr marL="342900" indent="-342900">
+              <a:spcAft>
+                <a:spcPts val="500"/>
+              </a:spcAft>
+              <a:buFont typeface="Arial" panose="020B0604020202020204" pitchFamily="34" charset="0"/>
+              <a:buChar char="•"/>
+            </a:pPr>
+            <a:r>
+              <a:rPr lang="it-IT" sz="2000" dirty="0">
+                <a:latin typeface="Segoe UI" panose="020B0502040204020203" pitchFamily="34" charset="0"/>
+                <a:cs typeface="Segoe UI" panose="020B0502040204020203" pitchFamily="34" charset="0"/>
+              </a:rPr>
+              <a:t>aa</a:t>
+            </a:r>
+          </a:p>
+        </p:txBody>
+      </p:sp>
+    </p:spTree>
+    <p:extLst>
+      <p:ext uri="{BB962C8B-B14F-4D97-AF65-F5344CB8AC3E}">
+        <p14:creationId xmlns:p14="http://schemas.microsoft.com/office/powerpoint/2010/main" val="1410576495"/>
+      </p:ext>
+    </p:extLst>
+  </p:cSld>
+  <p:clrMapOvr>
+    <a:masterClrMapping/>
+  </p:clrMapOvr>
+</p:sld>
+</file>
+
+<file path=ppt/slides/slide8.xml><?xml version="1.0" encoding="utf-8"?>
+<p:sld xmlns:a="http://schemas.openxmlformats.org/drawingml/2006/main" xmlns:r="http://schemas.openxmlformats.org/officeDocument/2006/relationships" xmlns:p="http://schemas.openxmlformats.org/presentationml/2006/main">
+  <p:cSld>
+    <p:spTree>
+      <p:nvGrpSpPr>
+        <p:cNvPr id="1" name=""/>
+        <p:cNvGrpSpPr/>
+        <p:nvPr/>
+      </p:nvGrpSpPr>
+      <p:grpSpPr>
+        <a:xfrm>
+          <a:off x="0" y="0"/>
+          <a:ext cx="0" cy="0"/>
+          <a:chOff x="0" y="0"/>
+          <a:chExt cx="0" cy="0"/>
+        </a:xfrm>
+      </p:grpSpPr>
+      <p:sp>
+        <p:nvSpPr>
+          <p:cNvPr id="2" name="Title 1">
+            <a:extLst>
+              <a:ext uri="{FF2B5EF4-FFF2-40B4-BE49-F238E27FC236}">
+                <a16:creationId xmlns:a16="http://schemas.microsoft.com/office/drawing/2014/main" id="{A20241D5-7C6B-45F6-9B01-BE455CD8AD0B}"/>
+              </a:ext>
+            </a:extLst>
+          </p:cNvPr>
+          <p:cNvSpPr>
+            <a:spLocks noGrp="1"/>
+          </p:cNvSpPr>
+          <p:nvPr>
+            <p:ph type="title"/>
+          </p:nvPr>
+        </p:nvSpPr>
+        <p:spPr>
+          <a:xfrm>
+            <a:off x="0" y="26902"/>
+            <a:ext cx="7061507" cy="1114425"/>
+          </a:xfrm>
+        </p:spPr>
+        <p:txBody>
+          <a:bodyPr>
+            <a:normAutofit/>
+          </a:bodyPr>
+          <a:lstStyle/>
+          <a:p>
+            <a:r>
+              <a:rPr lang="en-US" dirty="0">
+                <a:latin typeface="Segoe UI" panose="020B0502040204020203" pitchFamily="34" charset="0"/>
+                <a:cs typeface="Segoe UI" panose="020B0502040204020203" pitchFamily="34" charset="0"/>
+              </a:rPr>
+              <a:t>Multi-UAV coordination</a:t>
+            </a:r>
+          </a:p>
+        </p:txBody>
+      </p:sp>
+      <p:sp>
+        <p:nvSpPr>
+          <p:cNvPr id="4" name="Slide Number Placeholder 3">
+            <a:extLst>
+              <a:ext uri="{FF2B5EF4-FFF2-40B4-BE49-F238E27FC236}">
+                <a16:creationId xmlns:a16="http://schemas.microsoft.com/office/drawing/2014/main" id="{0FD64D78-A03B-45A9-9177-047825E632C0}"/>
+              </a:ext>
+            </a:extLst>
+          </p:cNvPr>
+          <p:cNvSpPr>
+            <a:spLocks noGrp="1"/>
+          </p:cNvSpPr>
+          <p:nvPr>
+            <p:ph type="sldNum" sz="quarter" idx="4"/>
+          </p:nvPr>
+        </p:nvSpPr>
+        <p:spPr>
+          <a:xfrm>
+            <a:off x="6143105" y="6365195"/>
+            <a:ext cx="2841321" cy="365125"/>
+          </a:xfrm>
+        </p:spPr>
+        <p:txBody>
+          <a:bodyPr/>
+          <a:lstStyle/>
+          <a:p>
+            <a:r>
+              <a:rPr lang="en-US" sz="1200" dirty="0">
+                <a:latin typeface="Segoe UI" panose="020B0502040204020203" pitchFamily="34" charset="0"/>
+                <a:cs typeface="Segoe UI" panose="020B0502040204020203" pitchFamily="34" charset="0"/>
+              </a:rPr>
+              <a:t>UAV Route Planning Strategies – 8/13</a:t>
+            </a:r>
+          </a:p>
+        </p:txBody>
+      </p:sp>
+      <p:sp>
+        <p:nvSpPr>
+          <p:cNvPr id="6" name="CasellaDiTesto 5">
+            <a:extLst>
+              <a:ext uri="{FF2B5EF4-FFF2-40B4-BE49-F238E27FC236}">
+                <a16:creationId xmlns:a16="http://schemas.microsoft.com/office/drawing/2014/main" id="{0C3825A1-BC2D-A575-E5DA-F3AAE95E3E9E}"/>
+              </a:ext>
+            </a:extLst>
+          </p:cNvPr>
+          <p:cNvSpPr txBox="1"/>
+          <p:nvPr/>
+        </p:nvSpPr>
+        <p:spPr>
+          <a:xfrm>
+            <a:off x="262647" y="1391055"/>
+            <a:ext cx="8528062" cy="400110"/>
+          </a:xfrm>
+          <a:prstGeom prst="rect">
+            <a:avLst/>
+          </a:prstGeom>
+          <a:noFill/>
+        </p:spPr>
+        <p:txBody>
+          <a:bodyPr wrap="square" rtlCol="0">
+            <a:spAutoFit/>
+          </a:bodyPr>
+          <a:lstStyle/>
+          <a:p>
+            <a:pPr marL="342900" indent="-342900">
+              <a:spcAft>
+                <a:spcPts val="500"/>
+              </a:spcAft>
+              <a:buFont typeface="Arial" panose="020B0604020202020204" pitchFamily="34" charset="0"/>
+              <a:buChar char="•"/>
+            </a:pPr>
+            <a:r>
+              <a:rPr lang="it-IT" sz="2000" dirty="0">
+                <a:latin typeface="Segoe UI" panose="020B0502040204020203" pitchFamily="34" charset="0"/>
+                <a:cs typeface="Segoe UI" panose="020B0502040204020203" pitchFamily="34" charset="0"/>
+              </a:rPr>
+              <a:t>aa</a:t>
+            </a:r>
+          </a:p>
+        </p:txBody>
+      </p:sp>
+    </p:spTree>
+    <p:extLst>
+      <p:ext uri="{BB962C8B-B14F-4D97-AF65-F5344CB8AC3E}">
+        <p14:creationId xmlns:p14="http://schemas.microsoft.com/office/powerpoint/2010/main" val="4154783693"/>
+      </p:ext>
+    </p:extLst>
+  </p:cSld>
+  <p:clrMapOvr>
+    <a:masterClrMapping/>
+  </p:clrMapOvr>
+</p:sld>
+</file>
+
+<file path=ppt/slides/slide9.xml><?xml version="1.0" encoding="utf-8"?>
+<p:sld xmlns:a="http://schemas.openxmlformats.org/drawingml/2006/main" xmlns:r="http://schemas.openxmlformats.org/officeDocument/2006/relationships" xmlns:p="http://schemas.openxmlformats.org/presentationml/2006/main">
+  <p:cSld>
+    <p:spTree>
+      <p:nvGrpSpPr>
+        <p:cNvPr id="1" name=""/>
+        <p:cNvGrpSpPr/>
+        <p:nvPr/>
+      </p:nvGrpSpPr>
+      <p:grpSpPr>
+        <a:xfrm>
+          <a:off x="0" y="0"/>
+          <a:ext cx="0" cy="0"/>
+          <a:chOff x="0" y="0"/>
+          <a:chExt cx="0" cy="0"/>
+        </a:xfrm>
+      </p:grpSpPr>
+      <p:sp>
+        <p:nvSpPr>
+          <p:cNvPr id="2" name="Title 1">
+            <a:extLst>
+              <a:ext uri="{FF2B5EF4-FFF2-40B4-BE49-F238E27FC236}">
+                <a16:creationId xmlns:a16="http://schemas.microsoft.com/office/drawing/2014/main" id="{A20241D5-7C6B-45F6-9B01-BE455CD8AD0B}"/>
+              </a:ext>
+            </a:extLst>
+          </p:cNvPr>
+          <p:cNvSpPr>
+            <a:spLocks noGrp="1"/>
+          </p:cNvSpPr>
+          <p:nvPr>
+            <p:ph type="title"/>
+          </p:nvPr>
+        </p:nvSpPr>
+        <p:spPr>
+          <a:xfrm>
+            <a:off x="0" y="26902"/>
+            <a:ext cx="7061507" cy="1114425"/>
+          </a:xfrm>
+        </p:spPr>
+        <p:txBody>
+          <a:bodyPr>
+            <a:noAutofit/>
+          </a:bodyPr>
+          <a:lstStyle/>
+          <a:p>
+            <a:r>
+              <a:rPr lang="en-US" sz="3600" dirty="0">
+                <a:latin typeface="Segoe UI" panose="020B0502040204020203" pitchFamily="34" charset="0"/>
+                <a:cs typeface="Segoe UI" panose="020B0502040204020203" pitchFamily="34" charset="0"/>
+              </a:rPr>
+              <a:t>Environment-specific approaches</a:t>
+            </a:r>
+          </a:p>
+        </p:txBody>
+      </p:sp>
+      <p:sp>
+        <p:nvSpPr>
+          <p:cNvPr id="4" name="Slide Number Placeholder 3">
+            <a:extLst>
+              <a:ext uri="{FF2B5EF4-FFF2-40B4-BE49-F238E27FC236}">
+                <a16:creationId xmlns:a16="http://schemas.microsoft.com/office/drawing/2014/main" id="{0FD64D78-A03B-45A9-9177-047825E632C0}"/>
+              </a:ext>
+            </a:extLst>
+          </p:cNvPr>
+          <p:cNvSpPr>
+            <a:spLocks noGrp="1"/>
+          </p:cNvSpPr>
+          <p:nvPr>
+            <p:ph type="sldNum" sz="quarter" idx="4"/>
+          </p:nvPr>
+        </p:nvSpPr>
+        <p:spPr>
+          <a:xfrm>
+            <a:off x="6143105" y="6365195"/>
+            <a:ext cx="2841321" cy="365125"/>
+          </a:xfrm>
+        </p:spPr>
+        <p:txBody>
+          <a:bodyPr/>
+          <a:lstStyle/>
+          <a:p>
+            <a:r>
+              <a:rPr lang="en-US" sz="1200" dirty="0">
+                <a:latin typeface="Segoe UI" panose="020B0502040204020203" pitchFamily="34" charset="0"/>
+                <a:cs typeface="Segoe UI" panose="020B0502040204020203" pitchFamily="34" charset="0"/>
+              </a:rPr>
+              <a:t>UAV Route Planning Strategies – 9/13</a:t>
+            </a:r>
+          </a:p>
+        </p:txBody>
+      </p:sp>
+      <p:sp>
+        <p:nvSpPr>
+          <p:cNvPr id="6" name="CasellaDiTesto 5">
+            <a:extLst>
+              <a:ext uri="{FF2B5EF4-FFF2-40B4-BE49-F238E27FC236}">
+                <a16:creationId xmlns:a16="http://schemas.microsoft.com/office/drawing/2014/main" id="{0C3825A1-BC2D-A575-E5DA-F3AAE95E3E9E}"/>
+              </a:ext>
+            </a:extLst>
+          </p:cNvPr>
+          <p:cNvSpPr txBox="1"/>
+          <p:nvPr/>
+        </p:nvSpPr>
+        <p:spPr>
+          <a:xfrm>
+            <a:off x="262647" y="1391055"/>
+            <a:ext cx="8528062" cy="400110"/>
+          </a:xfrm>
+          <a:prstGeom prst="rect">
+            <a:avLst/>
+          </a:prstGeom>
+          <a:noFill/>
+        </p:spPr>
+        <p:txBody>
+          <a:bodyPr wrap="square" rtlCol="0">
+            <a:spAutoFit/>
+          </a:bodyPr>
+          <a:lstStyle/>
+          <a:p>
+            <a:pPr marL="342900" indent="-342900">
+              <a:spcAft>
+                <a:spcPts val="500"/>
+              </a:spcAft>
+              <a:buFont typeface="Arial" panose="020B0604020202020204" pitchFamily="34" charset="0"/>
+              <a:buChar char="•"/>
+            </a:pPr>
+            <a:r>
+              <a:rPr lang="it-IT" sz="2000" dirty="0">
+                <a:latin typeface="Segoe UI" panose="020B0502040204020203" pitchFamily="34" charset="0"/>
+                <a:cs typeface="Segoe UI" panose="020B0502040204020203" pitchFamily="34" charset="0"/>
+              </a:rPr>
+              <a:t>aa</a:t>
+            </a:r>
+          </a:p>
+        </p:txBody>
+      </p:sp>
+    </p:spTree>
+    <p:extLst>
+      <p:ext uri="{BB962C8B-B14F-4D97-AF65-F5344CB8AC3E}">
+        <p14:creationId xmlns:p14="http://schemas.microsoft.com/office/powerpoint/2010/main" val="324707415"/>
       </p:ext>
     </p:extLst>
   </p:cSld>

</xml_diff>

<commit_message>
Yesterday - All my troubles seemed so far away
</commit_message>
<xml_diff>
--- a/2 - Slides/UAV Route Planning Strategies.pptx
+++ b/2 - Slides/UAV Route Planning Strategies.pptx
@@ -5,7 +5,7 @@
     <p:sldMasterId id="2147483660" r:id="rId1"/>
   </p:sldMasterIdLst>
   <p:notesMasterIdLst>
-    <p:notesMasterId r:id="rId18"/>
+    <p:notesMasterId r:id="rId22"/>
   </p:notesMasterIdLst>
   <p:sldIdLst>
     <p:sldId id="256" r:id="rId2"/>
@@ -18,12 +18,16 @@
     <p:sldId id="271" r:id="rId9"/>
     <p:sldId id="263" r:id="rId10"/>
     <p:sldId id="272" r:id="rId11"/>
-    <p:sldId id="264" r:id="rId12"/>
-    <p:sldId id="265" r:id="rId13"/>
-    <p:sldId id="266" r:id="rId14"/>
-    <p:sldId id="267" r:id="rId15"/>
-    <p:sldId id="268" r:id="rId16"/>
-    <p:sldId id="269" r:id="rId17"/>
+    <p:sldId id="273" r:id="rId12"/>
+    <p:sldId id="264" r:id="rId13"/>
+    <p:sldId id="265" r:id="rId14"/>
+    <p:sldId id="274" r:id="rId15"/>
+    <p:sldId id="266" r:id="rId16"/>
+    <p:sldId id="275" r:id="rId17"/>
+    <p:sldId id="276" r:id="rId18"/>
+    <p:sldId id="267" r:id="rId19"/>
+    <p:sldId id="268" r:id="rId20"/>
+    <p:sldId id="269" r:id="rId21"/>
   </p:sldIdLst>
   <p:sldSz cx="9144000" cy="6858000" type="screen4x3"/>
   <p:notesSz cx="6858000" cy="9144000"/>
@@ -212,7 +216,7 @@
           <a:p>
             <a:fld id="{0E4AAC6D-2322-45B9-8ECA-34DF280B0776}" type="datetimeFigureOut">
               <a:rPr lang="en-US" smtClean="0"/>
-              <a:t>9/10/2024</a:t>
+              <a:t>9/11/2024</a:t>
             </a:fld>
             <a:endParaRPr lang="en-US"/>
           </a:p>
@@ -1982,8 +1986,149 @@
                 <a:latin typeface="Segoe UI" panose="020B0502040204020203" pitchFamily="34" charset="0"/>
                 <a:cs typeface="Segoe UI" panose="020B0502040204020203" pitchFamily="34" charset="0"/>
               </a:rPr>
-              <a:t>UAV Route Planning Strategies – 7/13</a:t>
-            </a:r>
+              <a:t>UAV Route Planning Strategies – 10/13</a:t>
+            </a:r>
+          </a:p>
+        </p:txBody>
+      </p:sp>
+      <p:pic>
+        <p:nvPicPr>
+          <p:cNvPr id="7" name="Immagine 6">
+            <a:extLst>
+              <a:ext uri="{FF2B5EF4-FFF2-40B4-BE49-F238E27FC236}">
+                <a16:creationId xmlns:a16="http://schemas.microsoft.com/office/drawing/2014/main" id="{56434B26-66B8-652B-3920-76D0EA2DF7A7}"/>
+              </a:ext>
+            </a:extLst>
+          </p:cNvPr>
+          <p:cNvPicPr>
+            <a:picLocks noChangeAspect="1"/>
+          </p:cNvPicPr>
+          <p:nvPr/>
+        </p:nvPicPr>
+        <p:blipFill>
+          <a:blip r:embed="rId2"/>
+          <a:stretch>
+            <a:fillRect/>
+          </a:stretch>
+        </p:blipFill>
+        <p:spPr>
+          <a:xfrm>
+            <a:off x="976516" y="1141327"/>
+            <a:ext cx="3358880" cy="2463706"/>
+          </a:xfrm>
+          <a:prstGeom prst="rect">
+            <a:avLst/>
+          </a:prstGeom>
+        </p:spPr>
+      </p:pic>
+      <p:pic>
+        <p:nvPicPr>
+          <p:cNvPr id="9" name="Immagine 8">
+            <a:extLst>
+              <a:ext uri="{FF2B5EF4-FFF2-40B4-BE49-F238E27FC236}">
+                <a16:creationId xmlns:a16="http://schemas.microsoft.com/office/drawing/2014/main" id="{DFD28764-3659-E88B-BB29-4C5F751AE3D2}"/>
+              </a:ext>
+            </a:extLst>
+          </p:cNvPr>
+          <p:cNvPicPr>
+            <a:picLocks noChangeAspect="1"/>
+          </p:cNvPicPr>
+          <p:nvPr/>
+        </p:nvPicPr>
+        <p:blipFill>
+          <a:blip r:embed="rId3"/>
+          <a:stretch>
+            <a:fillRect/>
+          </a:stretch>
+        </p:blipFill>
+        <p:spPr>
+          <a:xfrm>
+            <a:off x="739912" y="3799626"/>
+            <a:ext cx="3832088" cy="2253126"/>
+          </a:xfrm>
+          <a:prstGeom prst="rect">
+            <a:avLst/>
+          </a:prstGeom>
+        </p:spPr>
+      </p:pic>
+      <p:pic>
+        <p:nvPicPr>
+          <p:cNvPr id="11" name="Immagine 10">
+            <a:extLst>
+              <a:ext uri="{FF2B5EF4-FFF2-40B4-BE49-F238E27FC236}">
+                <a16:creationId xmlns:a16="http://schemas.microsoft.com/office/drawing/2014/main" id="{9BFF1267-AA68-A636-4956-8270CD00CB75}"/>
+              </a:ext>
+            </a:extLst>
+          </p:cNvPr>
+          <p:cNvPicPr>
+            <a:picLocks noChangeAspect="1"/>
+          </p:cNvPicPr>
+          <p:nvPr/>
+        </p:nvPicPr>
+        <p:blipFill>
+          <a:blip r:embed="rId4"/>
+          <a:stretch>
+            <a:fillRect/>
+          </a:stretch>
+        </p:blipFill>
+        <p:spPr>
+          <a:xfrm>
+            <a:off x="5084567" y="2140176"/>
+            <a:ext cx="3523169" cy="2929713"/>
+          </a:xfrm>
+          <a:prstGeom prst="rect">
+            <a:avLst/>
+          </a:prstGeom>
+        </p:spPr>
+      </p:pic>
+      <p:sp>
+        <p:nvSpPr>
+          <p:cNvPr id="12" name="CasellaDiTesto 11">
+            <a:extLst>
+              <a:ext uri="{FF2B5EF4-FFF2-40B4-BE49-F238E27FC236}">
+                <a16:creationId xmlns:a16="http://schemas.microsoft.com/office/drawing/2014/main" id="{5EC8DD06-9F2C-8F62-A9D5-B4CB73D16FDD}"/>
+              </a:ext>
+            </a:extLst>
+          </p:cNvPr>
+          <p:cNvSpPr txBox="1"/>
+          <p:nvPr/>
+        </p:nvSpPr>
+        <p:spPr>
+          <a:xfrm>
+            <a:off x="5295363" y="5348210"/>
+            <a:ext cx="3532287" cy="738664"/>
+          </a:xfrm>
+          <a:prstGeom prst="rect">
+            <a:avLst/>
+          </a:prstGeom>
+          <a:noFill/>
+        </p:spPr>
+        <p:txBody>
+          <a:bodyPr wrap="square" rtlCol="0">
+            <a:spAutoFit/>
+          </a:bodyPr>
+          <a:lstStyle/>
+          <a:p>
+            <a:pPr algn="ctr"/>
+            <a:r>
+              <a:rPr lang="it-IT" sz="1400" dirty="0"/>
+              <a:t>Reference: </a:t>
+            </a:r>
+            <a:r>
+              <a:rPr lang="it-IT" sz="1400" dirty="0">
+                <a:hlinkClick r:id="rId5"/>
+              </a:rPr>
+              <a:t>Path Planning of UAV Based on Improved Adaptive Grey Wolf Optimization Algorithm</a:t>
+            </a:r>
+            <a:r>
+              <a:rPr lang="it-IT" sz="1400" dirty="0"/>
+              <a:t> </a:t>
+            </a:r>
+            <a:r>
+              <a:rPr lang="en-US" sz="1400" dirty="0"/>
+              <a:t>– (Paper 4)</a:t>
+            </a:r>
+            <a:endParaRPr lang="it-IT" sz="1400" dirty="0"/>
           </a:p>
         </p:txBody>
       </p:sp>
@@ -2086,7 +2231,7 @@
                 <a:latin typeface="Segoe UI" panose="020B0502040204020203" pitchFamily="34" charset="0"/>
                 <a:cs typeface="Segoe UI" panose="020B0502040204020203" pitchFamily="34" charset="0"/>
               </a:rPr>
-              <a:t>UAV Route Planning Strategies – 8/13</a:t>
+              <a:t>UAV Route Planning Strategies – 11/13</a:t>
             </a:r>
           </a:p>
         </p:txBody>
@@ -2106,7 +2251,7 @@
         <p:spPr>
           <a:xfrm>
             <a:off x="262647" y="1391055"/>
-            <a:ext cx="8528062" cy="400110"/>
+            <a:ext cx="8528062" cy="4862870"/>
           </a:xfrm>
           <a:prstGeom prst="rect">
             <a:avLst/>
@@ -2127,11 +2272,320 @@
               <a:buChar char="•"/>
             </a:pPr>
             <a:r>
-              <a:rPr lang="it-IT" sz="2000" dirty="0">
-                <a:latin typeface="Segoe UI" panose="020B0502040204020203" pitchFamily="34" charset="0"/>
-                <a:cs typeface="Segoe UI" panose="020B0502040204020203" pitchFamily="34" charset="0"/>
-              </a:rPr>
-              <a:t>aa</a:t>
+              <a:rPr lang="it-IT" sz="2000" b="1" dirty="0">
+                <a:latin typeface="Segoe UI" panose="020B0502040204020203" pitchFamily="34" charset="0"/>
+                <a:cs typeface="Segoe UI" panose="020B0502040204020203" pitchFamily="34" charset="0"/>
+              </a:rPr>
+              <a:t>Extended from single-agent to multi-agent planning</a:t>
+            </a:r>
+          </a:p>
+          <a:p>
+            <a:pPr marL="800100" lvl="1" indent="-342900">
+              <a:spcAft>
+                <a:spcPts val="500"/>
+              </a:spcAft>
+              <a:buFont typeface="Arial" panose="020B0604020202020204" pitchFamily="34" charset="0"/>
+              <a:buChar char="•"/>
+            </a:pPr>
+            <a:r>
+              <a:rPr lang="it-IT" sz="2000" dirty="0">
+                <a:latin typeface="Segoe UI" panose="020B0502040204020203" pitchFamily="34" charset="0"/>
+                <a:cs typeface="Segoe UI" panose="020B0502040204020203" pitchFamily="34" charset="0"/>
+              </a:rPr>
+              <a:t>Multiple Traveling Salesman Problem (MTSP)</a:t>
+            </a:r>
+          </a:p>
+          <a:p>
+            <a:pPr marL="800100" lvl="1" indent="-342900">
+              <a:spcAft>
+                <a:spcPts val="500"/>
+              </a:spcAft>
+              <a:buFont typeface="Arial" panose="020B0604020202020204" pitchFamily="34" charset="0"/>
+              <a:buChar char="•"/>
+            </a:pPr>
+            <a:r>
+              <a:rPr lang="it-IT" sz="2000" dirty="0" err="1">
+                <a:latin typeface="Segoe UI" panose="020B0502040204020203" pitchFamily="34" charset="0"/>
+                <a:cs typeface="Segoe UI" panose="020B0502040204020203" pitchFamily="34" charset="0"/>
+              </a:rPr>
+              <a:t>Vehicle</a:t>
+            </a:r>
+            <a:r>
+              <a:rPr lang="it-IT" sz="2000" dirty="0">
+                <a:latin typeface="Segoe UI" panose="020B0502040204020203" pitchFamily="34" charset="0"/>
+                <a:cs typeface="Segoe UI" panose="020B0502040204020203" pitchFamily="34" charset="0"/>
+              </a:rPr>
+              <a:t> Routing Problem (VRP)</a:t>
+            </a:r>
+          </a:p>
+          <a:p>
+            <a:pPr marL="800100" lvl="1" indent="-342900">
+              <a:spcAft>
+                <a:spcPts val="500"/>
+              </a:spcAft>
+              <a:buFont typeface="Arial" panose="020B0604020202020204" pitchFamily="34" charset="0"/>
+              <a:buChar char="•"/>
+            </a:pPr>
+            <a:endParaRPr lang="it-IT" sz="2000" dirty="0">
+              <a:latin typeface="Segoe UI" panose="020B0502040204020203" pitchFamily="34" charset="0"/>
+              <a:cs typeface="Segoe UI" panose="020B0502040204020203" pitchFamily="34" charset="0"/>
+            </a:endParaRPr>
+          </a:p>
+          <a:p>
+            <a:pPr marL="342900" indent="-342900">
+              <a:spcAft>
+                <a:spcPts val="500"/>
+              </a:spcAft>
+              <a:buFont typeface="Arial" panose="020B0604020202020204" pitchFamily="34" charset="0"/>
+              <a:buChar char="•"/>
+            </a:pPr>
+            <a:r>
+              <a:rPr lang="it-IT" sz="2000" b="1" dirty="0">
+                <a:latin typeface="Segoe UI" panose="020B0502040204020203" pitchFamily="34" charset="0"/>
+                <a:cs typeface="Segoe UI" panose="020B0502040204020203" pitchFamily="34" charset="0"/>
+              </a:rPr>
+              <a:t>Key challenges</a:t>
+            </a:r>
+          </a:p>
+          <a:p>
+            <a:pPr marL="800100" lvl="1" indent="-342900">
+              <a:spcAft>
+                <a:spcPts val="500"/>
+              </a:spcAft>
+              <a:buFont typeface="Arial" panose="020B0604020202020204" pitchFamily="34" charset="0"/>
+              <a:buChar char="•"/>
+            </a:pPr>
+            <a:r>
+              <a:rPr lang="it-IT" sz="2000" dirty="0" err="1">
+                <a:latin typeface="Segoe UI" panose="020B0502040204020203" pitchFamily="34" charset="0"/>
+                <a:cs typeface="Segoe UI" panose="020B0502040204020203" pitchFamily="34" charset="0"/>
+              </a:rPr>
+              <a:t>Grouping</a:t>
+            </a:r>
+            <a:r>
+              <a:rPr lang="it-IT" sz="2000" dirty="0">
+                <a:latin typeface="Segoe UI" panose="020B0502040204020203" pitchFamily="34" charset="0"/>
+                <a:cs typeface="Segoe UI" panose="020B0502040204020203" pitchFamily="34" charset="0"/>
+              </a:rPr>
+              <a:t> and task </a:t>
+            </a:r>
+            <a:r>
+              <a:rPr lang="it-IT" sz="2000" dirty="0" err="1">
+                <a:latin typeface="Segoe UI" panose="020B0502040204020203" pitchFamily="34" charset="0"/>
+                <a:cs typeface="Segoe UI" panose="020B0502040204020203" pitchFamily="34" charset="0"/>
+              </a:rPr>
+              <a:t>allocation</a:t>
+            </a:r>
+            <a:r>
+              <a:rPr lang="it-IT" sz="2000" dirty="0">
+                <a:latin typeface="Segoe UI" panose="020B0502040204020203" pitchFamily="34" charset="0"/>
+                <a:cs typeface="Segoe UI" panose="020B0502040204020203" pitchFamily="34" charset="0"/>
+              </a:rPr>
+              <a:t> among </a:t>
+            </a:r>
+            <a:r>
+              <a:rPr lang="it-IT" sz="2000" dirty="0" err="1">
+                <a:latin typeface="Segoe UI" panose="020B0502040204020203" pitchFamily="34" charset="0"/>
+                <a:cs typeface="Segoe UI" panose="020B0502040204020203" pitchFamily="34" charset="0"/>
+              </a:rPr>
+              <a:t>UAVs</a:t>
+            </a:r>
+            <a:endParaRPr lang="it-IT" sz="2000" dirty="0">
+              <a:latin typeface="Segoe UI" panose="020B0502040204020203" pitchFamily="34" charset="0"/>
+              <a:cs typeface="Segoe UI" panose="020B0502040204020203" pitchFamily="34" charset="0"/>
+            </a:endParaRPr>
+          </a:p>
+          <a:p>
+            <a:pPr marL="800100" lvl="1" indent="-342900">
+              <a:spcAft>
+                <a:spcPts val="500"/>
+              </a:spcAft>
+              <a:buFont typeface="Arial" panose="020B0604020202020204" pitchFamily="34" charset="0"/>
+              <a:buChar char="•"/>
+            </a:pPr>
+            <a:r>
+              <a:rPr lang="it-IT" sz="2000" dirty="0">
+                <a:latin typeface="Segoe UI" panose="020B0502040204020203" pitchFamily="34" charset="0"/>
+                <a:cs typeface="Segoe UI" panose="020B0502040204020203" pitchFamily="34" charset="0"/>
+              </a:rPr>
+              <a:t>Multi-objective </a:t>
+            </a:r>
+            <a:r>
+              <a:rPr lang="it-IT" sz="2000" dirty="0" err="1">
+                <a:latin typeface="Segoe UI" panose="020B0502040204020203" pitchFamily="34" charset="0"/>
+                <a:cs typeface="Segoe UI" panose="020B0502040204020203" pitchFamily="34" charset="0"/>
+              </a:rPr>
+              <a:t>optimization</a:t>
+            </a:r>
+            <a:r>
+              <a:rPr lang="it-IT" sz="2000" dirty="0">
+                <a:latin typeface="Segoe UI" panose="020B0502040204020203" pitchFamily="34" charset="0"/>
+                <a:cs typeface="Segoe UI" panose="020B0502040204020203" pitchFamily="34" charset="0"/>
+              </a:rPr>
+              <a:t> (e.g. distance, energy, risk)</a:t>
+            </a:r>
+          </a:p>
+          <a:p>
+            <a:pPr marL="800100" lvl="1" indent="-342900">
+              <a:spcAft>
+                <a:spcPts val="500"/>
+              </a:spcAft>
+              <a:buFont typeface="Arial" panose="020B0604020202020204" pitchFamily="34" charset="0"/>
+              <a:buChar char="•"/>
+            </a:pPr>
+            <a:r>
+              <a:rPr lang="it-IT" sz="2000" dirty="0">
+                <a:latin typeface="Segoe UI" panose="020B0502040204020203" pitchFamily="34" charset="0"/>
+                <a:cs typeface="Segoe UI" panose="020B0502040204020203" pitchFamily="34" charset="0"/>
+              </a:rPr>
+              <a:t>Dynamic </a:t>
+            </a:r>
+            <a:r>
+              <a:rPr lang="it-IT" sz="2000" dirty="0" err="1">
+                <a:latin typeface="Segoe UI" panose="020B0502040204020203" pitchFamily="34" charset="0"/>
+                <a:cs typeface="Segoe UI" panose="020B0502040204020203" pitchFamily="34" charset="0"/>
+              </a:rPr>
+              <a:t>environments</a:t>
+            </a:r>
+            <a:r>
+              <a:rPr lang="it-IT" sz="2000" dirty="0">
+                <a:latin typeface="Segoe UI" panose="020B0502040204020203" pitchFamily="34" charset="0"/>
+                <a:cs typeface="Segoe UI" panose="020B0502040204020203" pitchFamily="34" charset="0"/>
+              </a:rPr>
+              <a:t> (e.g., </a:t>
+            </a:r>
+            <a:r>
+              <a:rPr lang="it-IT" sz="2000" dirty="0" err="1">
+                <a:latin typeface="Segoe UI" panose="020B0502040204020203" pitchFamily="34" charset="0"/>
+                <a:cs typeface="Segoe UI" panose="020B0502040204020203" pitchFamily="34" charset="0"/>
+              </a:rPr>
+              <a:t>synchronization</a:t>
+            </a:r>
+            <a:r>
+              <a:rPr lang="it-IT" sz="2000" dirty="0">
+                <a:latin typeface="Segoe UI" panose="020B0502040204020203" pitchFamily="34" charset="0"/>
+                <a:cs typeface="Segoe UI" panose="020B0502040204020203" pitchFamily="34" charset="0"/>
+              </a:rPr>
+              <a:t> </a:t>
+            </a:r>
+            <a:r>
+              <a:rPr lang="it-IT" sz="2000" dirty="0" err="1">
+                <a:latin typeface="Segoe UI" panose="020B0502040204020203" pitchFamily="34" charset="0"/>
+                <a:cs typeface="Segoe UI" panose="020B0502040204020203" pitchFamily="34" charset="0"/>
+              </a:rPr>
+              <a:t>precedence</a:t>
+            </a:r>
+            <a:r>
+              <a:rPr lang="it-IT" sz="2000" dirty="0">
+                <a:latin typeface="Segoe UI" panose="020B0502040204020203" pitchFamily="34" charset="0"/>
+                <a:cs typeface="Segoe UI" panose="020B0502040204020203" pitchFamily="34" charset="0"/>
+              </a:rPr>
+              <a:t>)</a:t>
+            </a:r>
+          </a:p>
+          <a:p>
+            <a:pPr marL="800100" lvl="1" indent="-342900">
+              <a:spcAft>
+                <a:spcPts val="500"/>
+              </a:spcAft>
+              <a:buFont typeface="Arial" panose="020B0604020202020204" pitchFamily="34" charset="0"/>
+              <a:buChar char="•"/>
+            </a:pPr>
+            <a:endParaRPr lang="it-IT" sz="2000" dirty="0">
+              <a:latin typeface="Segoe UI" panose="020B0502040204020203" pitchFamily="34" charset="0"/>
+              <a:cs typeface="Segoe UI" panose="020B0502040204020203" pitchFamily="34" charset="0"/>
+            </a:endParaRPr>
+          </a:p>
+          <a:p>
+            <a:pPr marL="342900" indent="-342900">
+              <a:spcAft>
+                <a:spcPts val="500"/>
+              </a:spcAft>
+              <a:buFont typeface="Arial" panose="020B0604020202020204" pitchFamily="34" charset="0"/>
+              <a:buChar char="•"/>
+            </a:pPr>
+            <a:r>
+              <a:rPr lang="it-IT" sz="2000" b="1" dirty="0">
+                <a:latin typeface="Segoe UI" panose="020B0502040204020203" pitchFamily="34" charset="0"/>
+                <a:cs typeface="Segoe UI" panose="020B0502040204020203" pitchFamily="34" charset="0"/>
+              </a:rPr>
+              <a:t>Solution methods</a:t>
+            </a:r>
+          </a:p>
+          <a:p>
+            <a:pPr marL="800100" lvl="1" indent="-342900">
+              <a:spcAft>
+                <a:spcPts val="500"/>
+              </a:spcAft>
+              <a:buFont typeface="Arial" panose="020B0604020202020204" pitchFamily="34" charset="0"/>
+              <a:buChar char="•"/>
+            </a:pPr>
+            <a:r>
+              <a:rPr lang="it-IT" sz="2000" dirty="0">
+                <a:latin typeface="Segoe UI" panose="020B0502040204020203" pitchFamily="34" charset="0"/>
+                <a:cs typeface="Segoe UI" panose="020B0502040204020203" pitchFamily="34" charset="0"/>
+              </a:rPr>
+              <a:t>Meta-</a:t>
+            </a:r>
+            <a:r>
+              <a:rPr lang="it-IT" sz="2000" dirty="0" err="1">
+                <a:latin typeface="Segoe UI" panose="020B0502040204020203" pitchFamily="34" charset="0"/>
+                <a:cs typeface="Segoe UI" panose="020B0502040204020203" pitchFamily="34" charset="0"/>
+              </a:rPr>
+              <a:t>heuristic</a:t>
+            </a:r>
+            <a:r>
+              <a:rPr lang="it-IT" sz="2000" dirty="0">
+                <a:latin typeface="Segoe UI" panose="020B0502040204020203" pitchFamily="34" charset="0"/>
+                <a:cs typeface="Segoe UI" panose="020B0502040204020203" pitchFamily="34" charset="0"/>
+              </a:rPr>
+              <a:t> algorithms</a:t>
+            </a:r>
+          </a:p>
+          <a:p>
+            <a:pPr marL="800100" lvl="1" indent="-342900">
+              <a:spcAft>
+                <a:spcPts val="500"/>
+              </a:spcAft>
+              <a:buFont typeface="Arial" panose="020B0604020202020204" pitchFamily="34" charset="0"/>
+              <a:buChar char="•"/>
+            </a:pPr>
+            <a:r>
+              <a:rPr lang="it-IT" sz="2000" dirty="0">
+                <a:latin typeface="Segoe UI" panose="020B0502040204020203" pitchFamily="34" charset="0"/>
+                <a:cs typeface="Segoe UI" panose="020B0502040204020203" pitchFamily="34" charset="0"/>
+              </a:rPr>
+              <a:t>Neural Networks (NN) for complex pattern learning</a:t>
+            </a:r>
+          </a:p>
+          <a:p>
+            <a:pPr marL="800100" lvl="1" indent="-342900">
+              <a:spcAft>
+                <a:spcPts val="500"/>
+              </a:spcAft>
+              <a:buFont typeface="Arial" panose="020B0604020202020204" pitchFamily="34" charset="0"/>
+              <a:buChar char="•"/>
+            </a:pPr>
+            <a:r>
+              <a:rPr lang="it-IT" sz="2000" dirty="0">
+                <a:latin typeface="Segoe UI" panose="020B0502040204020203" pitchFamily="34" charset="0"/>
+                <a:cs typeface="Segoe UI" panose="020B0502040204020203" pitchFamily="34" charset="0"/>
+              </a:rPr>
+              <a:t>Hybrid approaches </a:t>
+            </a:r>
+            <a:r>
+              <a:rPr lang="it-IT" sz="2000" dirty="0" err="1">
+                <a:latin typeface="Segoe UI" panose="020B0502040204020203" pitchFamily="34" charset="0"/>
+                <a:cs typeface="Segoe UI" panose="020B0502040204020203" pitchFamily="34" charset="0"/>
+              </a:rPr>
+              <a:t>combining</a:t>
+            </a:r>
+            <a:r>
+              <a:rPr lang="it-IT" sz="2000" dirty="0">
+                <a:latin typeface="Segoe UI" panose="020B0502040204020203" pitchFamily="34" charset="0"/>
+                <a:cs typeface="Segoe UI" panose="020B0502040204020203" pitchFamily="34" charset="0"/>
+              </a:rPr>
+              <a:t> multiple algorithms</a:t>
             </a:r>
           </a:p>
         </p:txBody>
@@ -2139,7 +2593,7 @@
     </p:spTree>
     <p:extLst>
       <p:ext uri="{BB962C8B-B14F-4D97-AF65-F5344CB8AC3E}">
-        <p14:creationId xmlns:p14="http://schemas.microsoft.com/office/powerpoint/2010/main" val="4154783693"/>
+        <p14:creationId xmlns:p14="http://schemas.microsoft.com/office/powerpoint/2010/main" val="277294462"/>
       </p:ext>
     </p:extLst>
   </p:cSld>
@@ -2190,16 +2644,16 @@
         </p:spPr>
         <p:txBody>
           <a:bodyPr>
-            <a:noAutofit/>
+            <a:normAutofit/>
           </a:bodyPr>
           <a:lstStyle/>
           <a:p>
             <a:r>
-              <a:rPr lang="en-US" sz="3600" dirty="0">
-                <a:latin typeface="Segoe UI" panose="020B0502040204020203" pitchFamily="34" charset="0"/>
-                <a:cs typeface="Segoe UI" panose="020B0502040204020203" pitchFamily="34" charset="0"/>
-              </a:rPr>
-              <a:t>Environment-specific approaches</a:t>
+              <a:rPr lang="en-US" dirty="0">
+                <a:latin typeface="Segoe UI" panose="020B0502040204020203" pitchFamily="34" charset="0"/>
+                <a:cs typeface="Segoe UI" panose="020B0502040204020203" pitchFamily="34" charset="0"/>
+              </a:rPr>
+              <a:t>Multi-UAV coordination</a:t>
             </a:r>
           </a:p>
         </p:txBody>
@@ -2235,17 +2689,64 @@
                 <a:latin typeface="Segoe UI" panose="020B0502040204020203" pitchFamily="34" charset="0"/>
                 <a:cs typeface="Segoe UI" panose="020B0502040204020203" pitchFamily="34" charset="0"/>
               </a:rPr>
-              <a:t>UAV Route Planning Strategies – 9/13</a:t>
+              <a:t>UAV Route Planning Strategies – 12/13</a:t>
             </a:r>
           </a:p>
         </p:txBody>
       </p:sp>
+      <p:pic>
+        <p:nvPicPr>
+          <p:cNvPr id="2050" name="Picture 2">
+            <a:extLst>
+              <a:ext uri="{FF2B5EF4-FFF2-40B4-BE49-F238E27FC236}">
+                <a16:creationId xmlns:a16="http://schemas.microsoft.com/office/drawing/2014/main" id="{361CE2FC-BF9C-7779-EF31-016B8F7B817C}"/>
+              </a:ext>
+            </a:extLst>
+          </p:cNvPr>
+          <p:cNvPicPr>
+            <a:picLocks noChangeAspect="1" noChangeArrowheads="1"/>
+          </p:cNvPicPr>
+          <p:nvPr/>
+        </p:nvPicPr>
+        <p:blipFill>
+          <a:blip r:embed="rId2">
+            <a:extLst>
+              <a:ext uri="{28A0092B-C50C-407E-A947-70E740481C1C}">
+                <a14:useLocalDpi xmlns:a14="http://schemas.microsoft.com/office/drawing/2010/main" val="0"/>
+              </a:ext>
+            </a:extLst>
+          </a:blip>
+          <a:srcRect/>
+          <a:stretch>
+            <a:fillRect/>
+          </a:stretch>
+        </p:blipFill>
+        <p:spPr bwMode="auto">
+          <a:xfrm>
+            <a:off x="278027" y="1416067"/>
+            <a:ext cx="8587946" cy="4314846"/>
+          </a:xfrm>
+          <a:prstGeom prst="rect">
+            <a:avLst/>
+          </a:prstGeom>
+          <a:noFill/>
+          <a:extLst>
+            <a:ext uri="{909E8E84-426E-40DD-AFC4-6F175D3DCCD1}">
+              <a14:hiddenFill xmlns:a14="http://schemas.microsoft.com/office/drawing/2010/main">
+                <a:solidFill>
+                  <a:srgbClr val="FFFFFF"/>
+                </a:solidFill>
+              </a14:hiddenFill>
+            </a:ext>
+          </a:extLst>
+        </p:spPr>
+      </p:pic>
       <p:sp>
         <p:nvSpPr>
-          <p:cNvPr id="6" name="CasellaDiTesto 5">
-            <a:extLst>
-              <a:ext uri="{FF2B5EF4-FFF2-40B4-BE49-F238E27FC236}">
-                <a16:creationId xmlns:a16="http://schemas.microsoft.com/office/drawing/2014/main" id="{0C3825A1-BC2D-A575-E5DA-F3AAE95E3E9E}"/>
+          <p:cNvPr id="3" name="CasellaDiTesto 2">
+            <a:extLst>
+              <a:ext uri="{FF2B5EF4-FFF2-40B4-BE49-F238E27FC236}">
+                <a16:creationId xmlns:a16="http://schemas.microsoft.com/office/drawing/2014/main" id="{7AD39115-4000-009C-D7E0-BD947329D085}"/>
               </a:ext>
             </a:extLst>
           </p:cNvPr>
@@ -2254,8 +2755,8 @@
         </p:nvSpPr>
         <p:spPr>
           <a:xfrm>
-            <a:off x="262647" y="1391055"/>
-            <a:ext cx="8528062" cy="400110"/>
+            <a:off x="840260" y="5792736"/>
+            <a:ext cx="7821826" cy="307777"/>
           </a:xfrm>
           <a:prstGeom prst="rect">
             <a:avLst/>
@@ -2268,19 +2769,20 @@
           </a:bodyPr>
           <a:lstStyle/>
           <a:p>
-            <a:pPr marL="342900" indent="-342900">
-              <a:spcAft>
-                <a:spcPts val="500"/>
-              </a:spcAft>
-              <a:buFont typeface="Arial" panose="020B0604020202020204" pitchFamily="34" charset="0"/>
-              <a:buChar char="•"/>
-            </a:pPr>
-            <a:r>
-              <a:rPr lang="it-IT" sz="2000" dirty="0">
-                <a:latin typeface="Segoe UI" panose="020B0502040204020203" pitchFamily="34" charset="0"/>
-                <a:cs typeface="Segoe UI" panose="020B0502040204020203" pitchFamily="34" charset="0"/>
-              </a:rPr>
-              <a:t>aa</a:t>
+            <a:pPr algn="ctr"/>
+            <a:r>
+              <a:rPr lang="it-IT" sz="1400" dirty="0"/>
+              <a:t>Reference: </a:t>
+            </a:r>
+            <a:r>
+              <a:rPr lang="it-IT" sz="1400" dirty="0">
+                <a:hlinkClick r:id="rId3"/>
+              </a:rPr>
+              <a:t>https://www.mdpi.com/2227-7390/11/10/2356</a:t>
+            </a:r>
+            <a:r>
+              <a:rPr lang="it-IT" sz="1400" dirty="0"/>
+              <a:t> </a:t>
             </a:r>
           </a:p>
         </p:txBody>
@@ -2288,7 +2790,7 @@
     </p:spTree>
     <p:extLst>
       <p:ext uri="{BB962C8B-B14F-4D97-AF65-F5344CB8AC3E}">
-        <p14:creationId xmlns:p14="http://schemas.microsoft.com/office/powerpoint/2010/main" val="324707415"/>
+        <p14:creationId xmlns:p14="http://schemas.microsoft.com/office/powerpoint/2010/main" val="4154783693"/>
       </p:ext>
     </p:extLst>
   </p:cSld>
@@ -2339,16 +2841,16 @@
         </p:spPr>
         <p:txBody>
           <a:bodyPr>
-            <a:normAutofit/>
+            <a:noAutofit/>
           </a:bodyPr>
           <a:lstStyle/>
           <a:p>
             <a:r>
-              <a:rPr lang="en-US" dirty="0">
-                <a:latin typeface="Segoe UI" panose="020B0502040204020203" pitchFamily="34" charset="0"/>
-                <a:cs typeface="Segoe UI" panose="020B0502040204020203" pitchFamily="34" charset="0"/>
-              </a:rPr>
-              <a:t>Military applications</a:t>
+              <a:rPr lang="en-US" sz="3600" dirty="0">
+                <a:latin typeface="Segoe UI" panose="020B0502040204020203" pitchFamily="34" charset="0"/>
+                <a:cs typeface="Segoe UI" panose="020B0502040204020203" pitchFamily="34" charset="0"/>
+              </a:rPr>
+              <a:t>Environment-specific approaches</a:t>
             </a:r>
           </a:p>
         </p:txBody>
@@ -2384,7 +2886,7 @@
                 <a:latin typeface="Segoe UI" panose="020B0502040204020203" pitchFamily="34" charset="0"/>
                 <a:cs typeface="Segoe UI" panose="020B0502040204020203" pitchFamily="34" charset="0"/>
               </a:rPr>
-              <a:t>UAV Route Planning Strategies – 10/13</a:t>
+              <a:t>UAV Route Planning Strategies – 13/13</a:t>
             </a:r>
           </a:p>
         </p:txBody>
@@ -2403,8 +2905,8 @@
         </p:nvSpPr>
         <p:spPr>
           <a:xfrm>
-            <a:off x="262647" y="1391055"/>
-            <a:ext cx="8528062" cy="400110"/>
+            <a:off x="213220" y="1321826"/>
+            <a:ext cx="7979310" cy="4862870"/>
           </a:xfrm>
           <a:prstGeom prst="rect">
             <a:avLst/>
@@ -2425,11 +2927,317 @@
               <a:buChar char="•"/>
             </a:pPr>
             <a:r>
-              <a:rPr lang="it-IT" sz="2000" dirty="0">
-                <a:latin typeface="Segoe UI" panose="020B0502040204020203" pitchFamily="34" charset="0"/>
-                <a:cs typeface="Segoe UI" panose="020B0502040204020203" pitchFamily="34" charset="0"/>
-              </a:rPr>
-              <a:t>aa</a:t>
+              <a:rPr lang="it-IT" sz="2000" b="1" dirty="0">
+                <a:latin typeface="Segoe UI" panose="020B0502040204020203" pitchFamily="34" charset="0"/>
+                <a:cs typeface="Segoe UI" panose="020B0502040204020203" pitchFamily="34" charset="0"/>
+              </a:rPr>
+              <a:t>Focus</a:t>
+            </a:r>
+          </a:p>
+          <a:p>
+            <a:pPr marL="800100" lvl="1" indent="-342900">
+              <a:spcAft>
+                <a:spcPts val="500"/>
+              </a:spcAft>
+              <a:buFont typeface="Arial" panose="020B0604020202020204" pitchFamily="34" charset="0"/>
+              <a:buChar char="•"/>
+            </a:pPr>
+            <a:r>
+              <a:rPr lang="it-IT" sz="2000" dirty="0">
+                <a:latin typeface="Segoe UI" panose="020B0502040204020203" pitchFamily="34" charset="0"/>
+                <a:cs typeface="Segoe UI" panose="020B0502040204020203" pitchFamily="34" charset="0"/>
+              </a:rPr>
+              <a:t>River search scenarios (</a:t>
+            </a:r>
+            <a:r>
+              <a:rPr lang="it-IT" sz="2000" dirty="0" err="1">
+                <a:latin typeface="Segoe UI" panose="020B0502040204020203" pitchFamily="34" charset="0"/>
+                <a:cs typeface="Segoe UI" panose="020B0502040204020203" pitchFamily="34" charset="0"/>
+              </a:rPr>
+              <a:t>Yao</a:t>
+            </a:r>
+            <a:r>
+              <a:rPr lang="it-IT" sz="2000" dirty="0">
+                <a:latin typeface="Segoe UI" panose="020B0502040204020203" pitchFamily="34" charset="0"/>
+                <a:cs typeface="Segoe UI" panose="020B0502040204020203" pitchFamily="34" charset="0"/>
+              </a:rPr>
+              <a:t> et al.)</a:t>
+            </a:r>
+          </a:p>
+          <a:p>
+            <a:pPr marL="342900" indent="-342900">
+              <a:spcAft>
+                <a:spcPts val="500"/>
+              </a:spcAft>
+              <a:buFont typeface="Arial" panose="020B0604020202020204" pitchFamily="34" charset="0"/>
+              <a:buChar char="•"/>
+            </a:pPr>
+            <a:endParaRPr lang="it-IT" sz="2000" dirty="0">
+              <a:latin typeface="Segoe UI" panose="020B0502040204020203" pitchFamily="34" charset="0"/>
+              <a:cs typeface="Segoe UI" panose="020B0502040204020203" pitchFamily="34" charset="0"/>
+            </a:endParaRPr>
+          </a:p>
+          <a:p>
+            <a:pPr marL="342900" indent="-342900">
+              <a:spcAft>
+                <a:spcPts val="500"/>
+              </a:spcAft>
+              <a:buFont typeface="Arial" panose="020B0604020202020204" pitchFamily="34" charset="0"/>
+              <a:buChar char="•"/>
+            </a:pPr>
+            <a:r>
+              <a:rPr lang="it-IT" sz="2000" b="1" dirty="0">
+                <a:latin typeface="Segoe UI" panose="020B0502040204020203" pitchFamily="34" charset="0"/>
+                <a:cs typeface="Segoe UI" panose="020B0502040204020203" pitchFamily="34" charset="0"/>
+              </a:rPr>
+              <a:t>Key components</a:t>
+            </a:r>
+          </a:p>
+          <a:p>
+            <a:pPr marL="800100" lvl="1" indent="-342900">
+              <a:spcAft>
+                <a:spcPts val="500"/>
+              </a:spcAft>
+              <a:buFont typeface="Arial" panose="020B0604020202020204" pitchFamily="34" charset="0"/>
+              <a:buChar char="•"/>
+            </a:pPr>
+            <a:r>
+              <a:rPr lang="it-IT" sz="2000" dirty="0">
+                <a:latin typeface="Segoe UI" panose="020B0502040204020203" pitchFamily="34" charset="0"/>
+                <a:cs typeface="Segoe UI" panose="020B0502040204020203" pitchFamily="34" charset="0"/>
+              </a:rPr>
+              <a:t>Gaussian </a:t>
+            </a:r>
+            <a:r>
+              <a:rPr lang="it-IT" sz="2000" dirty="0" err="1">
+                <a:latin typeface="Segoe UI" panose="020B0502040204020203" pitchFamily="34" charset="0"/>
+                <a:cs typeface="Segoe UI" panose="020B0502040204020203" pitchFamily="34" charset="0"/>
+              </a:rPr>
+              <a:t>Mixture</a:t>
+            </a:r>
+            <a:r>
+              <a:rPr lang="it-IT" sz="2000" dirty="0">
+                <a:latin typeface="Segoe UI" panose="020B0502040204020203" pitchFamily="34" charset="0"/>
+                <a:cs typeface="Segoe UI" panose="020B0502040204020203" pitchFamily="34" charset="0"/>
+              </a:rPr>
+              <a:t> Model (GMM) for probability distribution</a:t>
+            </a:r>
+          </a:p>
+          <a:p>
+            <a:pPr marL="1257300" lvl="2" indent="-342900">
+              <a:spcAft>
+                <a:spcPts val="500"/>
+              </a:spcAft>
+              <a:buFont typeface="Arial" panose="020B0604020202020204" pitchFamily="34" charset="0"/>
+              <a:buChar char="•"/>
+            </a:pPr>
+            <a:r>
+              <a:rPr lang="it-IT" sz="2000" dirty="0" err="1">
+                <a:latin typeface="Segoe UI" panose="020B0502040204020203" pitchFamily="34" charset="0"/>
+                <a:cs typeface="Segoe UI" panose="020B0502040204020203" pitchFamily="34" charset="0"/>
+              </a:rPr>
+              <a:t>Identifies</a:t>
+            </a:r>
+            <a:r>
+              <a:rPr lang="it-IT" sz="2000" dirty="0">
+                <a:latin typeface="Segoe UI" panose="020B0502040204020203" pitchFamily="34" charset="0"/>
+                <a:cs typeface="Segoe UI" panose="020B0502040204020203" pitchFamily="34" charset="0"/>
+              </a:rPr>
+              <a:t> high-value </a:t>
+            </a:r>
+            <a:r>
+              <a:rPr lang="it-IT" sz="2000" dirty="0" err="1">
+                <a:latin typeface="Segoe UI" panose="020B0502040204020203" pitchFamily="34" charset="0"/>
+                <a:cs typeface="Segoe UI" panose="020B0502040204020203" pitchFamily="34" charset="0"/>
+              </a:rPr>
+              <a:t>river</a:t>
+            </a:r>
+            <a:r>
+              <a:rPr lang="it-IT" sz="2000" dirty="0">
+                <a:latin typeface="Segoe UI" panose="020B0502040204020203" pitchFamily="34" charset="0"/>
+                <a:cs typeface="Segoe UI" panose="020B0502040204020203" pitchFamily="34" charset="0"/>
+              </a:rPr>
+              <a:t> </a:t>
+            </a:r>
+            <a:r>
+              <a:rPr lang="it-IT" sz="2000" dirty="0" err="1">
+                <a:latin typeface="Segoe UI" panose="020B0502040204020203" pitchFamily="34" charset="0"/>
+                <a:cs typeface="Segoe UI" panose="020B0502040204020203" pitchFamily="34" charset="0"/>
+              </a:rPr>
+              <a:t>segments</a:t>
+            </a:r>
+            <a:r>
+              <a:rPr lang="it-IT" sz="2000" dirty="0">
+                <a:latin typeface="Segoe UI" panose="020B0502040204020203" pitchFamily="34" charset="0"/>
+                <a:cs typeface="Segoe UI" panose="020B0502040204020203" pitchFamily="34" charset="0"/>
+              </a:rPr>
+              <a:t> and </a:t>
+            </a:r>
+            <a:r>
+              <a:rPr lang="it-IT" sz="2000" dirty="0" err="1">
+                <a:latin typeface="Segoe UI" panose="020B0502040204020203" pitchFamily="34" charset="0"/>
+                <a:cs typeface="Segoe UI" panose="020B0502040204020203" pitchFamily="34" charset="0"/>
+              </a:rPr>
+              <a:t>adjusts</a:t>
+            </a:r>
+            <a:r>
+              <a:rPr lang="it-IT" sz="2000" dirty="0">
+                <a:latin typeface="Segoe UI" panose="020B0502040204020203" pitchFamily="34" charset="0"/>
+                <a:cs typeface="Segoe UI" panose="020B0502040204020203" pitchFamily="34" charset="0"/>
+              </a:rPr>
+              <a:t> </a:t>
+            </a:r>
+            <a:r>
+              <a:rPr lang="it-IT" sz="2000" dirty="0" err="1">
+                <a:latin typeface="Segoe UI" panose="020B0502040204020203" pitchFamily="34" charset="0"/>
+                <a:cs typeface="Segoe UI" panose="020B0502040204020203" pitchFamily="34" charset="0"/>
+              </a:rPr>
+              <a:t>greedily</a:t>
+            </a:r>
+            <a:endParaRPr lang="it-IT" sz="2000" dirty="0">
+              <a:latin typeface="Segoe UI" panose="020B0502040204020203" pitchFamily="34" charset="0"/>
+              <a:cs typeface="Segoe UI" panose="020B0502040204020203" pitchFamily="34" charset="0"/>
+            </a:endParaRPr>
+          </a:p>
+          <a:p>
+            <a:pPr marL="800100" lvl="1" indent="-342900">
+              <a:spcAft>
+                <a:spcPts val="500"/>
+              </a:spcAft>
+              <a:buFont typeface="Arial" panose="020B0604020202020204" pitchFamily="34" charset="0"/>
+              <a:buChar char="•"/>
+            </a:pPr>
+            <a:r>
+              <a:rPr lang="it-IT" sz="2000" dirty="0">
+                <a:latin typeface="Segoe UI" panose="020B0502040204020203" pitchFamily="34" charset="0"/>
+                <a:cs typeface="Segoe UI" panose="020B0502040204020203" pitchFamily="34" charset="0"/>
+              </a:rPr>
+              <a:t>Approximation Insertion (AI) method for prioritization</a:t>
+            </a:r>
+          </a:p>
+          <a:p>
+            <a:pPr marL="1257300" lvl="2" indent="-342900">
+              <a:spcAft>
+                <a:spcPts val="500"/>
+              </a:spcAft>
+              <a:buFont typeface="Arial" panose="020B0604020202020204" pitchFamily="34" charset="0"/>
+              <a:buChar char="•"/>
+            </a:pPr>
+            <a:r>
+              <a:rPr lang="it-IT" sz="2000" dirty="0">
+                <a:latin typeface="Segoe UI" panose="020B0502040204020203" pitchFamily="34" charset="0"/>
+                <a:cs typeface="Segoe UI" panose="020B0502040204020203" pitchFamily="34" charset="0"/>
+              </a:rPr>
+              <a:t>Constructs search route </a:t>
+            </a:r>
+            <a:r>
+              <a:rPr lang="it-IT" sz="2000" dirty="0" err="1">
+                <a:latin typeface="Segoe UI" panose="020B0502040204020203" pitchFamily="34" charset="0"/>
+                <a:cs typeface="Segoe UI" panose="020B0502040204020203" pitchFamily="34" charset="0"/>
+              </a:rPr>
+              <a:t>iteratively</a:t>
+            </a:r>
+            <a:endParaRPr lang="it-IT" sz="2000" dirty="0">
+              <a:latin typeface="Segoe UI" panose="020B0502040204020203" pitchFamily="34" charset="0"/>
+              <a:cs typeface="Segoe UI" panose="020B0502040204020203" pitchFamily="34" charset="0"/>
+            </a:endParaRPr>
+          </a:p>
+          <a:p>
+            <a:pPr marL="800100" lvl="1" indent="-342900">
+              <a:spcAft>
+                <a:spcPts val="500"/>
+              </a:spcAft>
+              <a:buFont typeface="Arial" panose="020B0604020202020204" pitchFamily="34" charset="0"/>
+              <a:buChar char="•"/>
+            </a:pPr>
+            <a:endParaRPr lang="it-IT" sz="2000" dirty="0">
+              <a:latin typeface="Segoe UI" panose="020B0502040204020203" pitchFamily="34" charset="0"/>
+              <a:cs typeface="Segoe UI" panose="020B0502040204020203" pitchFamily="34" charset="0"/>
+            </a:endParaRPr>
+          </a:p>
+          <a:p>
+            <a:pPr marL="342900" indent="-342900">
+              <a:spcAft>
+                <a:spcPts val="500"/>
+              </a:spcAft>
+              <a:buFont typeface="Arial" panose="020B0604020202020204" pitchFamily="34" charset="0"/>
+              <a:buChar char="•"/>
+            </a:pPr>
+            <a:r>
+              <a:rPr lang="it-IT" sz="2000" b="1" dirty="0">
+                <a:latin typeface="Segoe UI" panose="020B0502040204020203" pitchFamily="34" charset="0"/>
+                <a:cs typeface="Segoe UI" panose="020B0502040204020203" pitchFamily="34" charset="0"/>
+              </a:rPr>
+              <a:t>Innovative aspects</a:t>
+            </a:r>
+          </a:p>
+          <a:p>
+            <a:pPr marL="800100" lvl="1" indent="-342900">
+              <a:spcAft>
+                <a:spcPts val="500"/>
+              </a:spcAft>
+              <a:buFont typeface="Arial" panose="020B0604020202020204" pitchFamily="34" charset="0"/>
+              <a:buChar char="•"/>
+            </a:pPr>
+            <a:r>
+              <a:rPr lang="it-IT" sz="2000" dirty="0">
+                <a:latin typeface="Segoe UI" panose="020B0502040204020203" pitchFamily="34" charset="0"/>
+                <a:cs typeface="Segoe UI" panose="020B0502040204020203" pitchFamily="34" charset="0"/>
+              </a:rPr>
+              <a:t>Uses prior information to estimate target locations</a:t>
+            </a:r>
+          </a:p>
+          <a:p>
+            <a:pPr marL="800100" lvl="1" indent="-342900">
+              <a:spcAft>
+                <a:spcPts val="500"/>
+              </a:spcAft>
+              <a:buFont typeface="Arial" panose="020B0604020202020204" pitchFamily="34" charset="0"/>
+              <a:buChar char="•"/>
+            </a:pPr>
+            <a:r>
+              <a:rPr lang="it-IT" sz="2000" dirty="0" err="1">
+                <a:latin typeface="Segoe UI" panose="020B0502040204020203" pitchFamily="34" charset="0"/>
+                <a:cs typeface="Segoe UI" panose="020B0502040204020203" pitchFamily="34" charset="0"/>
+              </a:rPr>
+              <a:t>Adapts</a:t>
+            </a:r>
+            <a:r>
+              <a:rPr lang="it-IT" sz="2000" dirty="0">
+                <a:latin typeface="Segoe UI" panose="020B0502040204020203" pitchFamily="34" charset="0"/>
+                <a:cs typeface="Segoe UI" panose="020B0502040204020203" pitchFamily="34" charset="0"/>
+              </a:rPr>
+              <a:t> to </a:t>
+            </a:r>
+            <a:r>
+              <a:rPr lang="it-IT" sz="2000" dirty="0" err="1">
+                <a:latin typeface="Segoe UI" panose="020B0502040204020203" pitchFamily="34" charset="0"/>
+                <a:cs typeface="Segoe UI" panose="020B0502040204020203" pitchFamily="34" charset="0"/>
+              </a:rPr>
+              <a:t>river</a:t>
+            </a:r>
+            <a:r>
+              <a:rPr lang="it-IT" sz="2000" dirty="0">
+                <a:latin typeface="Segoe UI" panose="020B0502040204020203" pitchFamily="34" charset="0"/>
+                <a:cs typeface="Segoe UI" panose="020B0502040204020203" pitchFamily="34" charset="0"/>
+              </a:rPr>
+              <a:t> geometry and probability distributions</a:t>
+            </a:r>
+          </a:p>
+          <a:p>
+            <a:pPr marL="800100" lvl="1" indent="-342900">
+              <a:spcAft>
+                <a:spcPts val="500"/>
+              </a:spcAft>
+              <a:buFont typeface="Arial" panose="020B0604020202020204" pitchFamily="34" charset="0"/>
+              <a:buChar char="•"/>
+            </a:pPr>
+            <a:r>
+              <a:rPr lang="it-IT" sz="2000" dirty="0">
+                <a:latin typeface="Segoe UI" panose="020B0502040204020203" pitchFamily="34" charset="0"/>
+                <a:cs typeface="Segoe UI" panose="020B0502040204020203" pitchFamily="34" charset="0"/>
+              </a:rPr>
+              <a:t>Balances detection probability and travel time</a:t>
             </a:r>
           </a:p>
         </p:txBody>
@@ -2437,7 +3245,7 @@
     </p:spTree>
     <p:extLst>
       <p:ext uri="{BB962C8B-B14F-4D97-AF65-F5344CB8AC3E}">
-        <p14:creationId xmlns:p14="http://schemas.microsoft.com/office/powerpoint/2010/main" val="495620899"/>
+        <p14:creationId xmlns:p14="http://schemas.microsoft.com/office/powerpoint/2010/main" val="324707415"/>
       </p:ext>
     </p:extLst>
   </p:cSld>
@@ -2488,16 +3296,16 @@
         </p:spPr>
         <p:txBody>
           <a:bodyPr>
-            <a:normAutofit/>
+            <a:noAutofit/>
           </a:bodyPr>
           <a:lstStyle/>
           <a:p>
             <a:r>
-              <a:rPr lang="en-US" dirty="0">
-                <a:latin typeface="Segoe UI" panose="020B0502040204020203" pitchFamily="34" charset="0"/>
-                <a:cs typeface="Segoe UI" panose="020B0502040204020203" pitchFamily="34" charset="0"/>
-              </a:rPr>
-              <a:t>Comparison of approaches</a:t>
+              <a:rPr lang="en-US" sz="3600" dirty="0">
+                <a:latin typeface="Segoe UI" panose="020B0502040204020203" pitchFamily="34" charset="0"/>
+                <a:cs typeface="Segoe UI" panose="020B0502040204020203" pitchFamily="34" charset="0"/>
+              </a:rPr>
+              <a:t>Environment-specific approaches</a:t>
             </a:r>
           </a:p>
         </p:txBody>
@@ -2533,17 +3341,107 @@
                 <a:latin typeface="Segoe UI" panose="020B0502040204020203" pitchFamily="34" charset="0"/>
                 <a:cs typeface="Segoe UI" panose="020B0502040204020203" pitchFamily="34" charset="0"/>
               </a:rPr>
-              <a:t>UAV Route Planning Strategies – 11/13</a:t>
+              <a:t>UAV Route Planning Strategies – 14/13</a:t>
             </a:r>
           </a:p>
         </p:txBody>
       </p:sp>
+      <p:pic>
+        <p:nvPicPr>
+          <p:cNvPr id="5" name="Immagine 4">
+            <a:extLst>
+              <a:ext uri="{FF2B5EF4-FFF2-40B4-BE49-F238E27FC236}">
+                <a16:creationId xmlns:a16="http://schemas.microsoft.com/office/drawing/2014/main" id="{73A050C1-24BB-E433-AAFF-1723656EDD3F}"/>
+              </a:ext>
+            </a:extLst>
+          </p:cNvPr>
+          <p:cNvPicPr>
+            <a:picLocks noChangeAspect="1"/>
+          </p:cNvPicPr>
+          <p:nvPr/>
+        </p:nvPicPr>
+        <p:blipFill>
+          <a:blip r:embed="rId2"/>
+          <a:stretch>
+            <a:fillRect/>
+          </a:stretch>
+        </p:blipFill>
+        <p:spPr>
+          <a:xfrm>
+            <a:off x="2503654" y="1260270"/>
+            <a:ext cx="4136691" cy="1517557"/>
+          </a:xfrm>
+          <a:prstGeom prst="rect">
+            <a:avLst/>
+          </a:prstGeom>
+        </p:spPr>
+      </p:pic>
+      <p:pic>
+        <p:nvPicPr>
+          <p:cNvPr id="8" name="Immagine 7">
+            <a:extLst>
+              <a:ext uri="{FF2B5EF4-FFF2-40B4-BE49-F238E27FC236}">
+                <a16:creationId xmlns:a16="http://schemas.microsoft.com/office/drawing/2014/main" id="{74A34C17-7A0E-C760-0D6F-78870E25259A}"/>
+              </a:ext>
+            </a:extLst>
+          </p:cNvPr>
+          <p:cNvPicPr>
+            <a:picLocks noChangeAspect="1"/>
+          </p:cNvPicPr>
+          <p:nvPr/>
+        </p:nvPicPr>
+        <p:blipFill>
+          <a:blip r:embed="rId3"/>
+          <a:stretch>
+            <a:fillRect/>
+          </a:stretch>
+        </p:blipFill>
+        <p:spPr>
+          <a:xfrm>
+            <a:off x="147723" y="3106501"/>
+            <a:ext cx="4711862" cy="2718054"/>
+          </a:xfrm>
+          <a:prstGeom prst="rect">
+            <a:avLst/>
+          </a:prstGeom>
+        </p:spPr>
+      </p:pic>
+      <p:pic>
+        <p:nvPicPr>
+          <p:cNvPr id="10" name="Immagine 9">
+            <a:extLst>
+              <a:ext uri="{FF2B5EF4-FFF2-40B4-BE49-F238E27FC236}">
+                <a16:creationId xmlns:a16="http://schemas.microsoft.com/office/drawing/2014/main" id="{9034E254-147A-F58D-49AE-94BD377B8485}"/>
+              </a:ext>
+            </a:extLst>
+          </p:cNvPr>
+          <p:cNvPicPr>
+            <a:picLocks noChangeAspect="1"/>
+          </p:cNvPicPr>
+          <p:nvPr/>
+        </p:nvPicPr>
+        <p:blipFill>
+          <a:blip r:embed="rId4"/>
+          <a:stretch>
+            <a:fillRect/>
+          </a:stretch>
+        </p:blipFill>
+        <p:spPr>
+          <a:xfrm>
+            <a:off x="5151439" y="2994068"/>
+            <a:ext cx="3820135" cy="2942919"/>
+          </a:xfrm>
+          <a:prstGeom prst="rect">
+            <a:avLst/>
+          </a:prstGeom>
+        </p:spPr>
+      </p:pic>
       <p:sp>
         <p:nvSpPr>
-          <p:cNvPr id="6" name="CasellaDiTesto 5">
-            <a:extLst>
-              <a:ext uri="{FF2B5EF4-FFF2-40B4-BE49-F238E27FC236}">
-                <a16:creationId xmlns:a16="http://schemas.microsoft.com/office/drawing/2014/main" id="{0C3825A1-BC2D-A575-E5DA-F3AAE95E3E9E}"/>
+          <p:cNvPr id="11" name="CasellaDiTesto 10">
+            <a:extLst>
+              <a:ext uri="{FF2B5EF4-FFF2-40B4-BE49-F238E27FC236}">
+                <a16:creationId xmlns:a16="http://schemas.microsoft.com/office/drawing/2014/main" id="{8C3ED0DD-F1D4-6891-5305-687377227983}"/>
               </a:ext>
             </a:extLst>
           </p:cNvPr>
@@ -2552,8 +3450,8 @@
         </p:nvSpPr>
         <p:spPr>
           <a:xfrm>
-            <a:off x="262647" y="1391055"/>
-            <a:ext cx="8528062" cy="400110"/>
+            <a:off x="753762" y="5841975"/>
+            <a:ext cx="8217812" cy="307777"/>
           </a:xfrm>
           <a:prstGeom prst="rect">
             <a:avLst/>
@@ -2566,27 +3464,29 @@
           </a:bodyPr>
           <a:lstStyle/>
           <a:p>
-            <a:pPr marL="342900" indent="-342900">
-              <a:spcAft>
-                <a:spcPts val="500"/>
-              </a:spcAft>
-              <a:buFont typeface="Arial" panose="020B0604020202020204" pitchFamily="34" charset="0"/>
-              <a:buChar char="•"/>
-            </a:pPr>
-            <a:r>
-              <a:rPr lang="it-IT" sz="2000" dirty="0">
-                <a:latin typeface="Segoe UI" panose="020B0502040204020203" pitchFamily="34" charset="0"/>
-                <a:cs typeface="Segoe UI" panose="020B0502040204020203" pitchFamily="34" charset="0"/>
-              </a:rPr>
-              <a:t>aa</a:t>
-            </a:r>
+            <a:pPr algn="ctr"/>
+            <a:r>
+              <a:rPr lang="it-IT" sz="1400" dirty="0"/>
+              <a:t>Reference: </a:t>
+            </a:r>
+            <a:r>
+              <a:rPr lang="en-US" sz="1400" dirty="0">
+                <a:hlinkClick r:id="rId5"/>
+              </a:rPr>
+              <a:t>Optimal UAV Route Planning for Coverage Search of Stationary Target in River</a:t>
+            </a:r>
+            <a:r>
+              <a:rPr lang="en-US" sz="1400" dirty="0"/>
+              <a:t> – (Paper 5)</a:t>
+            </a:r>
+            <a:endParaRPr lang="it-IT" sz="1400" dirty="0"/>
           </a:p>
         </p:txBody>
       </p:sp>
     </p:spTree>
     <p:extLst>
       <p:ext uri="{BB962C8B-B14F-4D97-AF65-F5344CB8AC3E}">
-        <p14:creationId xmlns:p14="http://schemas.microsoft.com/office/powerpoint/2010/main" val="2428486781"/>
+        <p14:creationId xmlns:p14="http://schemas.microsoft.com/office/powerpoint/2010/main" val="3188978917"/>
       </p:ext>
     </p:extLst>
   </p:cSld>
@@ -2637,16 +3537,16 @@
         </p:spPr>
         <p:txBody>
           <a:bodyPr>
-            <a:noAutofit/>
+            <a:normAutofit/>
           </a:bodyPr>
           <a:lstStyle/>
           <a:p>
             <a:r>
-              <a:rPr lang="en-US" sz="2800" dirty="0">
-                <a:latin typeface="Segoe UI" panose="020B0502040204020203" pitchFamily="34" charset="0"/>
-                <a:cs typeface="Segoe UI" panose="020B0502040204020203" pitchFamily="34" charset="0"/>
-              </a:rPr>
-              <a:t>Future challenges and research directions</a:t>
+              <a:rPr lang="en-US" dirty="0">
+                <a:latin typeface="Segoe UI" panose="020B0502040204020203" pitchFamily="34" charset="0"/>
+                <a:cs typeface="Segoe UI" panose="020B0502040204020203" pitchFamily="34" charset="0"/>
+              </a:rPr>
+              <a:t>Military applications</a:t>
             </a:r>
           </a:p>
         </p:txBody>
@@ -2682,7 +3582,7 @@
                 <a:latin typeface="Segoe UI" panose="020B0502040204020203" pitchFamily="34" charset="0"/>
                 <a:cs typeface="Segoe UI" panose="020B0502040204020203" pitchFamily="34" charset="0"/>
               </a:rPr>
-              <a:t>UAV Route Planning Strategies – 12/13</a:t>
+              <a:t>UAV Route Planning Strategies – 15/13</a:t>
             </a:r>
           </a:p>
         </p:txBody>
@@ -2702,7 +3602,7 @@
         <p:spPr>
           <a:xfrm>
             <a:off x="262647" y="1391055"/>
-            <a:ext cx="8528062" cy="400110"/>
+            <a:ext cx="8528062" cy="4862870"/>
           </a:xfrm>
           <a:prstGeom prst="rect">
             <a:avLst/>
@@ -2723,11 +3623,397 @@
               <a:buChar char="•"/>
             </a:pPr>
             <a:r>
-              <a:rPr lang="it-IT" sz="2000" dirty="0">
-                <a:latin typeface="Segoe UI" panose="020B0502040204020203" pitchFamily="34" charset="0"/>
-                <a:cs typeface="Segoe UI" panose="020B0502040204020203" pitchFamily="34" charset="0"/>
-              </a:rPr>
-              <a:t>aa</a:t>
+              <a:rPr lang="it-IT" sz="2000" b="1" dirty="0">
+                <a:latin typeface="Segoe UI" panose="020B0502040204020203" pitchFamily="34" charset="0"/>
+                <a:cs typeface="Segoe UI" panose="020B0502040204020203" pitchFamily="34" charset="0"/>
+              </a:rPr>
+              <a:t>Unique challenges</a:t>
+            </a:r>
+          </a:p>
+          <a:p>
+            <a:pPr marL="800100" lvl="1" indent="-342900">
+              <a:spcAft>
+                <a:spcPts val="500"/>
+              </a:spcAft>
+              <a:buFont typeface="Arial" panose="020B0604020202020204" pitchFamily="34" charset="0"/>
+              <a:buChar char="•"/>
+            </a:pPr>
+            <a:r>
+              <a:rPr lang="it-IT" sz="2000" dirty="0" err="1">
+                <a:latin typeface="Segoe UI" panose="020B0502040204020203" pitchFamily="34" charset="0"/>
+                <a:cs typeface="Segoe UI" panose="020B0502040204020203" pitchFamily="34" charset="0"/>
+              </a:rPr>
+              <a:t>Hostile</a:t>
+            </a:r>
+            <a:r>
+              <a:rPr lang="it-IT" sz="2000" dirty="0">
+                <a:latin typeface="Segoe UI" panose="020B0502040204020203" pitchFamily="34" charset="0"/>
+                <a:cs typeface="Segoe UI" panose="020B0502040204020203" pitchFamily="34" charset="0"/>
+              </a:rPr>
+              <a:t> </a:t>
+            </a:r>
+            <a:r>
+              <a:rPr lang="it-IT" sz="2000" dirty="0" err="1">
+                <a:latin typeface="Segoe UI" panose="020B0502040204020203" pitchFamily="34" charset="0"/>
+                <a:cs typeface="Segoe UI" panose="020B0502040204020203" pitchFamily="34" charset="0"/>
+              </a:rPr>
+              <a:t>environments</a:t>
+            </a:r>
+            <a:r>
+              <a:rPr lang="it-IT" sz="2000" dirty="0">
+                <a:latin typeface="Segoe UI" panose="020B0502040204020203" pitchFamily="34" charset="0"/>
+                <a:cs typeface="Segoe UI" panose="020B0502040204020203" pitchFamily="34" charset="0"/>
+              </a:rPr>
+              <a:t> with rapid changes</a:t>
+            </a:r>
+          </a:p>
+          <a:p>
+            <a:pPr marL="800100" lvl="1" indent="-342900">
+              <a:spcAft>
+                <a:spcPts val="500"/>
+              </a:spcAft>
+              <a:buFont typeface="Arial" panose="020B0604020202020204" pitchFamily="34" charset="0"/>
+              <a:buChar char="•"/>
+            </a:pPr>
+            <a:r>
+              <a:rPr lang="it-IT" sz="2000" dirty="0">
+                <a:latin typeface="Segoe UI" panose="020B0502040204020203" pitchFamily="34" charset="0"/>
+                <a:cs typeface="Segoe UI" panose="020B0502040204020203" pitchFamily="34" charset="0"/>
+              </a:rPr>
+              <a:t>Multiple objectives and </a:t>
+            </a:r>
+            <a:r>
+              <a:rPr lang="it-IT" sz="2000" dirty="0" err="1">
+                <a:latin typeface="Segoe UI" panose="020B0502040204020203" pitchFamily="34" charset="0"/>
+                <a:cs typeface="Segoe UI" panose="020B0502040204020203" pitchFamily="34" charset="0"/>
+              </a:rPr>
+              <a:t>stringent</a:t>
+            </a:r>
+            <a:r>
+              <a:rPr lang="it-IT" sz="2000" dirty="0">
+                <a:latin typeface="Segoe UI" panose="020B0502040204020203" pitchFamily="34" charset="0"/>
+                <a:cs typeface="Segoe UI" panose="020B0502040204020203" pitchFamily="34" charset="0"/>
+              </a:rPr>
+              <a:t> </a:t>
+            </a:r>
+            <a:r>
+              <a:rPr lang="it-IT" sz="2000" dirty="0" err="1">
+                <a:latin typeface="Segoe UI" panose="020B0502040204020203" pitchFamily="34" charset="0"/>
+                <a:cs typeface="Segoe UI" panose="020B0502040204020203" pitchFamily="34" charset="0"/>
+              </a:rPr>
+              <a:t>constraints</a:t>
+            </a:r>
+            <a:endParaRPr lang="it-IT" sz="2000" dirty="0">
+              <a:latin typeface="Segoe UI" panose="020B0502040204020203" pitchFamily="34" charset="0"/>
+              <a:cs typeface="Segoe UI" panose="020B0502040204020203" pitchFamily="34" charset="0"/>
+            </a:endParaRPr>
+          </a:p>
+          <a:p>
+            <a:pPr marL="800100" lvl="1" indent="-342900">
+              <a:spcAft>
+                <a:spcPts val="500"/>
+              </a:spcAft>
+              <a:buFont typeface="Arial" panose="020B0604020202020204" pitchFamily="34" charset="0"/>
+              <a:buChar char="•"/>
+            </a:pPr>
+            <a:r>
+              <a:rPr lang="it-IT" sz="2000" dirty="0">
+                <a:latin typeface="Segoe UI" panose="020B0502040204020203" pitchFamily="34" charset="0"/>
+                <a:cs typeface="Segoe UI" panose="020B0502040204020203" pitchFamily="34" charset="0"/>
+              </a:rPr>
+              <a:t>Need for real-time planning and decision-making</a:t>
+            </a:r>
+          </a:p>
+          <a:p>
+            <a:pPr marL="800100" lvl="1" indent="-342900">
+              <a:spcAft>
+                <a:spcPts val="500"/>
+              </a:spcAft>
+              <a:buFont typeface="Arial" panose="020B0604020202020204" pitchFamily="34" charset="0"/>
+              <a:buChar char="•"/>
+            </a:pPr>
+            <a:endParaRPr lang="it-IT" sz="2000" dirty="0">
+              <a:latin typeface="Segoe UI" panose="020B0502040204020203" pitchFamily="34" charset="0"/>
+              <a:cs typeface="Segoe UI" panose="020B0502040204020203" pitchFamily="34" charset="0"/>
+            </a:endParaRPr>
+          </a:p>
+          <a:p>
+            <a:pPr marL="342900" indent="-342900">
+              <a:spcAft>
+                <a:spcPts val="500"/>
+              </a:spcAft>
+              <a:buFont typeface="Arial" panose="020B0604020202020204" pitchFamily="34" charset="0"/>
+              <a:buChar char="•"/>
+            </a:pPr>
+            <a:r>
+              <a:rPr lang="it-IT" sz="2000" b="1" dirty="0">
+                <a:latin typeface="Segoe UI" panose="020B0502040204020203" pitchFamily="34" charset="0"/>
+                <a:cs typeface="Segoe UI" panose="020B0502040204020203" pitchFamily="34" charset="0"/>
+              </a:rPr>
+              <a:t>Key approaches</a:t>
+            </a:r>
+          </a:p>
+          <a:p>
+            <a:pPr marL="800100" lvl="1" indent="-342900">
+              <a:spcAft>
+                <a:spcPts val="500"/>
+              </a:spcAft>
+              <a:buFont typeface="Arial" panose="020B0604020202020204" pitchFamily="34" charset="0"/>
+              <a:buChar char="•"/>
+            </a:pPr>
+            <a:r>
+              <a:rPr lang="it-IT" sz="2000" dirty="0" err="1">
+                <a:latin typeface="Segoe UI" panose="020B0502040204020203" pitchFamily="34" charset="0"/>
+                <a:cs typeface="Segoe UI" panose="020B0502040204020203" pitchFamily="34" charset="0"/>
+              </a:rPr>
+              <a:t>Constrained</a:t>
+            </a:r>
+            <a:r>
+              <a:rPr lang="it-IT" sz="2000" dirty="0">
+                <a:latin typeface="Segoe UI" panose="020B0502040204020203" pitchFamily="34" charset="0"/>
+                <a:cs typeface="Segoe UI" panose="020B0502040204020203" pitchFamily="34" charset="0"/>
+              </a:rPr>
+              <a:t> Shortest-Path (CSP) method (Royset et al.)</a:t>
+            </a:r>
+          </a:p>
+          <a:p>
+            <a:pPr marL="1257300" lvl="2" indent="-342900">
+              <a:spcAft>
+                <a:spcPts val="500"/>
+              </a:spcAft>
+              <a:buFont typeface="Arial" panose="020B0604020202020204" pitchFamily="34" charset="0"/>
+              <a:buChar char="•"/>
+            </a:pPr>
+            <a:r>
+              <a:rPr lang="it-IT" sz="2000" dirty="0" err="1">
+                <a:latin typeface="Segoe UI" panose="020B0502040204020203" pitchFamily="34" charset="0"/>
+                <a:cs typeface="Segoe UI" panose="020B0502040204020203" pitchFamily="34" charset="0"/>
+              </a:rPr>
+              <a:t>Minimizes</a:t>
+            </a:r>
+            <a:r>
+              <a:rPr lang="it-IT" sz="2000" dirty="0">
+                <a:latin typeface="Segoe UI" panose="020B0502040204020203" pitchFamily="34" charset="0"/>
+                <a:cs typeface="Segoe UI" panose="020B0502040204020203" pitchFamily="34" charset="0"/>
+              </a:rPr>
+              <a:t> risk while </a:t>
+            </a:r>
+            <a:r>
+              <a:rPr lang="it-IT" sz="2000" dirty="0" err="1">
+                <a:latin typeface="Segoe UI" panose="020B0502040204020203" pitchFamily="34" charset="0"/>
+                <a:cs typeface="Segoe UI" panose="020B0502040204020203" pitchFamily="34" charset="0"/>
+              </a:rPr>
+              <a:t>satisfying</a:t>
+            </a:r>
+            <a:r>
+              <a:rPr lang="it-IT" sz="2000" dirty="0">
+                <a:latin typeface="Segoe UI" panose="020B0502040204020203" pitchFamily="34" charset="0"/>
+                <a:cs typeface="Segoe UI" panose="020B0502040204020203" pitchFamily="34" charset="0"/>
+              </a:rPr>
+              <a:t> fuel and time </a:t>
+            </a:r>
+            <a:r>
+              <a:rPr lang="it-IT" sz="2000" dirty="0" err="1">
+                <a:latin typeface="Segoe UI" panose="020B0502040204020203" pitchFamily="34" charset="0"/>
+                <a:cs typeface="Segoe UI" panose="020B0502040204020203" pitchFamily="34" charset="0"/>
+              </a:rPr>
+              <a:t>constraints</a:t>
+            </a:r>
+            <a:endParaRPr lang="it-IT" sz="2000" dirty="0">
+              <a:latin typeface="Segoe UI" panose="020B0502040204020203" pitchFamily="34" charset="0"/>
+              <a:cs typeface="Segoe UI" panose="020B0502040204020203" pitchFamily="34" charset="0"/>
+            </a:endParaRPr>
+          </a:p>
+          <a:p>
+            <a:pPr marL="1257300" lvl="2" indent="-342900">
+              <a:spcAft>
+                <a:spcPts val="500"/>
+              </a:spcAft>
+              <a:buFont typeface="Arial" panose="020B0604020202020204" pitchFamily="34" charset="0"/>
+              <a:buChar char="•"/>
+            </a:pPr>
+            <a:r>
+              <a:rPr lang="it-IT" sz="2000" dirty="0">
+                <a:latin typeface="Segoe UI" panose="020B0502040204020203" pitchFamily="34" charset="0"/>
+                <a:cs typeface="Segoe UI" panose="020B0502040204020203" pitchFamily="34" charset="0"/>
+              </a:rPr>
+              <a:t>Uses Lagrangian </a:t>
+            </a:r>
+            <a:r>
+              <a:rPr lang="it-IT" sz="2000" dirty="0" err="1">
+                <a:latin typeface="Segoe UI" panose="020B0502040204020203" pitchFamily="34" charset="0"/>
+                <a:cs typeface="Segoe UI" panose="020B0502040204020203" pitchFamily="34" charset="0"/>
+              </a:rPr>
+              <a:t>Relaxation</a:t>
+            </a:r>
+            <a:r>
+              <a:rPr lang="it-IT" sz="2000" dirty="0">
+                <a:latin typeface="Segoe UI" panose="020B0502040204020203" pitchFamily="34" charset="0"/>
+                <a:cs typeface="Segoe UI" panose="020B0502040204020203" pitchFamily="34" charset="0"/>
+              </a:rPr>
+              <a:t> and </a:t>
+            </a:r>
+            <a:r>
+              <a:rPr lang="it-IT" sz="2000" dirty="0" err="1">
+                <a:latin typeface="Segoe UI" panose="020B0502040204020203" pitchFamily="34" charset="0"/>
+                <a:cs typeface="Segoe UI" panose="020B0502040204020203" pitchFamily="34" charset="0"/>
+              </a:rPr>
+              <a:t>Enumeration</a:t>
+            </a:r>
+            <a:r>
+              <a:rPr lang="it-IT" sz="2000" dirty="0">
+                <a:latin typeface="Segoe UI" panose="020B0502040204020203" pitchFamily="34" charset="0"/>
+                <a:cs typeface="Segoe UI" panose="020B0502040204020203" pitchFamily="34" charset="0"/>
+              </a:rPr>
+              <a:t> (LRE) algorithm</a:t>
+            </a:r>
+          </a:p>
+          <a:p>
+            <a:pPr marL="800100" lvl="1" indent="-342900">
+              <a:spcAft>
+                <a:spcPts val="500"/>
+              </a:spcAft>
+              <a:buFont typeface="Arial" panose="020B0604020202020204" pitchFamily="34" charset="0"/>
+              <a:buChar char="•"/>
+            </a:pPr>
+            <a:r>
+              <a:rPr lang="it-IT" sz="2000" dirty="0">
+                <a:latin typeface="Segoe UI" panose="020B0502040204020203" pitchFamily="34" charset="0"/>
+                <a:cs typeface="Segoe UI" panose="020B0502040204020203" pitchFamily="34" charset="0"/>
+              </a:rPr>
+              <a:t>Real-time network approach (Myers et al.)</a:t>
+            </a:r>
+          </a:p>
+          <a:p>
+            <a:pPr marL="1257300" lvl="2" indent="-342900">
+              <a:spcAft>
+                <a:spcPts val="500"/>
+              </a:spcAft>
+              <a:buFont typeface="Arial" panose="020B0604020202020204" pitchFamily="34" charset="0"/>
+              <a:buChar char="•"/>
+            </a:pPr>
+            <a:r>
+              <a:rPr lang="it-IT" sz="2000" dirty="0" err="1">
+                <a:latin typeface="Segoe UI" panose="020B0502040204020203" pitchFamily="34" charset="0"/>
+                <a:cs typeface="Segoe UI" panose="020B0502040204020203" pitchFamily="34" charset="0"/>
+              </a:rPr>
+              <a:t>Incorporates</a:t>
+            </a:r>
+            <a:r>
+              <a:rPr lang="it-IT" sz="2000" dirty="0">
+                <a:latin typeface="Segoe UI" panose="020B0502040204020203" pitchFamily="34" charset="0"/>
+                <a:cs typeface="Segoe UI" panose="020B0502040204020203" pitchFamily="34" charset="0"/>
+              </a:rPr>
+              <a:t> </a:t>
+            </a:r>
+            <a:r>
+              <a:rPr lang="it-IT" sz="2000" dirty="0" err="1">
+                <a:latin typeface="Segoe UI" panose="020B0502040204020203" pitchFamily="34" charset="0"/>
+                <a:cs typeface="Segoe UI" panose="020B0502040204020203" pitchFamily="34" charset="0"/>
+              </a:rPr>
+              <a:t>obstacles</a:t>
+            </a:r>
+            <a:r>
+              <a:rPr lang="it-IT" sz="2000" dirty="0">
+                <a:latin typeface="Segoe UI" panose="020B0502040204020203" pitchFamily="34" charset="0"/>
+                <a:cs typeface="Segoe UI" panose="020B0502040204020203" pitchFamily="34" charset="0"/>
+              </a:rPr>
+              <a:t> and </a:t>
+            </a:r>
+            <a:r>
+              <a:rPr lang="it-IT" sz="2000" dirty="0" err="1">
+                <a:latin typeface="Segoe UI" panose="020B0502040204020203" pitchFamily="34" charset="0"/>
+                <a:cs typeface="Segoe UI" panose="020B0502040204020203" pitchFamily="34" charset="0"/>
+              </a:rPr>
+              <a:t>flight</a:t>
+            </a:r>
+            <a:r>
+              <a:rPr lang="it-IT" sz="2000" dirty="0">
+                <a:latin typeface="Segoe UI" panose="020B0502040204020203" pitchFamily="34" charset="0"/>
+                <a:cs typeface="Segoe UI" panose="020B0502040204020203" pitchFamily="34" charset="0"/>
+              </a:rPr>
+              <a:t> dynamics </a:t>
+            </a:r>
+          </a:p>
+          <a:p>
+            <a:pPr marL="1257300" lvl="2" indent="-342900">
+              <a:spcAft>
+                <a:spcPts val="500"/>
+              </a:spcAft>
+              <a:buFont typeface="Arial" panose="020B0604020202020204" pitchFamily="34" charset="0"/>
+              <a:buChar char="•"/>
+            </a:pPr>
+            <a:r>
+              <a:rPr lang="it-IT" sz="2000" dirty="0">
+                <a:latin typeface="Segoe UI" panose="020B0502040204020203" pitchFamily="34" charset="0"/>
+                <a:cs typeface="Segoe UI" panose="020B0502040204020203" pitchFamily="34" charset="0"/>
+              </a:rPr>
+              <a:t>Uses pseudonodes for </a:t>
+            </a:r>
+            <a:r>
+              <a:rPr lang="it-IT" sz="2000" dirty="0" err="1">
+                <a:latin typeface="Segoe UI" panose="020B0502040204020203" pitchFamily="34" charset="0"/>
+                <a:cs typeface="Segoe UI" panose="020B0502040204020203" pitchFamily="34" charset="0"/>
+              </a:rPr>
+              <a:t>realistic</a:t>
+            </a:r>
+            <a:r>
+              <a:rPr lang="it-IT" sz="2000" dirty="0">
+                <a:latin typeface="Segoe UI" panose="020B0502040204020203" pitchFamily="34" charset="0"/>
+                <a:cs typeface="Segoe UI" panose="020B0502040204020203" pitchFamily="34" charset="0"/>
+              </a:rPr>
+              <a:t> </a:t>
+            </a:r>
+            <a:r>
+              <a:rPr lang="it-IT" sz="2000" dirty="0" err="1">
+                <a:latin typeface="Segoe UI" panose="020B0502040204020203" pitchFamily="34" charset="0"/>
+                <a:cs typeface="Segoe UI" panose="020B0502040204020203" pitchFamily="34" charset="0"/>
+              </a:rPr>
+              <a:t>aircraft</a:t>
+            </a:r>
+            <a:r>
+              <a:rPr lang="it-IT" sz="2000" dirty="0">
+                <a:latin typeface="Segoe UI" panose="020B0502040204020203" pitchFamily="34" charset="0"/>
+                <a:cs typeface="Segoe UI" panose="020B0502040204020203" pitchFamily="34" charset="0"/>
+              </a:rPr>
+              <a:t> behavior</a:t>
+            </a:r>
+          </a:p>
+          <a:p>
+            <a:pPr marL="1257300" lvl="2" indent="-342900">
+              <a:spcAft>
+                <a:spcPts val="500"/>
+              </a:spcAft>
+              <a:buFont typeface="Arial" panose="020B0604020202020204" pitchFamily="34" charset="0"/>
+              <a:buChar char="•"/>
+            </a:pPr>
+            <a:r>
+              <a:rPr lang="it-IT" sz="2000" dirty="0" err="1">
+                <a:latin typeface="Segoe UI" panose="020B0502040204020203" pitchFamily="34" charset="0"/>
+                <a:cs typeface="Segoe UI" panose="020B0502040204020203" pitchFamily="34" charset="0"/>
+              </a:rPr>
+              <a:t>Adapts</a:t>
+            </a:r>
+            <a:r>
+              <a:rPr lang="it-IT" sz="2000" dirty="0">
+                <a:latin typeface="Segoe UI" panose="020B0502040204020203" pitchFamily="34" charset="0"/>
+                <a:cs typeface="Segoe UI" panose="020B0502040204020203" pitchFamily="34" charset="0"/>
+              </a:rPr>
+              <a:t> </a:t>
+            </a:r>
+            <a:r>
+              <a:rPr lang="it-IT" sz="2000" dirty="0" err="1">
+                <a:latin typeface="Segoe UI" panose="020B0502040204020203" pitchFamily="34" charset="0"/>
+                <a:cs typeface="Segoe UI" panose="020B0502040204020203" pitchFamily="34" charset="0"/>
+              </a:rPr>
+              <a:t>Djikstra’s</a:t>
+            </a:r>
+            <a:r>
+              <a:rPr lang="it-IT" sz="2000" dirty="0">
+                <a:latin typeface="Segoe UI" panose="020B0502040204020203" pitchFamily="34" charset="0"/>
+                <a:cs typeface="Segoe UI" panose="020B0502040204020203" pitchFamily="34" charset="0"/>
+              </a:rPr>
+              <a:t> algorithm for optimal paths</a:t>
             </a:r>
           </a:p>
         </p:txBody>
@@ -2735,7 +4021,7 @@
     </p:spTree>
     <p:extLst>
       <p:ext uri="{BB962C8B-B14F-4D97-AF65-F5344CB8AC3E}">
-        <p14:creationId xmlns:p14="http://schemas.microsoft.com/office/powerpoint/2010/main" val="1946740304"/>
+        <p14:creationId xmlns:p14="http://schemas.microsoft.com/office/powerpoint/2010/main" val="495620899"/>
       </p:ext>
     </p:extLst>
   </p:cSld>
@@ -2786,7 +4072,7 @@
         </p:spPr>
         <p:txBody>
           <a:bodyPr>
-            <a:noAutofit/>
+            <a:normAutofit/>
           </a:bodyPr>
           <a:lstStyle/>
           <a:p>
@@ -2795,7 +4081,7 @@
                 <a:latin typeface="Segoe UI" panose="020B0502040204020203" pitchFamily="34" charset="0"/>
                 <a:cs typeface="Segoe UI" panose="020B0502040204020203" pitchFamily="34" charset="0"/>
               </a:rPr>
-              <a:t>Conclusions</a:t>
+              <a:t>Military applications</a:t>
             </a:r>
           </a:p>
         </p:txBody>
@@ -2831,7 +4117,7 @@
                 <a:latin typeface="Segoe UI" panose="020B0502040204020203" pitchFamily="34" charset="0"/>
                 <a:cs typeface="Segoe UI" panose="020B0502040204020203" pitchFamily="34" charset="0"/>
               </a:rPr>
-              <a:t>UAV Route Planning Strategies – 13/13</a:t>
+              <a:t>UAV Route Planning Strategies – 16/13</a:t>
             </a:r>
           </a:p>
         </p:txBody>
@@ -2850,8 +4136,8 @@
         </p:nvSpPr>
         <p:spPr>
           <a:xfrm>
-            <a:off x="262647" y="1391055"/>
-            <a:ext cx="8528062" cy="400110"/>
+            <a:off x="159574" y="1301379"/>
+            <a:ext cx="4494704" cy="5529719"/>
           </a:xfrm>
           <a:prstGeom prst="rect">
             <a:avLst/>
@@ -2872,11 +4158,354 @@
               <a:buChar char="•"/>
             </a:pPr>
             <a:r>
-              <a:rPr lang="it-IT" sz="2000" dirty="0">
-                <a:latin typeface="Segoe UI" panose="020B0502040204020203" pitchFamily="34" charset="0"/>
-                <a:cs typeface="Segoe UI" panose="020B0502040204020203" pitchFamily="34" charset="0"/>
-              </a:rPr>
-              <a:t>aa</a:t>
+              <a:rPr lang="it-IT" sz="2000" b="1" dirty="0">
+                <a:latin typeface="Segoe UI" panose="020B0502040204020203" pitchFamily="34" charset="0"/>
+                <a:cs typeface="Segoe UI" panose="020B0502040204020203" pitchFamily="34" charset="0"/>
+              </a:rPr>
+              <a:t>Comparative </a:t>
+            </a:r>
+            <a:r>
+              <a:rPr lang="it-IT" sz="2000" b="1" dirty="0" err="1">
+                <a:latin typeface="Segoe UI" panose="020B0502040204020203" pitchFamily="34" charset="0"/>
+                <a:cs typeface="Segoe UI" panose="020B0502040204020203" pitchFamily="34" charset="0"/>
+              </a:rPr>
+              <a:t>strengths</a:t>
+            </a:r>
+            <a:endParaRPr lang="it-IT" sz="2000" b="1" dirty="0">
+              <a:latin typeface="Segoe UI" panose="020B0502040204020203" pitchFamily="34" charset="0"/>
+              <a:cs typeface="Segoe UI" panose="020B0502040204020203" pitchFamily="34" charset="0"/>
+            </a:endParaRPr>
+          </a:p>
+          <a:p>
+            <a:pPr marL="800100" lvl="1" indent="-342900">
+              <a:spcAft>
+                <a:spcPts val="500"/>
+              </a:spcAft>
+              <a:buFont typeface="Arial" panose="020B0604020202020204" pitchFamily="34" charset="0"/>
+              <a:buChar char="•"/>
+            </a:pPr>
+            <a:r>
+              <a:rPr lang="it-IT" sz="2000" dirty="0">
+                <a:latin typeface="Segoe UI" panose="020B0502040204020203" pitchFamily="34" charset="0"/>
+                <a:cs typeface="Segoe UI" panose="020B0502040204020203" pitchFamily="34" charset="0"/>
+              </a:rPr>
+              <a:t>CSP method: handles multiple </a:t>
+            </a:r>
+            <a:r>
+              <a:rPr lang="it-IT" sz="2000" dirty="0" err="1">
+                <a:latin typeface="Segoe UI" panose="020B0502040204020203" pitchFamily="34" charset="0"/>
+                <a:cs typeface="Segoe UI" panose="020B0502040204020203" pitchFamily="34" charset="0"/>
+              </a:rPr>
+              <a:t>constraints</a:t>
+            </a:r>
+            <a:r>
+              <a:rPr lang="it-IT" sz="2000" dirty="0">
+                <a:latin typeface="Segoe UI" panose="020B0502040204020203" pitchFamily="34" charset="0"/>
+                <a:cs typeface="Segoe UI" panose="020B0502040204020203" pitchFamily="34" charset="0"/>
+              </a:rPr>
+              <a:t>, suitable for complex missions</a:t>
+            </a:r>
+          </a:p>
+          <a:p>
+            <a:pPr marL="800100" lvl="1" indent="-342900">
+              <a:spcAft>
+                <a:spcPts val="500"/>
+              </a:spcAft>
+              <a:buFont typeface="Arial" panose="020B0604020202020204" pitchFamily="34" charset="0"/>
+              <a:buChar char="•"/>
+            </a:pPr>
+            <a:r>
+              <a:rPr lang="it-IT" sz="2000" dirty="0">
+                <a:latin typeface="Segoe UI" panose="020B0502040204020203" pitchFamily="34" charset="0"/>
+                <a:cs typeface="Segoe UI" panose="020B0502040204020203" pitchFamily="34" charset="0"/>
+              </a:rPr>
+              <a:t>Real-time approach: fast </a:t>
+            </a:r>
+            <a:r>
+              <a:rPr lang="it-IT" sz="2000" dirty="0" err="1">
+                <a:latin typeface="Segoe UI" panose="020B0502040204020203" pitchFamily="34" charset="0"/>
+                <a:cs typeface="Segoe UI" panose="020B0502040204020203" pitchFamily="34" charset="0"/>
+              </a:rPr>
+              <a:t>computation</a:t>
+            </a:r>
+            <a:r>
+              <a:rPr lang="it-IT" sz="2000" dirty="0">
+                <a:latin typeface="Segoe UI" panose="020B0502040204020203" pitchFamily="34" charset="0"/>
+                <a:cs typeface="Segoe UI" panose="020B0502040204020203" pitchFamily="34" charset="0"/>
+              </a:rPr>
+              <a:t>, </a:t>
+            </a:r>
+            <a:r>
+              <a:rPr lang="it-IT" sz="2000" dirty="0" err="1">
+                <a:latin typeface="Segoe UI" panose="020B0502040204020203" pitchFamily="34" charset="0"/>
+                <a:cs typeface="Segoe UI" panose="020B0502040204020203" pitchFamily="34" charset="0"/>
+              </a:rPr>
+              <a:t>adaptable</a:t>
+            </a:r>
+            <a:r>
+              <a:rPr lang="it-IT" sz="2000" dirty="0">
+                <a:latin typeface="Segoe UI" panose="020B0502040204020203" pitchFamily="34" charset="0"/>
+                <a:cs typeface="Segoe UI" panose="020B0502040204020203" pitchFamily="34" charset="0"/>
+              </a:rPr>
+              <a:t> to dynamic </a:t>
+            </a:r>
+            <a:r>
+              <a:rPr lang="it-IT" sz="2000" dirty="0" err="1">
+                <a:latin typeface="Segoe UI" panose="020B0502040204020203" pitchFamily="34" charset="0"/>
+                <a:cs typeface="Segoe UI" panose="020B0502040204020203" pitchFamily="34" charset="0"/>
+              </a:rPr>
+              <a:t>environments</a:t>
+            </a:r>
+            <a:endParaRPr lang="it-IT" sz="2000" dirty="0">
+              <a:latin typeface="Segoe UI" panose="020B0502040204020203" pitchFamily="34" charset="0"/>
+              <a:cs typeface="Segoe UI" panose="020B0502040204020203" pitchFamily="34" charset="0"/>
+            </a:endParaRPr>
+          </a:p>
+          <a:p>
+            <a:pPr marL="800100" lvl="1" indent="-342900">
+              <a:spcAft>
+                <a:spcPts val="500"/>
+              </a:spcAft>
+              <a:buFont typeface="Arial" panose="020B0604020202020204" pitchFamily="34" charset="0"/>
+              <a:buChar char="•"/>
+            </a:pPr>
+            <a:endParaRPr lang="it-IT" sz="2000" dirty="0">
+              <a:latin typeface="Segoe UI" panose="020B0502040204020203" pitchFamily="34" charset="0"/>
+              <a:cs typeface="Segoe UI" panose="020B0502040204020203" pitchFamily="34" charset="0"/>
+            </a:endParaRPr>
+          </a:p>
+          <a:p>
+            <a:pPr marL="342900" indent="-342900">
+              <a:spcAft>
+                <a:spcPts val="500"/>
+              </a:spcAft>
+              <a:buFont typeface="Arial" panose="020B0604020202020204" pitchFamily="34" charset="0"/>
+              <a:buChar char="•"/>
+            </a:pPr>
+            <a:r>
+              <a:rPr lang="it-IT" sz="2000" b="1" dirty="0" err="1">
+                <a:latin typeface="Segoe UI" panose="020B0502040204020203" pitchFamily="34" charset="0"/>
+                <a:cs typeface="Segoe UI" panose="020B0502040204020203" pitchFamily="34" charset="0"/>
+              </a:rPr>
+              <a:t>Limitations</a:t>
+            </a:r>
+            <a:endParaRPr lang="it-IT" sz="2000" b="1" dirty="0">
+              <a:latin typeface="Segoe UI" panose="020B0502040204020203" pitchFamily="34" charset="0"/>
+              <a:cs typeface="Segoe UI" panose="020B0502040204020203" pitchFamily="34" charset="0"/>
+            </a:endParaRPr>
+          </a:p>
+          <a:p>
+            <a:pPr marL="800100" lvl="1" indent="-342900">
+              <a:spcAft>
+                <a:spcPts val="500"/>
+              </a:spcAft>
+              <a:buFont typeface="Arial" panose="020B0604020202020204" pitchFamily="34" charset="0"/>
+              <a:buChar char="•"/>
+            </a:pPr>
+            <a:r>
+              <a:rPr lang="it-IT" sz="2000" dirty="0">
+                <a:latin typeface="Segoe UI" panose="020B0502040204020203" pitchFamily="34" charset="0"/>
+                <a:cs typeface="Segoe UI" panose="020B0502040204020203" pitchFamily="34" charset="0"/>
+              </a:rPr>
+              <a:t>Both focus on single-UAV routing</a:t>
+            </a:r>
+          </a:p>
+          <a:p>
+            <a:pPr marL="800100" lvl="1" indent="-342900">
+              <a:spcAft>
+                <a:spcPts val="500"/>
+              </a:spcAft>
+              <a:buFont typeface="Arial" panose="020B0604020202020204" pitchFamily="34" charset="0"/>
+              <a:buChar char="•"/>
+            </a:pPr>
+            <a:r>
+              <a:rPr lang="it-IT" sz="2000" dirty="0">
+                <a:latin typeface="Segoe UI" panose="020B0502040204020203" pitchFamily="34" charset="0"/>
+                <a:cs typeface="Segoe UI" panose="020B0502040204020203" pitchFamily="34" charset="0"/>
+              </a:rPr>
+              <a:t>Limited </a:t>
+            </a:r>
+            <a:r>
+              <a:rPr lang="it-IT" sz="2000" dirty="0" err="1">
+                <a:latin typeface="Segoe UI" panose="020B0502040204020203" pitchFamily="34" charset="0"/>
+                <a:cs typeface="Segoe UI" panose="020B0502040204020203" pitchFamily="34" charset="0"/>
+              </a:rPr>
+              <a:t>handling</a:t>
+            </a:r>
+            <a:r>
+              <a:rPr lang="it-IT" sz="2000" dirty="0">
+                <a:latin typeface="Segoe UI" panose="020B0502040204020203" pitchFamily="34" charset="0"/>
+                <a:cs typeface="Segoe UI" panose="020B0502040204020203" pitchFamily="34" charset="0"/>
+              </a:rPr>
+              <a:t> of </a:t>
+            </a:r>
+            <a:r>
+              <a:rPr lang="it-IT" sz="2000" dirty="0" err="1">
+                <a:latin typeface="Segoe UI" panose="020B0502040204020203" pitchFamily="34" charset="0"/>
+                <a:cs typeface="Segoe UI" panose="020B0502040204020203" pitchFamily="34" charset="0"/>
+              </a:rPr>
+              <a:t>rapidly</a:t>
+            </a:r>
+            <a:r>
+              <a:rPr lang="it-IT" sz="2000" dirty="0">
+                <a:latin typeface="Segoe UI" panose="020B0502040204020203" pitchFamily="34" charset="0"/>
+                <a:cs typeface="Segoe UI" panose="020B0502040204020203" pitchFamily="34" charset="0"/>
+              </a:rPr>
+              <a:t> </a:t>
+            </a:r>
+            <a:r>
+              <a:rPr lang="it-IT" sz="2000" dirty="0" err="1">
+                <a:latin typeface="Segoe UI" panose="020B0502040204020203" pitchFamily="34" charset="0"/>
+                <a:cs typeface="Segoe UI" panose="020B0502040204020203" pitchFamily="34" charset="0"/>
+              </a:rPr>
+              <a:t>changing</a:t>
+            </a:r>
+            <a:r>
+              <a:rPr lang="it-IT" sz="2000" dirty="0">
+                <a:latin typeface="Segoe UI" panose="020B0502040204020203" pitchFamily="34" charset="0"/>
+                <a:cs typeface="Segoe UI" panose="020B0502040204020203" pitchFamily="34" charset="0"/>
+              </a:rPr>
+              <a:t> threat </a:t>
+            </a:r>
+            <a:r>
+              <a:rPr lang="it-IT" sz="2000" dirty="0" err="1">
+                <a:latin typeface="Segoe UI" panose="020B0502040204020203" pitchFamily="34" charset="0"/>
+                <a:cs typeface="Segoe UI" panose="020B0502040204020203" pitchFamily="34" charset="0"/>
+              </a:rPr>
+              <a:t>landscapes</a:t>
+            </a:r>
+            <a:endParaRPr lang="it-IT" sz="2000" dirty="0">
+              <a:latin typeface="Segoe UI" panose="020B0502040204020203" pitchFamily="34" charset="0"/>
+              <a:cs typeface="Segoe UI" panose="020B0502040204020203" pitchFamily="34" charset="0"/>
+            </a:endParaRPr>
+          </a:p>
+          <a:p>
+            <a:pPr marL="800100" lvl="1" indent="-342900">
+              <a:spcAft>
+                <a:spcPts val="500"/>
+              </a:spcAft>
+              <a:buFont typeface="Arial" panose="020B0604020202020204" pitchFamily="34" charset="0"/>
+              <a:buChar char="•"/>
+            </a:pPr>
+            <a:r>
+              <a:rPr lang="it-IT" sz="2000" dirty="0" err="1">
+                <a:latin typeface="Segoe UI" panose="020B0502040204020203" pitchFamily="34" charset="0"/>
+                <a:cs typeface="Segoe UI" panose="020B0502040204020203" pitchFamily="34" charset="0"/>
+              </a:rPr>
+              <a:t>Lack</a:t>
+            </a:r>
+            <a:r>
+              <a:rPr lang="it-IT" sz="2000" dirty="0">
+                <a:latin typeface="Segoe UI" panose="020B0502040204020203" pitchFamily="34" charset="0"/>
+                <a:cs typeface="Segoe UI" panose="020B0502040204020203" pitchFamily="34" charset="0"/>
+              </a:rPr>
+              <a:t> of multi-UAV coordination considerations</a:t>
+            </a:r>
+          </a:p>
+          <a:p>
+            <a:pPr marL="800100" lvl="1" indent="-342900">
+              <a:spcAft>
+                <a:spcPts val="500"/>
+              </a:spcAft>
+              <a:buFont typeface="Arial" panose="020B0604020202020204" pitchFamily="34" charset="0"/>
+              <a:buChar char="•"/>
+            </a:pPr>
+            <a:endParaRPr lang="it-IT" sz="2000" dirty="0">
+              <a:latin typeface="Segoe UI" panose="020B0502040204020203" pitchFamily="34" charset="0"/>
+              <a:cs typeface="Segoe UI" panose="020B0502040204020203" pitchFamily="34" charset="0"/>
+            </a:endParaRPr>
+          </a:p>
+        </p:txBody>
+      </p:sp>
+      <p:pic>
+        <p:nvPicPr>
+          <p:cNvPr id="1026" name="Picture 2" descr="Axioms 12 00702 g001 550">
+            <a:extLst>
+              <a:ext uri="{FF2B5EF4-FFF2-40B4-BE49-F238E27FC236}">
+                <a16:creationId xmlns:a16="http://schemas.microsoft.com/office/drawing/2014/main" id="{31DA54DF-C277-91AA-245C-9148A0AC2605}"/>
+              </a:ext>
+            </a:extLst>
+          </p:cNvPr>
+          <p:cNvPicPr>
+            <a:picLocks noChangeAspect="1" noChangeArrowheads="1"/>
+          </p:cNvPicPr>
+          <p:nvPr/>
+        </p:nvPicPr>
+        <p:blipFill>
+          <a:blip r:embed="rId2">
+            <a:extLst>
+              <a:ext uri="{28A0092B-C50C-407E-A947-70E740481C1C}">
+                <a14:useLocalDpi xmlns:a14="http://schemas.microsoft.com/office/drawing/2010/main" val="0"/>
+              </a:ext>
+            </a:extLst>
+          </a:blip>
+          <a:srcRect/>
+          <a:stretch>
+            <a:fillRect/>
+          </a:stretch>
+        </p:blipFill>
+        <p:spPr bwMode="auto">
+          <a:xfrm>
+            <a:off x="4572000" y="1930446"/>
+            <a:ext cx="4257105" cy="3645630"/>
+          </a:xfrm>
+          <a:prstGeom prst="rect">
+            <a:avLst/>
+          </a:prstGeom>
+          <a:noFill/>
+          <a:extLst>
+            <a:ext uri="{909E8E84-426E-40DD-AFC4-6F175D3DCCD1}">
+              <a14:hiddenFill xmlns:a14="http://schemas.microsoft.com/office/drawing/2010/main">
+                <a:solidFill>
+                  <a:srgbClr val="FFFFFF"/>
+                </a:solidFill>
+              </a14:hiddenFill>
+            </a:ext>
+          </a:extLst>
+        </p:spPr>
+      </p:pic>
+      <p:sp>
+        <p:nvSpPr>
+          <p:cNvPr id="3" name="CasellaDiTesto 2">
+            <a:extLst>
+              <a:ext uri="{FF2B5EF4-FFF2-40B4-BE49-F238E27FC236}">
+                <a16:creationId xmlns:a16="http://schemas.microsoft.com/office/drawing/2014/main" id="{2E8CB37C-B46C-6F82-9FE1-A5B654C456BA}"/>
+              </a:ext>
+            </a:extLst>
+          </p:cNvPr>
+          <p:cNvSpPr txBox="1"/>
+          <p:nvPr/>
+        </p:nvSpPr>
+        <p:spPr>
+          <a:xfrm>
+            <a:off x="5001185" y="5680367"/>
+            <a:ext cx="3534032" cy="523220"/>
+          </a:xfrm>
+          <a:prstGeom prst="rect">
+            <a:avLst/>
+          </a:prstGeom>
+          <a:noFill/>
+        </p:spPr>
+        <p:txBody>
+          <a:bodyPr wrap="square" rtlCol="0">
+            <a:spAutoFit/>
+          </a:bodyPr>
+          <a:lstStyle/>
+          <a:p>
+            <a:pPr algn="ctr"/>
+            <a:r>
+              <a:rPr lang="it-IT" sz="1400" dirty="0"/>
+              <a:t>Reference: </a:t>
+            </a:r>
+            <a:r>
+              <a:rPr lang="it-IT" sz="1400" dirty="0">
+                <a:hlinkClick r:id="rId3"/>
+              </a:rPr>
+              <a:t>https://www.mdpi.com/2075-1680/12/7/702</a:t>
+            </a:r>
+            <a:r>
+              <a:rPr lang="it-IT" sz="1400" dirty="0"/>
+              <a:t> </a:t>
             </a:r>
           </a:p>
         </p:txBody>
@@ -2884,7 +4513,542 @@
     </p:spTree>
     <p:extLst>
       <p:ext uri="{BB962C8B-B14F-4D97-AF65-F5344CB8AC3E}">
-        <p14:creationId xmlns:p14="http://schemas.microsoft.com/office/powerpoint/2010/main" val="645045590"/>
+        <p14:creationId xmlns:p14="http://schemas.microsoft.com/office/powerpoint/2010/main" val="3784208055"/>
+      </p:ext>
+    </p:extLst>
+  </p:cSld>
+  <p:clrMapOvr>
+    <a:masterClrMapping/>
+  </p:clrMapOvr>
+</p:sld>
+</file>
+
+<file path=ppt/slides/slide17.xml><?xml version="1.0" encoding="utf-8"?>
+<p:sld xmlns:a="http://schemas.openxmlformats.org/drawingml/2006/main" xmlns:r="http://schemas.openxmlformats.org/officeDocument/2006/relationships" xmlns:p="http://schemas.openxmlformats.org/presentationml/2006/main">
+  <p:cSld>
+    <p:spTree>
+      <p:nvGrpSpPr>
+        <p:cNvPr id="1" name=""/>
+        <p:cNvGrpSpPr/>
+        <p:nvPr/>
+      </p:nvGrpSpPr>
+      <p:grpSpPr>
+        <a:xfrm>
+          <a:off x="0" y="0"/>
+          <a:ext cx="0" cy="0"/>
+          <a:chOff x="0" y="0"/>
+          <a:chExt cx="0" cy="0"/>
+        </a:xfrm>
+      </p:grpSpPr>
+      <p:sp>
+        <p:nvSpPr>
+          <p:cNvPr id="2" name="Title 1">
+            <a:extLst>
+              <a:ext uri="{FF2B5EF4-FFF2-40B4-BE49-F238E27FC236}">
+                <a16:creationId xmlns:a16="http://schemas.microsoft.com/office/drawing/2014/main" id="{A20241D5-7C6B-45F6-9B01-BE455CD8AD0B}"/>
+              </a:ext>
+            </a:extLst>
+          </p:cNvPr>
+          <p:cNvSpPr>
+            <a:spLocks noGrp="1"/>
+          </p:cNvSpPr>
+          <p:nvPr>
+            <p:ph type="title"/>
+          </p:nvPr>
+        </p:nvSpPr>
+        <p:spPr>
+          <a:xfrm>
+            <a:off x="0" y="26902"/>
+            <a:ext cx="7061507" cy="1114425"/>
+          </a:xfrm>
+        </p:spPr>
+        <p:txBody>
+          <a:bodyPr>
+            <a:normAutofit/>
+          </a:bodyPr>
+          <a:lstStyle/>
+          <a:p>
+            <a:r>
+              <a:rPr lang="en-US" dirty="0">
+                <a:latin typeface="Segoe UI" panose="020B0502040204020203" pitchFamily="34" charset="0"/>
+                <a:cs typeface="Segoe UI" panose="020B0502040204020203" pitchFamily="34" charset="0"/>
+              </a:rPr>
+              <a:t>Military applications</a:t>
+            </a:r>
+          </a:p>
+        </p:txBody>
+      </p:sp>
+      <p:sp>
+        <p:nvSpPr>
+          <p:cNvPr id="4" name="Slide Number Placeholder 3">
+            <a:extLst>
+              <a:ext uri="{FF2B5EF4-FFF2-40B4-BE49-F238E27FC236}">
+                <a16:creationId xmlns:a16="http://schemas.microsoft.com/office/drawing/2014/main" id="{0FD64D78-A03B-45A9-9177-047825E632C0}"/>
+              </a:ext>
+            </a:extLst>
+          </p:cNvPr>
+          <p:cNvSpPr>
+            <a:spLocks noGrp="1"/>
+          </p:cNvSpPr>
+          <p:nvPr>
+            <p:ph type="sldNum" sz="quarter" idx="4"/>
+          </p:nvPr>
+        </p:nvSpPr>
+        <p:spPr>
+          <a:xfrm>
+            <a:off x="6143105" y="6365195"/>
+            <a:ext cx="2841321" cy="365125"/>
+          </a:xfrm>
+        </p:spPr>
+        <p:txBody>
+          <a:bodyPr/>
+          <a:lstStyle/>
+          <a:p>
+            <a:r>
+              <a:rPr lang="en-US" sz="1200" dirty="0">
+                <a:latin typeface="Segoe UI" panose="020B0502040204020203" pitchFamily="34" charset="0"/>
+                <a:cs typeface="Segoe UI" panose="020B0502040204020203" pitchFamily="34" charset="0"/>
+              </a:rPr>
+              <a:t>UAV Route Planning Strategies – 17/13</a:t>
+            </a:r>
+          </a:p>
+        </p:txBody>
+      </p:sp>
+      <p:pic>
+        <p:nvPicPr>
+          <p:cNvPr id="5" name="Immagine 4">
+            <a:extLst>
+              <a:ext uri="{FF2B5EF4-FFF2-40B4-BE49-F238E27FC236}">
+                <a16:creationId xmlns:a16="http://schemas.microsoft.com/office/drawing/2014/main" id="{511EA3AF-CC73-002E-E028-C328FE77A361}"/>
+              </a:ext>
+            </a:extLst>
+          </p:cNvPr>
+          <p:cNvPicPr>
+            <a:picLocks noChangeAspect="1"/>
+          </p:cNvPicPr>
+          <p:nvPr/>
+        </p:nvPicPr>
+        <p:blipFill>
+          <a:blip r:embed="rId2"/>
+          <a:stretch>
+            <a:fillRect/>
+          </a:stretch>
+        </p:blipFill>
+        <p:spPr>
+          <a:xfrm>
+            <a:off x="1890583" y="1291342"/>
+            <a:ext cx="5759022" cy="2137658"/>
+          </a:xfrm>
+          <a:prstGeom prst="rect">
+            <a:avLst/>
+          </a:prstGeom>
+        </p:spPr>
+      </p:pic>
+      <p:pic>
+        <p:nvPicPr>
+          <p:cNvPr id="8" name="Immagine 7">
+            <a:extLst>
+              <a:ext uri="{FF2B5EF4-FFF2-40B4-BE49-F238E27FC236}">
+                <a16:creationId xmlns:a16="http://schemas.microsoft.com/office/drawing/2014/main" id="{B5B7AF45-DBCB-DADC-63B5-F2BB3B303CA6}"/>
+              </a:ext>
+            </a:extLst>
+          </p:cNvPr>
+          <p:cNvPicPr>
+            <a:picLocks noChangeAspect="1"/>
+          </p:cNvPicPr>
+          <p:nvPr/>
+        </p:nvPicPr>
+        <p:blipFill>
+          <a:blip r:embed="rId3"/>
+          <a:stretch>
+            <a:fillRect/>
+          </a:stretch>
+        </p:blipFill>
+        <p:spPr>
+          <a:xfrm>
+            <a:off x="87385" y="3328037"/>
+            <a:ext cx="3097587" cy="2691697"/>
+          </a:xfrm>
+          <a:prstGeom prst="rect">
+            <a:avLst/>
+          </a:prstGeom>
+        </p:spPr>
+      </p:pic>
+      <p:pic>
+        <p:nvPicPr>
+          <p:cNvPr id="12" name="Immagine 11">
+            <a:extLst>
+              <a:ext uri="{FF2B5EF4-FFF2-40B4-BE49-F238E27FC236}">
+                <a16:creationId xmlns:a16="http://schemas.microsoft.com/office/drawing/2014/main" id="{3D4127C8-4084-50B7-BF21-B5F8FF3F7981}"/>
+              </a:ext>
+            </a:extLst>
+          </p:cNvPr>
+          <p:cNvPicPr>
+            <a:picLocks noChangeAspect="1"/>
+          </p:cNvPicPr>
+          <p:nvPr/>
+        </p:nvPicPr>
+        <p:blipFill>
+          <a:blip r:embed="rId4"/>
+          <a:stretch>
+            <a:fillRect/>
+          </a:stretch>
+        </p:blipFill>
+        <p:spPr>
+          <a:xfrm>
+            <a:off x="3144632" y="3459892"/>
+            <a:ext cx="5996945" cy="2249776"/>
+          </a:xfrm>
+          <a:prstGeom prst="rect">
+            <a:avLst/>
+          </a:prstGeom>
+        </p:spPr>
+      </p:pic>
+      <p:sp>
+        <p:nvSpPr>
+          <p:cNvPr id="13" name="CasellaDiTesto 12">
+            <a:extLst>
+              <a:ext uri="{FF2B5EF4-FFF2-40B4-BE49-F238E27FC236}">
+                <a16:creationId xmlns:a16="http://schemas.microsoft.com/office/drawing/2014/main" id="{AD7C890C-7E94-8A1D-9A13-538E74591109}"/>
+              </a:ext>
+            </a:extLst>
+          </p:cNvPr>
+          <p:cNvSpPr txBox="1"/>
+          <p:nvPr/>
+        </p:nvSpPr>
+        <p:spPr>
+          <a:xfrm>
+            <a:off x="494271" y="5896737"/>
+            <a:ext cx="7821826" cy="307777"/>
+          </a:xfrm>
+          <a:prstGeom prst="rect">
+            <a:avLst/>
+          </a:prstGeom>
+          <a:noFill/>
+        </p:spPr>
+        <p:txBody>
+          <a:bodyPr wrap="square" rtlCol="0">
+            <a:spAutoFit/>
+          </a:bodyPr>
+          <a:lstStyle/>
+          <a:p>
+            <a:pPr algn="ctr"/>
+            <a:r>
+              <a:rPr lang="it-IT" sz="1400" dirty="0"/>
+              <a:t>Reference: </a:t>
+            </a:r>
+            <a:r>
+              <a:rPr lang="it-IT" sz="1400" dirty="0">
+                <a:hlinkClick r:id="rId5"/>
+              </a:rPr>
+              <a:t>https://www.acsu.buffalo.edu/~batta/myers.pdf</a:t>
+            </a:r>
+            <a:endParaRPr lang="it-IT" sz="1400" dirty="0"/>
+          </a:p>
+        </p:txBody>
+      </p:sp>
+    </p:spTree>
+    <p:extLst>
+      <p:ext uri="{BB962C8B-B14F-4D97-AF65-F5344CB8AC3E}">
+        <p14:creationId xmlns:p14="http://schemas.microsoft.com/office/powerpoint/2010/main" val="494875703"/>
+      </p:ext>
+    </p:extLst>
+  </p:cSld>
+  <p:clrMapOvr>
+    <a:masterClrMapping/>
+  </p:clrMapOvr>
+</p:sld>
+</file>
+
+<file path=ppt/slides/slide18.xml><?xml version="1.0" encoding="utf-8"?>
+<p:sld xmlns:a="http://schemas.openxmlformats.org/drawingml/2006/main" xmlns:r="http://schemas.openxmlformats.org/officeDocument/2006/relationships" xmlns:p="http://schemas.openxmlformats.org/presentationml/2006/main">
+  <p:cSld>
+    <p:spTree>
+      <p:nvGrpSpPr>
+        <p:cNvPr id="1" name=""/>
+        <p:cNvGrpSpPr/>
+        <p:nvPr/>
+      </p:nvGrpSpPr>
+      <p:grpSpPr>
+        <a:xfrm>
+          <a:off x="0" y="0"/>
+          <a:ext cx="0" cy="0"/>
+          <a:chOff x="0" y="0"/>
+          <a:chExt cx="0" cy="0"/>
+        </a:xfrm>
+      </p:grpSpPr>
+      <p:sp>
+        <p:nvSpPr>
+          <p:cNvPr id="2" name="Title 1">
+            <a:extLst>
+              <a:ext uri="{FF2B5EF4-FFF2-40B4-BE49-F238E27FC236}">
+                <a16:creationId xmlns:a16="http://schemas.microsoft.com/office/drawing/2014/main" id="{A20241D5-7C6B-45F6-9B01-BE455CD8AD0B}"/>
+              </a:ext>
+            </a:extLst>
+          </p:cNvPr>
+          <p:cNvSpPr>
+            <a:spLocks noGrp="1"/>
+          </p:cNvSpPr>
+          <p:nvPr>
+            <p:ph type="title"/>
+          </p:nvPr>
+        </p:nvSpPr>
+        <p:spPr>
+          <a:xfrm>
+            <a:off x="0" y="26902"/>
+            <a:ext cx="7061507" cy="1114425"/>
+          </a:xfrm>
+        </p:spPr>
+        <p:txBody>
+          <a:bodyPr>
+            <a:normAutofit/>
+          </a:bodyPr>
+          <a:lstStyle/>
+          <a:p>
+            <a:r>
+              <a:rPr lang="en-US" dirty="0">
+                <a:latin typeface="Segoe UI" panose="020B0502040204020203" pitchFamily="34" charset="0"/>
+                <a:cs typeface="Segoe UI" panose="020B0502040204020203" pitchFamily="34" charset="0"/>
+              </a:rPr>
+              <a:t>Comparison of approaches</a:t>
+            </a:r>
+          </a:p>
+        </p:txBody>
+      </p:sp>
+      <p:sp>
+        <p:nvSpPr>
+          <p:cNvPr id="4" name="Slide Number Placeholder 3">
+            <a:extLst>
+              <a:ext uri="{FF2B5EF4-FFF2-40B4-BE49-F238E27FC236}">
+                <a16:creationId xmlns:a16="http://schemas.microsoft.com/office/drawing/2014/main" id="{0FD64D78-A03B-45A9-9177-047825E632C0}"/>
+              </a:ext>
+            </a:extLst>
+          </p:cNvPr>
+          <p:cNvSpPr>
+            <a:spLocks noGrp="1"/>
+          </p:cNvSpPr>
+          <p:nvPr>
+            <p:ph type="sldNum" sz="quarter" idx="4"/>
+          </p:nvPr>
+        </p:nvSpPr>
+        <p:spPr>
+          <a:xfrm>
+            <a:off x="6143105" y="6365195"/>
+            <a:ext cx="2841321" cy="365125"/>
+          </a:xfrm>
+        </p:spPr>
+        <p:txBody>
+          <a:bodyPr/>
+          <a:lstStyle/>
+          <a:p>
+            <a:r>
+              <a:rPr lang="en-US" sz="1200" dirty="0">
+                <a:latin typeface="Segoe UI" panose="020B0502040204020203" pitchFamily="34" charset="0"/>
+                <a:cs typeface="Segoe UI" panose="020B0502040204020203" pitchFamily="34" charset="0"/>
+              </a:rPr>
+              <a:t>UAV Route Planning Strategies – 11/13</a:t>
+            </a:r>
+          </a:p>
+        </p:txBody>
+      </p:sp>
+      <p:sp>
+        <p:nvSpPr>
+          <p:cNvPr id="6" name="CasellaDiTesto 5">
+            <a:extLst>
+              <a:ext uri="{FF2B5EF4-FFF2-40B4-BE49-F238E27FC236}">
+                <a16:creationId xmlns:a16="http://schemas.microsoft.com/office/drawing/2014/main" id="{0C3825A1-BC2D-A575-E5DA-F3AAE95E3E9E}"/>
+              </a:ext>
+            </a:extLst>
+          </p:cNvPr>
+          <p:cNvSpPr txBox="1"/>
+          <p:nvPr/>
+        </p:nvSpPr>
+        <p:spPr>
+          <a:xfrm>
+            <a:off x="262647" y="1391055"/>
+            <a:ext cx="8528062" cy="400110"/>
+          </a:xfrm>
+          <a:prstGeom prst="rect">
+            <a:avLst/>
+          </a:prstGeom>
+          <a:noFill/>
+        </p:spPr>
+        <p:txBody>
+          <a:bodyPr wrap="square" rtlCol="0">
+            <a:spAutoFit/>
+          </a:bodyPr>
+          <a:lstStyle/>
+          <a:p>
+            <a:pPr marL="342900" indent="-342900">
+              <a:spcAft>
+                <a:spcPts val="500"/>
+              </a:spcAft>
+              <a:buFont typeface="Arial" panose="020B0604020202020204" pitchFamily="34" charset="0"/>
+              <a:buChar char="•"/>
+            </a:pPr>
+            <a:r>
+              <a:rPr lang="it-IT" sz="2000" dirty="0">
+                <a:latin typeface="Segoe UI" panose="020B0502040204020203" pitchFamily="34" charset="0"/>
+                <a:cs typeface="Segoe UI" panose="020B0502040204020203" pitchFamily="34" charset="0"/>
+              </a:rPr>
+              <a:t>aa</a:t>
+            </a:r>
+          </a:p>
+        </p:txBody>
+      </p:sp>
+    </p:spTree>
+    <p:extLst>
+      <p:ext uri="{BB962C8B-B14F-4D97-AF65-F5344CB8AC3E}">
+        <p14:creationId xmlns:p14="http://schemas.microsoft.com/office/powerpoint/2010/main" val="2428486781"/>
+      </p:ext>
+    </p:extLst>
+  </p:cSld>
+  <p:clrMapOvr>
+    <a:masterClrMapping/>
+  </p:clrMapOvr>
+</p:sld>
+</file>
+
+<file path=ppt/slides/slide19.xml><?xml version="1.0" encoding="utf-8"?>
+<p:sld xmlns:a="http://schemas.openxmlformats.org/drawingml/2006/main" xmlns:r="http://schemas.openxmlformats.org/officeDocument/2006/relationships" xmlns:p="http://schemas.openxmlformats.org/presentationml/2006/main">
+  <p:cSld>
+    <p:spTree>
+      <p:nvGrpSpPr>
+        <p:cNvPr id="1" name=""/>
+        <p:cNvGrpSpPr/>
+        <p:nvPr/>
+      </p:nvGrpSpPr>
+      <p:grpSpPr>
+        <a:xfrm>
+          <a:off x="0" y="0"/>
+          <a:ext cx="0" cy="0"/>
+          <a:chOff x="0" y="0"/>
+          <a:chExt cx="0" cy="0"/>
+        </a:xfrm>
+      </p:grpSpPr>
+      <p:sp>
+        <p:nvSpPr>
+          <p:cNvPr id="2" name="Title 1">
+            <a:extLst>
+              <a:ext uri="{FF2B5EF4-FFF2-40B4-BE49-F238E27FC236}">
+                <a16:creationId xmlns:a16="http://schemas.microsoft.com/office/drawing/2014/main" id="{A20241D5-7C6B-45F6-9B01-BE455CD8AD0B}"/>
+              </a:ext>
+            </a:extLst>
+          </p:cNvPr>
+          <p:cNvSpPr>
+            <a:spLocks noGrp="1"/>
+          </p:cNvSpPr>
+          <p:nvPr>
+            <p:ph type="title"/>
+          </p:nvPr>
+        </p:nvSpPr>
+        <p:spPr>
+          <a:xfrm>
+            <a:off x="0" y="26902"/>
+            <a:ext cx="7061507" cy="1114425"/>
+          </a:xfrm>
+        </p:spPr>
+        <p:txBody>
+          <a:bodyPr>
+            <a:noAutofit/>
+          </a:bodyPr>
+          <a:lstStyle/>
+          <a:p>
+            <a:r>
+              <a:rPr lang="en-US" sz="2800" dirty="0">
+                <a:latin typeface="Segoe UI" panose="020B0502040204020203" pitchFamily="34" charset="0"/>
+                <a:cs typeface="Segoe UI" panose="020B0502040204020203" pitchFamily="34" charset="0"/>
+              </a:rPr>
+              <a:t>Future challenges and research directions</a:t>
+            </a:r>
+          </a:p>
+        </p:txBody>
+      </p:sp>
+      <p:sp>
+        <p:nvSpPr>
+          <p:cNvPr id="4" name="Slide Number Placeholder 3">
+            <a:extLst>
+              <a:ext uri="{FF2B5EF4-FFF2-40B4-BE49-F238E27FC236}">
+                <a16:creationId xmlns:a16="http://schemas.microsoft.com/office/drawing/2014/main" id="{0FD64D78-A03B-45A9-9177-047825E632C0}"/>
+              </a:ext>
+            </a:extLst>
+          </p:cNvPr>
+          <p:cNvSpPr>
+            <a:spLocks noGrp="1"/>
+          </p:cNvSpPr>
+          <p:nvPr>
+            <p:ph type="sldNum" sz="quarter" idx="4"/>
+          </p:nvPr>
+        </p:nvSpPr>
+        <p:spPr>
+          <a:xfrm>
+            <a:off x="6143105" y="6365195"/>
+            <a:ext cx="2841321" cy="365125"/>
+          </a:xfrm>
+        </p:spPr>
+        <p:txBody>
+          <a:bodyPr/>
+          <a:lstStyle/>
+          <a:p>
+            <a:r>
+              <a:rPr lang="en-US" sz="1200" dirty="0">
+                <a:latin typeface="Segoe UI" panose="020B0502040204020203" pitchFamily="34" charset="0"/>
+                <a:cs typeface="Segoe UI" panose="020B0502040204020203" pitchFamily="34" charset="0"/>
+              </a:rPr>
+              <a:t>UAV Route Planning Strategies – 12/13</a:t>
+            </a:r>
+          </a:p>
+        </p:txBody>
+      </p:sp>
+      <p:sp>
+        <p:nvSpPr>
+          <p:cNvPr id="6" name="CasellaDiTesto 5">
+            <a:extLst>
+              <a:ext uri="{FF2B5EF4-FFF2-40B4-BE49-F238E27FC236}">
+                <a16:creationId xmlns:a16="http://schemas.microsoft.com/office/drawing/2014/main" id="{0C3825A1-BC2D-A575-E5DA-F3AAE95E3E9E}"/>
+              </a:ext>
+            </a:extLst>
+          </p:cNvPr>
+          <p:cNvSpPr txBox="1"/>
+          <p:nvPr/>
+        </p:nvSpPr>
+        <p:spPr>
+          <a:xfrm>
+            <a:off x="262647" y="1391055"/>
+            <a:ext cx="8528062" cy="400110"/>
+          </a:xfrm>
+          <a:prstGeom prst="rect">
+            <a:avLst/>
+          </a:prstGeom>
+          <a:noFill/>
+        </p:spPr>
+        <p:txBody>
+          <a:bodyPr wrap="square" rtlCol="0">
+            <a:spAutoFit/>
+          </a:bodyPr>
+          <a:lstStyle/>
+          <a:p>
+            <a:pPr marL="342900" indent="-342900">
+              <a:spcAft>
+                <a:spcPts val="500"/>
+              </a:spcAft>
+              <a:buFont typeface="Arial" panose="020B0604020202020204" pitchFamily="34" charset="0"/>
+              <a:buChar char="•"/>
+            </a:pPr>
+            <a:r>
+              <a:rPr lang="it-IT" sz="2000" dirty="0">
+                <a:latin typeface="Segoe UI" panose="020B0502040204020203" pitchFamily="34" charset="0"/>
+                <a:cs typeface="Segoe UI" panose="020B0502040204020203" pitchFamily="34" charset="0"/>
+              </a:rPr>
+              <a:t>aa</a:t>
+            </a:r>
+          </a:p>
+        </p:txBody>
+      </p:sp>
+    </p:spTree>
+    <p:extLst>
+      <p:ext uri="{BB962C8B-B14F-4D97-AF65-F5344CB8AC3E}">
+        <p14:creationId xmlns:p14="http://schemas.microsoft.com/office/powerpoint/2010/main" val="1946740304"/>
       </p:ext>
     </p:extLst>
   </p:cSld>
@@ -3296,6 +5460,155 @@
     <p:extLst>
       <p:ext uri="{BB962C8B-B14F-4D97-AF65-F5344CB8AC3E}">
         <p14:creationId xmlns:p14="http://schemas.microsoft.com/office/powerpoint/2010/main" val="2926281852"/>
+      </p:ext>
+    </p:extLst>
+  </p:cSld>
+  <p:clrMapOvr>
+    <a:masterClrMapping/>
+  </p:clrMapOvr>
+</p:sld>
+</file>
+
+<file path=ppt/slides/slide20.xml><?xml version="1.0" encoding="utf-8"?>
+<p:sld xmlns:a="http://schemas.openxmlformats.org/drawingml/2006/main" xmlns:r="http://schemas.openxmlformats.org/officeDocument/2006/relationships" xmlns:p="http://schemas.openxmlformats.org/presentationml/2006/main">
+  <p:cSld>
+    <p:spTree>
+      <p:nvGrpSpPr>
+        <p:cNvPr id="1" name=""/>
+        <p:cNvGrpSpPr/>
+        <p:nvPr/>
+      </p:nvGrpSpPr>
+      <p:grpSpPr>
+        <a:xfrm>
+          <a:off x="0" y="0"/>
+          <a:ext cx="0" cy="0"/>
+          <a:chOff x="0" y="0"/>
+          <a:chExt cx="0" cy="0"/>
+        </a:xfrm>
+      </p:grpSpPr>
+      <p:sp>
+        <p:nvSpPr>
+          <p:cNvPr id="2" name="Title 1">
+            <a:extLst>
+              <a:ext uri="{FF2B5EF4-FFF2-40B4-BE49-F238E27FC236}">
+                <a16:creationId xmlns:a16="http://schemas.microsoft.com/office/drawing/2014/main" id="{A20241D5-7C6B-45F6-9B01-BE455CD8AD0B}"/>
+              </a:ext>
+            </a:extLst>
+          </p:cNvPr>
+          <p:cNvSpPr>
+            <a:spLocks noGrp="1"/>
+          </p:cNvSpPr>
+          <p:nvPr>
+            <p:ph type="title"/>
+          </p:nvPr>
+        </p:nvSpPr>
+        <p:spPr>
+          <a:xfrm>
+            <a:off x="0" y="26902"/>
+            <a:ext cx="7061507" cy="1114425"/>
+          </a:xfrm>
+        </p:spPr>
+        <p:txBody>
+          <a:bodyPr>
+            <a:noAutofit/>
+          </a:bodyPr>
+          <a:lstStyle/>
+          <a:p>
+            <a:r>
+              <a:rPr lang="en-US" dirty="0">
+                <a:latin typeface="Segoe UI" panose="020B0502040204020203" pitchFamily="34" charset="0"/>
+                <a:cs typeface="Segoe UI" panose="020B0502040204020203" pitchFamily="34" charset="0"/>
+              </a:rPr>
+              <a:t>Conclusions</a:t>
+            </a:r>
+          </a:p>
+        </p:txBody>
+      </p:sp>
+      <p:sp>
+        <p:nvSpPr>
+          <p:cNvPr id="4" name="Slide Number Placeholder 3">
+            <a:extLst>
+              <a:ext uri="{FF2B5EF4-FFF2-40B4-BE49-F238E27FC236}">
+                <a16:creationId xmlns:a16="http://schemas.microsoft.com/office/drawing/2014/main" id="{0FD64D78-A03B-45A9-9177-047825E632C0}"/>
+              </a:ext>
+            </a:extLst>
+          </p:cNvPr>
+          <p:cNvSpPr>
+            <a:spLocks noGrp="1"/>
+          </p:cNvSpPr>
+          <p:nvPr>
+            <p:ph type="sldNum" sz="quarter" idx="4"/>
+          </p:nvPr>
+        </p:nvSpPr>
+        <p:spPr>
+          <a:xfrm>
+            <a:off x="6143105" y="6365195"/>
+            <a:ext cx="2841321" cy="365125"/>
+          </a:xfrm>
+        </p:spPr>
+        <p:txBody>
+          <a:bodyPr/>
+          <a:lstStyle/>
+          <a:p>
+            <a:r>
+              <a:rPr lang="en-US" sz="1200" dirty="0">
+                <a:latin typeface="Segoe UI" panose="020B0502040204020203" pitchFamily="34" charset="0"/>
+                <a:cs typeface="Segoe UI" panose="020B0502040204020203" pitchFamily="34" charset="0"/>
+              </a:rPr>
+              <a:t>UAV Route Planning Strategies – 13/13</a:t>
+            </a:r>
+          </a:p>
+        </p:txBody>
+      </p:sp>
+      <p:sp>
+        <p:nvSpPr>
+          <p:cNvPr id="6" name="CasellaDiTesto 5">
+            <a:extLst>
+              <a:ext uri="{FF2B5EF4-FFF2-40B4-BE49-F238E27FC236}">
+                <a16:creationId xmlns:a16="http://schemas.microsoft.com/office/drawing/2014/main" id="{0C3825A1-BC2D-A575-E5DA-F3AAE95E3E9E}"/>
+              </a:ext>
+            </a:extLst>
+          </p:cNvPr>
+          <p:cNvSpPr txBox="1"/>
+          <p:nvPr/>
+        </p:nvSpPr>
+        <p:spPr>
+          <a:xfrm>
+            <a:off x="262647" y="1391055"/>
+            <a:ext cx="8528062" cy="400110"/>
+          </a:xfrm>
+          <a:prstGeom prst="rect">
+            <a:avLst/>
+          </a:prstGeom>
+          <a:noFill/>
+        </p:spPr>
+        <p:txBody>
+          <a:bodyPr wrap="square" rtlCol="0">
+            <a:spAutoFit/>
+          </a:bodyPr>
+          <a:lstStyle/>
+          <a:p>
+            <a:pPr marL="342900" indent="-342900">
+              <a:spcAft>
+                <a:spcPts val="500"/>
+              </a:spcAft>
+              <a:buFont typeface="Arial" panose="020B0604020202020204" pitchFamily="34" charset="0"/>
+              <a:buChar char="•"/>
+            </a:pPr>
+            <a:r>
+              <a:rPr lang="it-IT" sz="2000" dirty="0">
+                <a:latin typeface="Segoe UI" panose="020B0502040204020203" pitchFamily="34" charset="0"/>
+                <a:cs typeface="Segoe UI" panose="020B0502040204020203" pitchFamily="34" charset="0"/>
+              </a:rPr>
+              <a:t>aa</a:t>
+            </a:r>
+          </a:p>
+        </p:txBody>
+      </p:sp>
+    </p:spTree>
+    <p:extLst>
+      <p:ext uri="{BB962C8B-B14F-4D97-AF65-F5344CB8AC3E}">
+        <p14:creationId xmlns:p14="http://schemas.microsoft.com/office/powerpoint/2010/main" val="645045590"/>
       </p:ext>
     </p:extLst>
   </p:cSld>
@@ -3667,7 +5980,7 @@
         </p:nvSpPr>
         <p:spPr>
           <a:xfrm>
-            <a:off x="262647" y="1391055"/>
+            <a:off x="307969" y="1489909"/>
             <a:ext cx="8528062" cy="4119076"/>
           </a:xfrm>
           <a:prstGeom prst="rect">
@@ -4600,7 +6913,7 @@
               <a:buChar char="•"/>
             </a:pPr>
             <a:r>
-              <a:rPr lang="it-IT" sz="2000" dirty="0">
+              <a:rPr lang="it-IT" sz="2000" b="1" dirty="0">
                 <a:latin typeface="Segoe UI" panose="020B0502040204020203" pitchFamily="34" charset="0"/>
                 <a:cs typeface="Segoe UI" panose="020B0502040204020203" pitchFamily="34" charset="0"/>
               </a:rPr>
@@ -4727,7 +7040,7 @@
               <a:buChar char="•"/>
             </a:pPr>
             <a:r>
-              <a:rPr lang="it-IT" sz="2000" dirty="0">
+              <a:rPr lang="it-IT" sz="2000" b="1" dirty="0">
                 <a:latin typeface="Segoe UI" panose="020B0502040204020203" pitchFamily="34" charset="0"/>
                 <a:cs typeface="Segoe UI" panose="020B0502040204020203" pitchFamily="34" charset="0"/>
               </a:rPr>
@@ -5043,14 +7356,14 @@
               <a:buChar char="•"/>
             </a:pPr>
             <a:r>
-              <a:rPr lang="it-IT" sz="2000" dirty="0" err="1">
+              <a:rPr lang="it-IT" sz="2000" b="1" dirty="0" err="1">
                 <a:latin typeface="Segoe UI" panose="020B0502040204020203" pitchFamily="34" charset="0"/>
                 <a:cs typeface="Segoe UI" panose="020B0502040204020203" pitchFamily="34" charset="0"/>
               </a:rPr>
               <a:t>Enhancements</a:t>
             </a:r>
             <a:r>
-              <a:rPr lang="it-IT" sz="2000" dirty="0">
+              <a:rPr lang="it-IT" sz="2000" b="1" dirty="0">
                 <a:latin typeface="Segoe UI" panose="020B0502040204020203" pitchFamily="34" charset="0"/>
                 <a:cs typeface="Segoe UI" panose="020B0502040204020203" pitchFamily="34" charset="0"/>
               </a:rPr>
@@ -5192,7 +7505,7 @@
               <a:buChar char="•"/>
             </a:pPr>
             <a:r>
-              <a:rPr lang="it-IT" sz="2000" dirty="0">
+              <a:rPr lang="it-IT" sz="2000" b="1" dirty="0">
                 <a:latin typeface="Segoe UI" panose="020B0502040204020203" pitchFamily="34" charset="0"/>
                 <a:cs typeface="Segoe UI" panose="020B0502040204020203" pitchFamily="34" charset="0"/>
               </a:rPr>
@@ -5212,7 +7525,7 @@
                 <a:latin typeface="Segoe UI" panose="020B0502040204020203" pitchFamily="34" charset="0"/>
                 <a:cs typeface="Segoe UI" panose="020B0502040204020203" pitchFamily="34" charset="0"/>
               </a:rPr>
-              <a:t>Handles </a:t>
+              <a:t>Handling </a:t>
             </a:r>
             <a:r>
               <a:rPr lang="it-IT" sz="2000" dirty="0" err="1">
@@ -5543,7 +7856,7 @@
               <a:buChar char="•"/>
             </a:pPr>
             <a:r>
-              <a:rPr lang="it-IT" sz="2000" dirty="0">
+              <a:rPr lang="it-IT" sz="2000" b="1" dirty="0">
                 <a:latin typeface="Segoe UI" panose="020B0502040204020203" pitchFamily="34" charset="0"/>
                 <a:cs typeface="Segoe UI" panose="020B0502040204020203" pitchFamily="34" charset="0"/>
               </a:rPr>
@@ -5654,28 +7967,28 @@
               <a:buChar char="•"/>
             </a:pPr>
             <a:r>
-              <a:rPr lang="it-IT" sz="2000" dirty="0" err="1">
+              <a:rPr lang="it-IT" sz="2000" b="1" dirty="0" err="1">
                 <a:latin typeface="Segoe UI" panose="020B0502040204020203" pitchFamily="34" charset="0"/>
                 <a:cs typeface="Segoe UI" panose="020B0502040204020203" pitchFamily="34" charset="0"/>
               </a:rPr>
               <a:t>Particle</a:t>
             </a:r>
             <a:r>
-              <a:rPr lang="it-IT" sz="2000" dirty="0">
+              <a:rPr lang="it-IT" sz="2000" b="1" dirty="0">
                 <a:latin typeface="Segoe UI" panose="020B0502040204020203" pitchFamily="34" charset="0"/>
                 <a:cs typeface="Segoe UI" panose="020B0502040204020203" pitchFamily="34" charset="0"/>
               </a:rPr>
               <a:t> </a:t>
             </a:r>
             <a:r>
-              <a:rPr lang="it-IT" sz="2000" dirty="0" err="1">
+              <a:rPr lang="it-IT" sz="2000" b="1" dirty="0" err="1">
                 <a:latin typeface="Segoe UI" panose="020B0502040204020203" pitchFamily="34" charset="0"/>
                 <a:cs typeface="Segoe UI" panose="020B0502040204020203" pitchFamily="34" charset="0"/>
               </a:rPr>
               <a:t>Swarm</a:t>
             </a:r>
             <a:r>
-              <a:rPr lang="it-IT" sz="2000" dirty="0">
+              <a:rPr lang="it-IT" sz="2000" b="1" dirty="0">
                 <a:latin typeface="Segoe UI" panose="020B0502040204020203" pitchFamily="34" charset="0"/>
                 <a:cs typeface="Segoe UI" panose="020B0502040204020203" pitchFamily="34" charset="0"/>
               </a:rPr>
@@ -5844,21 +8157,21 @@
               <a:buChar char="•"/>
             </a:pPr>
             <a:r>
-              <a:rPr lang="it-IT" sz="2000" dirty="0">
+              <a:rPr lang="it-IT" sz="2000" b="1" dirty="0">
                 <a:latin typeface="Segoe UI" panose="020B0502040204020203" pitchFamily="34" charset="0"/>
                 <a:cs typeface="Segoe UI" panose="020B0502040204020203" pitchFamily="34" charset="0"/>
               </a:rPr>
               <a:t>Ant </a:t>
             </a:r>
             <a:r>
-              <a:rPr lang="it-IT" sz="2000" dirty="0" err="1">
+              <a:rPr lang="it-IT" sz="2000" b="1" dirty="0" err="1">
                 <a:latin typeface="Segoe UI" panose="020B0502040204020203" pitchFamily="34" charset="0"/>
                 <a:cs typeface="Segoe UI" panose="020B0502040204020203" pitchFamily="34" charset="0"/>
               </a:rPr>
               <a:t>Colony</a:t>
             </a:r>
             <a:r>
-              <a:rPr lang="it-IT" sz="2000" dirty="0">
+              <a:rPr lang="it-IT" sz="2000" b="1" dirty="0">
                 <a:latin typeface="Segoe UI" panose="020B0502040204020203" pitchFamily="34" charset="0"/>
                 <a:cs typeface="Segoe UI" panose="020B0502040204020203" pitchFamily="34" charset="0"/>
               </a:rPr>

</xml_diff>

<commit_message>
Finished work on slides - start final revision
</commit_message>
<xml_diff>
--- a/2 - Slides/UAV Route Planning Strategies.pptx
+++ b/2 - Slides/UAV Route Planning Strategies.pptx
@@ -25,9 +25,9 @@
     <p:sldId id="266" r:id="rId16"/>
     <p:sldId id="275" r:id="rId17"/>
     <p:sldId id="276" r:id="rId18"/>
-    <p:sldId id="267" r:id="rId19"/>
-    <p:sldId id="268" r:id="rId20"/>
-    <p:sldId id="269" r:id="rId21"/>
+    <p:sldId id="278" r:id="rId19"/>
+    <p:sldId id="279" r:id="rId20"/>
+    <p:sldId id="268" r:id="rId21"/>
   </p:sldIdLst>
   <p:sldSz cx="9144000" cy="6858000" type="screen4x3"/>
   <p:notesSz cx="6858000" cy="9144000"/>
@@ -216,7 +216,7 @@
           <a:p>
             <a:fld id="{0E4AAC6D-2322-45B9-8ECA-34DF280B0776}" type="datetimeFigureOut">
               <a:rPr lang="en-US" smtClean="0"/>
-              <a:t>9/11/2024</a:t>
+              <a:t>9/12/2024</a:t>
             </a:fld>
             <a:endParaRPr lang="en-US"/>
           </a:p>
@@ -1807,7 +1807,7 @@
         </p:nvSpPr>
         <p:spPr>
           <a:xfrm>
-            <a:off x="1142999" y="2379476"/>
+            <a:off x="1142999" y="2275813"/>
             <a:ext cx="6858000" cy="2099047"/>
           </a:xfrm>
         </p:spPr>
@@ -1873,7 +1873,7 @@
                 <a:latin typeface="Aptos" panose="020B0004020202020204" pitchFamily="34" charset="0"/>
                 <a:cs typeface="Segoe UI" panose="020B0502040204020203" pitchFamily="34" charset="0"/>
               </a:rPr>
-              <a:t>Wireless Networks for Mobile Applications</a:t>
+              <a:t>Wireless Networks for Mobile Applications (WNMA)</a:t>
             </a:r>
           </a:p>
           <a:p>
@@ -1986,7 +1986,7 @@
                 <a:latin typeface="Segoe UI" panose="020B0502040204020203" pitchFamily="34" charset="0"/>
                 <a:cs typeface="Segoe UI" panose="020B0502040204020203" pitchFamily="34" charset="0"/>
               </a:rPr>
-              <a:t>UAV Route Planning Strategies – 10/13</a:t>
+              <a:t>UAV Route Planning Strategies – 10/20</a:t>
             </a:r>
           </a:p>
         </p:txBody>
@@ -2096,7 +2096,7 @@
         <p:spPr>
           <a:xfrm>
             <a:off x="5295363" y="5348210"/>
-            <a:ext cx="3532287" cy="738664"/>
+            <a:ext cx="3532287" cy="400110"/>
           </a:xfrm>
           <a:prstGeom prst="rect">
             <a:avLst/>
@@ -2111,24 +2111,24 @@
           <a:p>
             <a:pPr algn="ctr"/>
             <a:r>
-              <a:rPr lang="it-IT" sz="1400" dirty="0"/>
+              <a:rPr lang="it-IT" sz="1000" dirty="0"/>
               <a:t>Reference: </a:t>
             </a:r>
             <a:r>
-              <a:rPr lang="it-IT" sz="1400" dirty="0">
+              <a:rPr lang="it-IT" sz="1000" dirty="0">
                 <a:hlinkClick r:id="rId5"/>
               </a:rPr>
               <a:t>Path Planning of UAV Based on Improved Adaptive Grey Wolf Optimization Algorithm</a:t>
             </a:r>
             <a:r>
-              <a:rPr lang="it-IT" sz="1400" dirty="0"/>
+              <a:rPr lang="it-IT" sz="1000" dirty="0"/>
               <a:t> </a:t>
             </a:r>
             <a:r>
-              <a:rPr lang="en-US" sz="1400" dirty="0"/>
+              <a:rPr lang="en-US" sz="1000" dirty="0"/>
               <a:t>– (Paper 4)</a:t>
             </a:r>
-            <a:endParaRPr lang="it-IT" sz="1400" dirty="0"/>
+            <a:endParaRPr lang="it-IT" sz="1000" dirty="0"/>
           </a:p>
         </p:txBody>
       </p:sp>
@@ -2231,7 +2231,7 @@
                 <a:latin typeface="Segoe UI" panose="020B0502040204020203" pitchFamily="34" charset="0"/>
                 <a:cs typeface="Segoe UI" panose="020B0502040204020203" pitchFamily="34" charset="0"/>
               </a:rPr>
-              <a:t>UAV Route Planning Strategies – 11/13</a:t>
+              <a:t>UAV Route Planning Strategies – 11/20</a:t>
             </a:r>
           </a:p>
         </p:txBody>
@@ -2689,7 +2689,7 @@
                 <a:latin typeface="Segoe UI" panose="020B0502040204020203" pitchFamily="34" charset="0"/>
                 <a:cs typeface="Segoe UI" panose="020B0502040204020203" pitchFamily="34" charset="0"/>
               </a:rPr>
-              <a:t>UAV Route Planning Strategies – 12/13</a:t>
+              <a:t>UAV Route Planning Strategies – 12/20</a:t>
             </a:r>
           </a:p>
         </p:txBody>
@@ -2756,7 +2756,7 @@
         <p:spPr>
           <a:xfrm>
             <a:off x="840260" y="5792736"/>
-            <a:ext cx="7821826" cy="307777"/>
+            <a:ext cx="7821826" cy="246221"/>
           </a:xfrm>
           <a:prstGeom prst="rect">
             <a:avLst/>
@@ -2771,17 +2771,17 @@
           <a:p>
             <a:pPr algn="ctr"/>
             <a:r>
-              <a:rPr lang="it-IT" sz="1400" dirty="0"/>
+              <a:rPr lang="it-IT" sz="1000" dirty="0"/>
               <a:t>Reference: </a:t>
             </a:r>
             <a:r>
-              <a:rPr lang="it-IT" sz="1400" dirty="0">
+              <a:rPr lang="it-IT" sz="1000" dirty="0">
                 <a:hlinkClick r:id="rId3"/>
               </a:rPr>
               <a:t>https://www.mdpi.com/2227-7390/11/10/2356</a:t>
             </a:r>
             <a:r>
-              <a:rPr lang="it-IT" sz="1400" dirty="0"/>
+              <a:rPr lang="it-IT" sz="1000" dirty="0"/>
               <a:t> </a:t>
             </a:r>
           </a:p>
@@ -2886,7 +2886,7 @@
                 <a:latin typeface="Segoe UI" panose="020B0502040204020203" pitchFamily="34" charset="0"/>
                 <a:cs typeface="Segoe UI" panose="020B0502040204020203" pitchFamily="34" charset="0"/>
               </a:rPr>
-              <a:t>UAV Route Planning Strategies – 13/13</a:t>
+              <a:t>UAV Route Planning Strategies – 13/20</a:t>
             </a:r>
           </a:p>
         </p:txBody>
@@ -3341,7 +3341,7 @@
                 <a:latin typeface="Segoe UI" panose="020B0502040204020203" pitchFamily="34" charset="0"/>
                 <a:cs typeface="Segoe UI" panose="020B0502040204020203" pitchFamily="34" charset="0"/>
               </a:rPr>
-              <a:t>UAV Route Planning Strategies – 14/13</a:t>
+              <a:t>UAV Route Planning Strategies – 14/20</a:t>
             </a:r>
           </a:p>
         </p:txBody>
@@ -3450,8 +3450,8 @@
         </p:nvSpPr>
         <p:spPr>
           <a:xfrm>
-            <a:off x="753762" y="5841975"/>
-            <a:ext cx="8217812" cy="307777"/>
+            <a:off x="750679" y="5904869"/>
+            <a:ext cx="8217812" cy="246221"/>
           </a:xfrm>
           <a:prstGeom prst="rect">
             <a:avLst/>
@@ -3466,20 +3466,20 @@
           <a:p>
             <a:pPr algn="ctr"/>
             <a:r>
-              <a:rPr lang="it-IT" sz="1400" dirty="0"/>
+              <a:rPr lang="it-IT" sz="1000" dirty="0"/>
               <a:t>Reference: </a:t>
             </a:r>
             <a:r>
-              <a:rPr lang="en-US" sz="1400" dirty="0">
+              <a:rPr lang="en-US" sz="1000" dirty="0">
                 <a:hlinkClick r:id="rId5"/>
               </a:rPr>
               <a:t>Optimal UAV Route Planning for Coverage Search of Stationary Target in River</a:t>
             </a:r>
             <a:r>
-              <a:rPr lang="en-US" sz="1400" dirty="0"/>
+              <a:rPr lang="en-US" sz="1000" dirty="0"/>
               <a:t> – (Paper 5)</a:t>
             </a:r>
-            <a:endParaRPr lang="it-IT" sz="1400" dirty="0"/>
+            <a:endParaRPr lang="it-IT" sz="1000" dirty="0"/>
           </a:p>
         </p:txBody>
       </p:sp>
@@ -3582,7 +3582,7 @@
                 <a:latin typeface="Segoe UI" panose="020B0502040204020203" pitchFamily="34" charset="0"/>
                 <a:cs typeface="Segoe UI" panose="020B0502040204020203" pitchFamily="34" charset="0"/>
               </a:rPr>
-              <a:t>UAV Route Planning Strategies – 15/13</a:t>
+              <a:t>UAV Route Planning Strategies – 15/20</a:t>
             </a:r>
           </a:p>
         </p:txBody>
@@ -4117,7 +4117,7 @@
                 <a:latin typeface="Segoe UI" panose="020B0502040204020203" pitchFamily="34" charset="0"/>
                 <a:cs typeface="Segoe UI" panose="020B0502040204020203" pitchFamily="34" charset="0"/>
               </a:rPr>
-              <a:t>UAV Route Planning Strategies – 16/13</a:t>
+              <a:t>UAV Route Planning Strategies – 16/20</a:t>
             </a:r>
           </a:p>
         </p:txBody>
@@ -4479,7 +4479,7 @@
         <p:spPr>
           <a:xfrm>
             <a:off x="5001185" y="5680367"/>
-            <a:ext cx="3534032" cy="523220"/>
+            <a:ext cx="3534032" cy="246221"/>
           </a:xfrm>
           <a:prstGeom prst="rect">
             <a:avLst/>
@@ -4494,17 +4494,17 @@
           <a:p>
             <a:pPr algn="ctr"/>
             <a:r>
-              <a:rPr lang="it-IT" sz="1400" dirty="0"/>
+              <a:rPr lang="it-IT" sz="1000" dirty="0"/>
               <a:t>Reference: </a:t>
             </a:r>
             <a:r>
-              <a:rPr lang="it-IT" sz="1400" dirty="0">
+              <a:rPr lang="it-IT" sz="1000" dirty="0">
                 <a:hlinkClick r:id="rId3"/>
               </a:rPr>
               <a:t>https://www.mdpi.com/2075-1680/12/7/702</a:t>
             </a:r>
             <a:r>
-              <a:rPr lang="it-IT" sz="1400" dirty="0"/>
+              <a:rPr lang="it-IT" sz="1000" dirty="0"/>
               <a:t> </a:t>
             </a:r>
           </a:p>
@@ -4609,7 +4609,7 @@
                 <a:latin typeface="Segoe UI" panose="020B0502040204020203" pitchFamily="34" charset="0"/>
                 <a:cs typeface="Segoe UI" panose="020B0502040204020203" pitchFamily="34" charset="0"/>
               </a:rPr>
-              <a:t>UAV Route Planning Strategies – 17/13</a:t>
+              <a:t>UAV Route Planning Strategies – 17/20</a:t>
             </a:r>
           </a:p>
         </p:txBody>
@@ -4719,7 +4719,7 @@
         <p:spPr>
           <a:xfrm>
             <a:off x="494271" y="5896737"/>
-            <a:ext cx="7821826" cy="307777"/>
+            <a:ext cx="7821826" cy="246221"/>
           </a:xfrm>
           <a:prstGeom prst="rect">
             <a:avLst/>
@@ -4734,16 +4734,16 @@
           <a:p>
             <a:pPr algn="ctr"/>
             <a:r>
-              <a:rPr lang="it-IT" sz="1400" dirty="0"/>
+              <a:rPr lang="it-IT" sz="1000" dirty="0"/>
               <a:t>Reference: </a:t>
             </a:r>
             <a:r>
-              <a:rPr lang="it-IT" sz="1400" dirty="0">
+              <a:rPr lang="it-IT" sz="1000" dirty="0">
                 <a:hlinkClick r:id="rId5"/>
               </a:rPr>
               <a:t>https://www.acsu.buffalo.edu/~batta/myers.pdf</a:t>
             </a:r>
-            <a:endParaRPr lang="it-IT" sz="1400" dirty="0"/>
+            <a:endParaRPr lang="it-IT" sz="1000" dirty="0"/>
           </a:p>
         </p:txBody>
       </p:sp>
@@ -4801,7 +4801,7 @@
         </p:spPr>
         <p:txBody>
           <a:bodyPr>
-            <a:normAutofit/>
+            <a:normAutofit fontScale="90000"/>
           </a:bodyPr>
           <a:lstStyle/>
           <a:p>
@@ -4810,7 +4810,7 @@
                 <a:latin typeface="Segoe UI" panose="020B0502040204020203" pitchFamily="34" charset="0"/>
                 <a:cs typeface="Segoe UI" panose="020B0502040204020203" pitchFamily="34" charset="0"/>
               </a:rPr>
-              <a:t>Comparison of approaches</a:t>
+              <a:t>Comparison of approaches (1)</a:t>
             </a:r>
           </a:p>
         </p:txBody>
@@ -4846,60 +4846,45 @@
                 <a:latin typeface="Segoe UI" panose="020B0502040204020203" pitchFamily="34" charset="0"/>
                 <a:cs typeface="Segoe UI" panose="020B0502040204020203" pitchFamily="34" charset="0"/>
               </a:rPr>
-              <a:t>UAV Route Planning Strategies – 11/13</a:t>
+              <a:t>UAV Route Planning Strategies – 18/20</a:t>
             </a:r>
           </a:p>
         </p:txBody>
       </p:sp>
-      <p:sp>
-        <p:nvSpPr>
-          <p:cNvPr id="6" name="CasellaDiTesto 5">
-            <a:extLst>
-              <a:ext uri="{FF2B5EF4-FFF2-40B4-BE49-F238E27FC236}">
-                <a16:creationId xmlns:a16="http://schemas.microsoft.com/office/drawing/2014/main" id="{0C3825A1-BC2D-A575-E5DA-F3AAE95E3E9E}"/>
-              </a:ext>
-            </a:extLst>
-          </p:cNvPr>
-          <p:cNvSpPr txBox="1"/>
+      <p:pic>
+        <p:nvPicPr>
+          <p:cNvPr id="8" name="Immagine 7">
+            <a:extLst>
+              <a:ext uri="{FF2B5EF4-FFF2-40B4-BE49-F238E27FC236}">
+                <a16:creationId xmlns:a16="http://schemas.microsoft.com/office/drawing/2014/main" id="{7342EEF5-E3EE-7859-08FC-8BA8128C55AF}"/>
+              </a:ext>
+            </a:extLst>
+          </p:cNvPr>
+          <p:cNvPicPr>
+            <a:picLocks noChangeAspect="1"/>
+          </p:cNvPicPr>
           <p:nvPr/>
-        </p:nvSpPr>
-        <p:spPr>
-          <a:xfrm>
-            <a:off x="262647" y="1391055"/>
-            <a:ext cx="8528062" cy="400110"/>
+        </p:nvPicPr>
+        <p:blipFill>
+          <a:blip r:embed="rId2"/>
+          <a:stretch>
+            <a:fillRect/>
+          </a:stretch>
+        </p:blipFill>
+        <p:spPr>
+          <a:xfrm>
+            <a:off x="935996" y="1263022"/>
+            <a:ext cx="7086713" cy="4853574"/>
           </a:xfrm>
           <a:prstGeom prst="rect">
             <a:avLst/>
           </a:prstGeom>
-          <a:noFill/>
-        </p:spPr>
-        <p:txBody>
-          <a:bodyPr wrap="square" rtlCol="0">
-            <a:spAutoFit/>
-          </a:bodyPr>
-          <a:lstStyle/>
-          <a:p>
-            <a:pPr marL="342900" indent="-342900">
-              <a:spcAft>
-                <a:spcPts val="500"/>
-              </a:spcAft>
-              <a:buFont typeface="Arial" panose="020B0604020202020204" pitchFamily="34" charset="0"/>
-              <a:buChar char="•"/>
-            </a:pPr>
-            <a:r>
-              <a:rPr lang="it-IT" sz="2000" dirty="0">
-                <a:latin typeface="Segoe UI" panose="020B0502040204020203" pitchFamily="34" charset="0"/>
-                <a:cs typeface="Segoe UI" panose="020B0502040204020203" pitchFamily="34" charset="0"/>
-              </a:rPr>
-              <a:t>aa</a:t>
-            </a:r>
-          </a:p>
-        </p:txBody>
-      </p:sp>
+        </p:spPr>
+      </p:pic>
     </p:spTree>
     <p:extLst>
       <p:ext uri="{BB962C8B-B14F-4D97-AF65-F5344CB8AC3E}">
-        <p14:creationId xmlns:p14="http://schemas.microsoft.com/office/powerpoint/2010/main" val="2428486781"/>
+        <p14:creationId xmlns:p14="http://schemas.microsoft.com/office/powerpoint/2010/main" val="2965202026"/>
       </p:ext>
     </p:extLst>
   </p:cSld>
@@ -4950,16 +4935,16 @@
         </p:spPr>
         <p:txBody>
           <a:bodyPr>
-            <a:noAutofit/>
+            <a:normAutofit fontScale="90000"/>
           </a:bodyPr>
           <a:lstStyle/>
           <a:p>
             <a:r>
-              <a:rPr lang="en-US" sz="2800" dirty="0">
-                <a:latin typeface="Segoe UI" panose="020B0502040204020203" pitchFamily="34" charset="0"/>
-                <a:cs typeface="Segoe UI" panose="020B0502040204020203" pitchFamily="34" charset="0"/>
-              </a:rPr>
-              <a:t>Future challenges and research directions</a:t>
+              <a:rPr lang="en-US" dirty="0">
+                <a:latin typeface="Segoe UI" panose="020B0502040204020203" pitchFamily="34" charset="0"/>
+                <a:cs typeface="Segoe UI" panose="020B0502040204020203" pitchFamily="34" charset="0"/>
+              </a:rPr>
+              <a:t>Comparison of approaches (2)</a:t>
             </a:r>
           </a:p>
         </p:txBody>
@@ -4995,60 +4980,45 @@
                 <a:latin typeface="Segoe UI" panose="020B0502040204020203" pitchFamily="34" charset="0"/>
                 <a:cs typeface="Segoe UI" panose="020B0502040204020203" pitchFamily="34" charset="0"/>
               </a:rPr>
-              <a:t>UAV Route Planning Strategies – 12/13</a:t>
+              <a:t>UAV Route Planning Strategies – 19/20</a:t>
             </a:r>
           </a:p>
         </p:txBody>
       </p:sp>
-      <p:sp>
-        <p:nvSpPr>
-          <p:cNvPr id="6" name="CasellaDiTesto 5">
-            <a:extLst>
-              <a:ext uri="{FF2B5EF4-FFF2-40B4-BE49-F238E27FC236}">
-                <a16:creationId xmlns:a16="http://schemas.microsoft.com/office/drawing/2014/main" id="{0C3825A1-BC2D-A575-E5DA-F3AAE95E3E9E}"/>
-              </a:ext>
-            </a:extLst>
-          </p:cNvPr>
-          <p:cNvSpPr txBox="1"/>
+      <p:pic>
+        <p:nvPicPr>
+          <p:cNvPr id="8" name="Immagine 7">
+            <a:extLst>
+              <a:ext uri="{FF2B5EF4-FFF2-40B4-BE49-F238E27FC236}">
+                <a16:creationId xmlns:a16="http://schemas.microsoft.com/office/drawing/2014/main" id="{78BD3004-A3A2-00BC-DC63-747082D05565}"/>
+              </a:ext>
+            </a:extLst>
+          </p:cNvPr>
+          <p:cNvPicPr>
+            <a:picLocks noChangeAspect="1"/>
+          </p:cNvPicPr>
           <p:nvPr/>
-        </p:nvSpPr>
-        <p:spPr>
-          <a:xfrm>
-            <a:off x="262647" y="1391055"/>
-            <a:ext cx="8528062" cy="400110"/>
+        </p:nvPicPr>
+        <p:blipFill>
+          <a:blip r:embed="rId2"/>
+          <a:stretch>
+            <a:fillRect/>
+          </a:stretch>
+        </p:blipFill>
+        <p:spPr>
+          <a:xfrm>
+            <a:off x="842123" y="1359243"/>
+            <a:ext cx="7665075" cy="4722839"/>
           </a:xfrm>
           <a:prstGeom prst="rect">
             <a:avLst/>
           </a:prstGeom>
-          <a:noFill/>
-        </p:spPr>
-        <p:txBody>
-          <a:bodyPr wrap="square" rtlCol="0">
-            <a:spAutoFit/>
-          </a:bodyPr>
-          <a:lstStyle/>
-          <a:p>
-            <a:pPr marL="342900" indent="-342900">
-              <a:spcAft>
-                <a:spcPts val="500"/>
-              </a:spcAft>
-              <a:buFont typeface="Arial" panose="020B0604020202020204" pitchFamily="34" charset="0"/>
-              <a:buChar char="•"/>
-            </a:pPr>
-            <a:r>
-              <a:rPr lang="it-IT" sz="2000" dirty="0">
-                <a:latin typeface="Segoe UI" panose="020B0502040204020203" pitchFamily="34" charset="0"/>
-                <a:cs typeface="Segoe UI" panose="020B0502040204020203" pitchFamily="34" charset="0"/>
-              </a:rPr>
-              <a:t>aa</a:t>
-            </a:r>
-          </a:p>
-        </p:txBody>
-      </p:sp>
+        </p:spPr>
+      </p:pic>
     </p:spTree>
     <p:extLst>
       <p:ext uri="{BB962C8B-B14F-4D97-AF65-F5344CB8AC3E}">
-        <p14:creationId xmlns:p14="http://schemas.microsoft.com/office/powerpoint/2010/main" val="1946740304"/>
+        <p14:creationId xmlns:p14="http://schemas.microsoft.com/office/powerpoint/2010/main" val="953708419"/>
       </p:ext>
     </p:extLst>
   </p:cSld>
@@ -5144,7 +5114,7 @@
                 <a:latin typeface="Segoe UI" panose="020B0502040204020203" pitchFamily="34" charset="0"/>
                 <a:cs typeface="Segoe UI" panose="020B0502040204020203" pitchFamily="34" charset="0"/>
               </a:rPr>
-              <a:t>UAV Route Planning Strategies – 2/13</a:t>
+              <a:t>UAV Route Planning Strategies – 2/20</a:t>
             </a:r>
           </a:p>
         </p:txBody>
@@ -5367,7 +5337,7 @@
         <p:spPr>
           <a:xfrm>
             <a:off x="4868562" y="1378522"/>
-            <a:ext cx="4468512" cy="2554545"/>
+            <a:ext cx="4468512" cy="2246769"/>
           </a:xfrm>
           <a:prstGeom prst="rect">
             <a:avLst/>
@@ -5441,18 +5411,6 @@
               <a:latin typeface="Segoe UI" panose="020B0502040204020203" pitchFamily="34" charset="0"/>
               <a:cs typeface="Segoe UI" panose="020B0502040204020203" pitchFamily="34" charset="0"/>
             </a:endParaRPr>
-          </a:p>
-          <a:p>
-            <a:pPr marL="457200" indent="-457200">
-              <a:buAutoNum type="arabicPeriod" startAt="9"/>
-            </a:pPr>
-            <a:r>
-              <a:rPr lang="it-IT" sz="2000" dirty="0">
-                <a:latin typeface="Segoe UI" panose="020B0502040204020203" pitchFamily="34" charset="0"/>
-                <a:cs typeface="Segoe UI" panose="020B0502040204020203" pitchFamily="34" charset="0"/>
-              </a:rPr>
-              <a:t>Conclusions</a:t>
-            </a:r>
           </a:p>
         </p:txBody>
       </p:sp>
@@ -5515,11 +5473,11 @@
           <a:lstStyle/>
           <a:p>
             <a:r>
-              <a:rPr lang="en-US" dirty="0">
-                <a:latin typeface="Segoe UI" panose="020B0502040204020203" pitchFamily="34" charset="0"/>
-                <a:cs typeface="Segoe UI" panose="020B0502040204020203" pitchFamily="34" charset="0"/>
-              </a:rPr>
-              <a:t>Conclusions</a:t>
+              <a:rPr lang="en-US" sz="2800" dirty="0">
+                <a:latin typeface="Segoe UI" panose="020B0502040204020203" pitchFamily="34" charset="0"/>
+                <a:cs typeface="Segoe UI" panose="020B0502040204020203" pitchFamily="34" charset="0"/>
+              </a:rPr>
+              <a:t>Future challenges and research directions</a:t>
             </a:r>
           </a:p>
         </p:txBody>
@@ -5555,7 +5513,7 @@
                 <a:latin typeface="Segoe UI" panose="020B0502040204020203" pitchFamily="34" charset="0"/>
                 <a:cs typeface="Segoe UI" panose="020B0502040204020203" pitchFamily="34" charset="0"/>
               </a:rPr>
-              <a:t>UAV Route Planning Strategies – 13/13</a:t>
+              <a:t>UAV Route Planning Strategies – 20/20</a:t>
             </a:r>
           </a:p>
         </p:txBody>
@@ -5575,7 +5533,7 @@
         <p:spPr>
           <a:xfrm>
             <a:off x="262647" y="1391055"/>
-            <a:ext cx="8528062" cy="400110"/>
+            <a:ext cx="6397926" cy="4798750"/>
           </a:xfrm>
           <a:prstGeom prst="rect">
             <a:avLst/>
@@ -5600,7 +5558,318 @@
                 <a:latin typeface="Segoe UI" panose="020B0502040204020203" pitchFamily="34" charset="0"/>
                 <a:cs typeface="Segoe UI" panose="020B0502040204020203" pitchFamily="34" charset="0"/>
               </a:rPr>
-              <a:t>aa</a:t>
+              <a:t>Integration with emerging technologies (e.g., 5G, IoT)</a:t>
+            </a:r>
+          </a:p>
+          <a:p>
+            <a:pPr marL="342900" indent="-342900">
+              <a:spcAft>
+                <a:spcPts val="500"/>
+              </a:spcAft>
+              <a:buFont typeface="Arial" panose="020B0604020202020204" pitchFamily="34" charset="0"/>
+              <a:buChar char="•"/>
+            </a:pPr>
+            <a:endParaRPr lang="it-IT" sz="2000" dirty="0">
+              <a:latin typeface="Segoe UI" panose="020B0502040204020203" pitchFamily="34" charset="0"/>
+              <a:cs typeface="Segoe UI" panose="020B0502040204020203" pitchFamily="34" charset="0"/>
+            </a:endParaRPr>
+          </a:p>
+          <a:p>
+            <a:pPr marL="342900" indent="-342900">
+              <a:spcAft>
+                <a:spcPts val="500"/>
+              </a:spcAft>
+              <a:buFont typeface="Arial" panose="020B0604020202020204" pitchFamily="34" charset="0"/>
+              <a:buChar char="•"/>
+            </a:pPr>
+            <a:r>
+              <a:rPr lang="it-IT" sz="2000" dirty="0" err="1">
+                <a:latin typeface="Segoe UI" panose="020B0502040204020203" pitchFamily="34" charset="0"/>
+                <a:cs typeface="Segoe UI" panose="020B0502040204020203" pitchFamily="34" charset="0"/>
+              </a:rPr>
+              <a:t>Scalability</a:t>
+            </a:r>
+            <a:r>
+              <a:rPr lang="it-IT" sz="2000" dirty="0">
+                <a:latin typeface="Segoe UI" panose="020B0502040204020203" pitchFamily="34" charset="0"/>
+                <a:cs typeface="Segoe UI" panose="020B0502040204020203" pitchFamily="34" charset="0"/>
+              </a:rPr>
+              <a:t> improvements and real-time </a:t>
+            </a:r>
+            <a:r>
+              <a:rPr lang="it-IT" sz="2000" dirty="0" err="1">
+                <a:latin typeface="Segoe UI" panose="020B0502040204020203" pitchFamily="34" charset="0"/>
+                <a:cs typeface="Segoe UI" panose="020B0502040204020203" pitchFamily="34" charset="0"/>
+              </a:rPr>
+              <a:t>adaptability</a:t>
+            </a:r>
+            <a:endParaRPr lang="it-IT" sz="2000" dirty="0">
+              <a:latin typeface="Segoe UI" panose="020B0502040204020203" pitchFamily="34" charset="0"/>
+              <a:cs typeface="Segoe UI" panose="020B0502040204020203" pitchFamily="34" charset="0"/>
+            </a:endParaRPr>
+          </a:p>
+          <a:p>
+            <a:pPr marL="342900" indent="-342900">
+              <a:spcAft>
+                <a:spcPts val="500"/>
+              </a:spcAft>
+              <a:buFont typeface="Arial" panose="020B0604020202020204" pitchFamily="34" charset="0"/>
+              <a:buChar char="•"/>
+            </a:pPr>
+            <a:endParaRPr lang="it-IT" sz="2000" dirty="0">
+              <a:latin typeface="Segoe UI" panose="020B0502040204020203" pitchFamily="34" charset="0"/>
+              <a:cs typeface="Segoe UI" panose="020B0502040204020203" pitchFamily="34" charset="0"/>
+            </a:endParaRPr>
+          </a:p>
+          <a:p>
+            <a:pPr marL="342900" indent="-342900">
+              <a:spcAft>
+                <a:spcPts val="500"/>
+              </a:spcAft>
+              <a:buFont typeface="Arial" panose="020B0604020202020204" pitchFamily="34" charset="0"/>
+              <a:buChar char="•"/>
+            </a:pPr>
+            <a:r>
+              <a:rPr lang="it-IT" sz="2000" dirty="0">
+                <a:latin typeface="Segoe UI" panose="020B0502040204020203" pitchFamily="34" charset="0"/>
+                <a:cs typeface="Segoe UI" panose="020B0502040204020203" pitchFamily="34" charset="0"/>
+              </a:rPr>
+              <a:t>Multi-UAV coordination</a:t>
+            </a:r>
+          </a:p>
+          <a:p>
+            <a:pPr marL="342900" indent="-342900">
+              <a:spcAft>
+                <a:spcPts val="500"/>
+              </a:spcAft>
+              <a:buFont typeface="Arial" panose="020B0604020202020204" pitchFamily="34" charset="0"/>
+              <a:buChar char="•"/>
+            </a:pPr>
+            <a:endParaRPr lang="it-IT" sz="2000" dirty="0">
+              <a:latin typeface="Segoe UI" panose="020B0502040204020203" pitchFamily="34" charset="0"/>
+              <a:cs typeface="Segoe UI" panose="020B0502040204020203" pitchFamily="34" charset="0"/>
+            </a:endParaRPr>
+          </a:p>
+          <a:p>
+            <a:pPr marL="342900" indent="-342900">
+              <a:spcAft>
+                <a:spcPts val="500"/>
+              </a:spcAft>
+              <a:buFont typeface="Arial" panose="020B0604020202020204" pitchFamily="34" charset="0"/>
+              <a:buChar char="•"/>
+            </a:pPr>
+            <a:r>
+              <a:rPr lang="it-IT" sz="2000" dirty="0">
+                <a:latin typeface="Segoe UI" panose="020B0502040204020203" pitchFamily="34" charset="0"/>
+                <a:cs typeface="Segoe UI" panose="020B0502040204020203" pitchFamily="34" charset="0"/>
+              </a:rPr>
+              <a:t>Human-</a:t>
+            </a:r>
+            <a:r>
+              <a:rPr lang="it-IT" sz="2000" dirty="0" err="1">
+                <a:latin typeface="Segoe UI" panose="020B0502040204020203" pitchFamily="34" charset="0"/>
+                <a:cs typeface="Segoe UI" panose="020B0502040204020203" pitchFamily="34" charset="0"/>
+              </a:rPr>
+              <a:t>swarm</a:t>
+            </a:r>
+            <a:r>
+              <a:rPr lang="it-IT" sz="2000" dirty="0">
+                <a:latin typeface="Segoe UI" panose="020B0502040204020203" pitchFamily="34" charset="0"/>
+                <a:cs typeface="Segoe UI" panose="020B0502040204020203" pitchFamily="34" charset="0"/>
+              </a:rPr>
+              <a:t> interaction</a:t>
+            </a:r>
+          </a:p>
+          <a:p>
+            <a:pPr marL="342900" indent="-342900">
+              <a:spcAft>
+                <a:spcPts val="500"/>
+              </a:spcAft>
+              <a:buFont typeface="Arial" panose="020B0604020202020204" pitchFamily="34" charset="0"/>
+              <a:buChar char="•"/>
+            </a:pPr>
+            <a:endParaRPr lang="it-IT" sz="2000" dirty="0">
+              <a:latin typeface="Segoe UI" panose="020B0502040204020203" pitchFamily="34" charset="0"/>
+              <a:cs typeface="Segoe UI" panose="020B0502040204020203" pitchFamily="34" charset="0"/>
+            </a:endParaRPr>
+          </a:p>
+          <a:p>
+            <a:pPr marL="342900" indent="-342900">
+              <a:spcAft>
+                <a:spcPts val="500"/>
+              </a:spcAft>
+              <a:buFont typeface="Arial" panose="020B0604020202020204" pitchFamily="34" charset="0"/>
+              <a:buChar char="•"/>
+            </a:pPr>
+            <a:r>
+              <a:rPr lang="it-IT" sz="2000" dirty="0">
+                <a:latin typeface="Segoe UI" panose="020B0502040204020203" pitchFamily="34" charset="0"/>
+                <a:cs typeface="Segoe UI" panose="020B0502040204020203" pitchFamily="34" charset="0"/>
+              </a:rPr>
+              <a:t>Environmental considerations</a:t>
+            </a:r>
+          </a:p>
+          <a:p>
+            <a:pPr marL="342900" indent="-342900">
+              <a:spcAft>
+                <a:spcPts val="500"/>
+              </a:spcAft>
+              <a:buFont typeface="Arial" panose="020B0604020202020204" pitchFamily="34" charset="0"/>
+              <a:buChar char="•"/>
+            </a:pPr>
+            <a:endParaRPr lang="it-IT" sz="2000" dirty="0">
+              <a:latin typeface="Segoe UI" panose="020B0502040204020203" pitchFamily="34" charset="0"/>
+              <a:cs typeface="Segoe UI" panose="020B0502040204020203" pitchFamily="34" charset="0"/>
+            </a:endParaRPr>
+          </a:p>
+          <a:p>
+            <a:pPr marL="342900" indent="-342900">
+              <a:spcAft>
+                <a:spcPts val="500"/>
+              </a:spcAft>
+              <a:buFont typeface="Arial" panose="020B0604020202020204" pitchFamily="34" charset="0"/>
+              <a:buChar char="•"/>
+            </a:pPr>
+            <a:r>
+              <a:rPr lang="it-IT" sz="2000" dirty="0">
+                <a:latin typeface="Segoe UI" panose="020B0502040204020203" pitchFamily="34" charset="0"/>
+                <a:cs typeface="Segoe UI" panose="020B0502040204020203" pitchFamily="34" charset="0"/>
+              </a:rPr>
+              <a:t>Ethical and </a:t>
+            </a:r>
+            <a:r>
+              <a:rPr lang="it-IT" sz="2000" dirty="0" err="1">
+                <a:latin typeface="Segoe UI" panose="020B0502040204020203" pitchFamily="34" charset="0"/>
+                <a:cs typeface="Segoe UI" panose="020B0502040204020203" pitchFamily="34" charset="0"/>
+              </a:rPr>
+              <a:t>regulatory</a:t>
+            </a:r>
+            <a:r>
+              <a:rPr lang="it-IT" sz="2000" dirty="0">
+                <a:latin typeface="Segoe UI" panose="020B0502040204020203" pitchFamily="34" charset="0"/>
+                <a:cs typeface="Segoe UI" panose="020B0502040204020203" pitchFamily="34" charset="0"/>
+              </a:rPr>
+              <a:t> challenges (e.g., AI, </a:t>
+            </a:r>
+            <a:r>
+              <a:rPr lang="it-IT" sz="2000" dirty="0" err="1">
+                <a:latin typeface="Segoe UI" panose="020B0502040204020203" pitchFamily="34" charset="0"/>
+                <a:cs typeface="Segoe UI" panose="020B0502040204020203" pitchFamily="34" charset="0"/>
+              </a:rPr>
+              <a:t>robotics</a:t>
+            </a:r>
+            <a:r>
+              <a:rPr lang="it-IT" sz="2000" dirty="0">
+                <a:latin typeface="Segoe UI" panose="020B0502040204020203" pitchFamily="34" charset="0"/>
+                <a:cs typeface="Segoe UI" panose="020B0502040204020203" pitchFamily="34" charset="0"/>
+              </a:rPr>
+              <a:t>)</a:t>
+            </a:r>
+          </a:p>
+          <a:p>
+            <a:pPr marL="342900" indent="-342900">
+              <a:spcAft>
+                <a:spcPts val="500"/>
+              </a:spcAft>
+              <a:buFont typeface="Arial" panose="020B0604020202020204" pitchFamily="34" charset="0"/>
+              <a:buChar char="•"/>
+            </a:pPr>
+            <a:endParaRPr lang="it-IT" sz="2000" dirty="0">
+              <a:latin typeface="Segoe UI" panose="020B0502040204020203" pitchFamily="34" charset="0"/>
+              <a:cs typeface="Segoe UI" panose="020B0502040204020203" pitchFamily="34" charset="0"/>
+            </a:endParaRPr>
+          </a:p>
+        </p:txBody>
+      </p:sp>
+      <p:pic>
+        <p:nvPicPr>
+          <p:cNvPr id="1026" name="Picture 2" descr="UAV path planning model in 2D space">
+            <a:extLst>
+              <a:ext uri="{FF2B5EF4-FFF2-40B4-BE49-F238E27FC236}">
+                <a16:creationId xmlns:a16="http://schemas.microsoft.com/office/drawing/2014/main" id="{C71CF2BF-B8E9-E32D-CABF-13FA1936D9C9}"/>
+              </a:ext>
+            </a:extLst>
+          </p:cNvPr>
+          <p:cNvPicPr>
+            <a:picLocks noChangeAspect="1" noChangeArrowheads="1"/>
+          </p:cNvPicPr>
+          <p:nvPr/>
+        </p:nvPicPr>
+        <p:blipFill>
+          <a:blip r:embed="rId2">
+            <a:extLst>
+              <a:ext uri="{28A0092B-C50C-407E-A947-70E740481C1C}">
+                <a14:useLocalDpi xmlns:a14="http://schemas.microsoft.com/office/drawing/2010/main" val="0"/>
+              </a:ext>
+            </a:extLst>
+          </a:blip>
+          <a:srcRect/>
+          <a:stretch>
+            <a:fillRect/>
+          </a:stretch>
+        </p:blipFill>
+        <p:spPr bwMode="auto">
+          <a:xfrm>
+            <a:off x="5604821" y="2940627"/>
+            <a:ext cx="3276532" cy="2073852"/>
+          </a:xfrm>
+          <a:prstGeom prst="rect">
+            <a:avLst/>
+          </a:prstGeom>
+          <a:noFill/>
+          <a:extLst>
+            <a:ext uri="{909E8E84-426E-40DD-AFC4-6F175D3DCCD1}">
+              <a14:hiddenFill xmlns:a14="http://schemas.microsoft.com/office/drawing/2010/main">
+                <a:solidFill>
+                  <a:srgbClr val="FFFFFF"/>
+                </a:solidFill>
+              </a14:hiddenFill>
+            </a:ext>
+          </a:extLst>
+        </p:spPr>
+      </p:pic>
+      <p:sp>
+        <p:nvSpPr>
+          <p:cNvPr id="3" name="CasellaDiTesto 2">
+            <a:extLst>
+              <a:ext uri="{FF2B5EF4-FFF2-40B4-BE49-F238E27FC236}">
+                <a16:creationId xmlns:a16="http://schemas.microsoft.com/office/drawing/2014/main" id="{836620BE-D5DB-A893-AEA4-EA8C854FE4A7}"/>
+              </a:ext>
+            </a:extLst>
+          </p:cNvPr>
+          <p:cNvSpPr txBox="1"/>
+          <p:nvPr/>
+        </p:nvSpPr>
+        <p:spPr>
+          <a:xfrm>
+            <a:off x="5513000" y="5014479"/>
+            <a:ext cx="3460173" cy="400110"/>
+          </a:xfrm>
+          <a:prstGeom prst="rect">
+            <a:avLst/>
+          </a:prstGeom>
+          <a:noFill/>
+        </p:spPr>
+        <p:txBody>
+          <a:bodyPr wrap="square" rtlCol="0">
+            <a:spAutoFit/>
+          </a:bodyPr>
+          <a:lstStyle/>
+          <a:p>
+            <a:pPr algn="ctr"/>
+            <a:r>
+              <a:rPr lang="it-IT" sz="1000" dirty="0"/>
+              <a:t>Reference: </a:t>
+            </a:r>
+            <a:r>
+              <a:rPr lang="it-IT" sz="1000" dirty="0">
+                <a:hlinkClick r:id="rId3"/>
+              </a:rPr>
+              <a:t>https://www.researchgate.net/figure/UAV-path-planning-model-in-2D-space_fig1_329311458</a:t>
+            </a:r>
+            <a:r>
+              <a:rPr lang="it-IT" sz="1000" dirty="0"/>
+              <a:t> </a:t>
             </a:r>
           </a:p>
         </p:txBody>
@@ -5608,7 +5877,7 @@
     </p:spTree>
     <p:extLst>
       <p:ext uri="{BB962C8B-B14F-4D97-AF65-F5344CB8AC3E}">
-        <p14:creationId xmlns:p14="http://schemas.microsoft.com/office/powerpoint/2010/main" val="645045590"/>
+        <p14:creationId xmlns:p14="http://schemas.microsoft.com/office/powerpoint/2010/main" val="1946740304"/>
       </p:ext>
     </p:extLst>
   </p:cSld>
@@ -5704,7 +5973,7 @@
                 <a:latin typeface="Segoe UI" panose="020B0502040204020203" pitchFamily="34" charset="0"/>
                 <a:cs typeface="Segoe UI" panose="020B0502040204020203" pitchFamily="34" charset="0"/>
               </a:rPr>
-              <a:t>UAV Route Planning Strategies – 3/13</a:t>
+              <a:t>UAV Route Planning Strategies – 3/20</a:t>
             </a:r>
           </a:p>
         </p:txBody>
@@ -5832,7 +6101,7 @@
         <p:spPr>
           <a:xfrm>
             <a:off x="1393897" y="5643250"/>
-            <a:ext cx="6356206" cy="307777"/>
+            <a:ext cx="6356206" cy="246221"/>
           </a:xfrm>
           <a:prstGeom prst="rect">
             <a:avLst/>
@@ -5845,18 +6114,19 @@
           </a:bodyPr>
           <a:lstStyle/>
           <a:p>
-            <a:r>
-              <a:rPr lang="it-IT" sz="1400" dirty="0"/>
+            <a:pPr algn="ctr"/>
+            <a:r>
+              <a:rPr lang="it-IT" sz="1000" dirty="0"/>
               <a:t>Reference: </a:t>
             </a:r>
             <a:r>
-              <a:rPr lang="it-IT" sz="1400" dirty="0">
+              <a:rPr lang="it-IT" sz="1000" dirty="0">
                 <a:hlinkClick r:id="rId5"/>
               </a:rPr>
               <a:t>https://www.sciencedirect.com/science/article/pii/S0140366419308539</a:t>
             </a:r>
             <a:r>
-              <a:rPr lang="it-IT" sz="1400" dirty="0"/>
+              <a:rPr lang="it-IT" sz="1000" dirty="0"/>
               <a:t> </a:t>
             </a:r>
           </a:p>
@@ -5961,7 +6231,7 @@
                 <a:latin typeface="Segoe UI" panose="020B0502040204020203" pitchFamily="34" charset="0"/>
                 <a:cs typeface="Segoe UI" panose="020B0502040204020203" pitchFamily="34" charset="0"/>
               </a:rPr>
-              <a:t>UAV Route Planning Strategies – 4/13</a:t>
+              <a:t>UAV Route Planning Strategies – 4/20</a:t>
             </a:r>
           </a:p>
         </p:txBody>
@@ -6255,7 +6525,7 @@
                 <a:latin typeface="Segoe UI" panose="020B0502040204020203" pitchFamily="34" charset="0"/>
                 <a:cs typeface="Segoe UI" panose="020B0502040204020203" pitchFamily="34" charset="0"/>
               </a:rPr>
-              <a:t>UAV Route Planning Strategies – 5/13</a:t>
+              <a:t>UAV Route Planning Strategies – 5/20</a:t>
             </a:r>
           </a:p>
         </p:txBody>
@@ -6500,7 +6770,7 @@
         <p:spPr>
           <a:xfrm>
             <a:off x="5143896" y="5651952"/>
-            <a:ext cx="3564178" cy="523220"/>
+            <a:ext cx="3564178" cy="400110"/>
           </a:xfrm>
           <a:prstGeom prst="rect">
             <a:avLst/>
@@ -6515,20 +6785,20 @@
           <a:p>
             <a:pPr algn="ctr"/>
             <a:r>
-              <a:rPr lang="it-IT" sz="1400" dirty="0"/>
+              <a:rPr lang="it-IT" sz="1000" dirty="0"/>
               <a:t>Reference: </a:t>
             </a:r>
             <a:r>
-              <a:rPr lang="en-US" sz="1400" dirty="0">
+              <a:rPr lang="en-US" sz="1000" dirty="0">
                 <a:hlinkClick r:id="rId4"/>
               </a:rPr>
               <a:t>Multiple UAVs path planning algorithms: a comparative study</a:t>
             </a:r>
             <a:r>
-              <a:rPr lang="en-US" sz="1400" dirty="0"/>
+              <a:rPr lang="en-US" sz="1000" dirty="0"/>
               <a:t> (Paper 1)</a:t>
             </a:r>
-            <a:endParaRPr lang="it-IT" sz="1400" dirty="0"/>
+            <a:endParaRPr lang="it-IT" sz="1000" dirty="0"/>
           </a:p>
         </p:txBody>
       </p:sp>
@@ -6631,7 +6901,7 @@
                 <a:latin typeface="Segoe UI" panose="020B0502040204020203" pitchFamily="34" charset="0"/>
                 <a:cs typeface="Segoe UI" panose="020B0502040204020203" pitchFamily="34" charset="0"/>
               </a:rPr>
-              <a:t>UAV Route Planning Strategies – 6/13</a:t>
+              <a:t>UAV Route Planning Strategies – 6/20</a:t>
             </a:r>
           </a:p>
         </p:txBody>
@@ -6740,8 +7010,8 @@
         </p:nvSpPr>
         <p:spPr>
           <a:xfrm>
-            <a:off x="2795112" y="5594760"/>
-            <a:ext cx="3564178" cy="523220"/>
+            <a:off x="2291174" y="5674160"/>
+            <a:ext cx="4572054" cy="246221"/>
           </a:xfrm>
           <a:prstGeom prst="rect">
             <a:avLst/>
@@ -6756,20 +7026,20 @@
           <a:p>
             <a:pPr algn="ctr"/>
             <a:r>
-              <a:rPr lang="it-IT" sz="1400" dirty="0"/>
+              <a:rPr lang="it-IT" sz="1000" dirty="0"/>
               <a:t>Reference: </a:t>
             </a:r>
             <a:r>
-              <a:rPr lang="en-US" sz="1400" dirty="0">
+              <a:rPr lang="en-US" sz="1000" dirty="0">
                 <a:hlinkClick r:id="rId5"/>
               </a:rPr>
               <a:t>Multiple UAVs path planning algorithms: a comparative study</a:t>
             </a:r>
             <a:r>
-              <a:rPr lang="en-US" sz="1400" dirty="0"/>
+              <a:rPr lang="en-US" sz="1000" dirty="0"/>
               <a:t> (Paper 1)</a:t>
             </a:r>
-            <a:endParaRPr lang="it-IT" sz="1400" dirty="0"/>
+            <a:endParaRPr lang="it-IT" sz="1000" dirty="0"/>
           </a:p>
         </p:txBody>
       </p:sp>
@@ -6872,7 +7142,7 @@
                 <a:latin typeface="Segoe UI" panose="020B0502040204020203" pitchFamily="34" charset="0"/>
                 <a:cs typeface="Segoe UI" panose="020B0502040204020203" pitchFamily="34" charset="0"/>
               </a:rPr>
-              <a:t>UAV Route Planning Strategies – 7/13</a:t>
+              <a:t>UAV Route Planning Strategies – 7/20</a:t>
             </a:r>
           </a:p>
         </p:txBody>
@@ -7185,7 +7455,7 @@
         <p:spPr>
           <a:xfrm>
             <a:off x="5997729" y="5012461"/>
-            <a:ext cx="2841321" cy="738664"/>
+            <a:ext cx="2841321" cy="553998"/>
           </a:xfrm>
           <a:prstGeom prst="rect">
             <a:avLst/>
@@ -7200,17 +7470,17 @@
           <a:p>
             <a:pPr algn="ctr"/>
             <a:r>
-              <a:rPr lang="it-IT" sz="1400" dirty="0"/>
+              <a:rPr lang="it-IT" sz="1000" dirty="0"/>
               <a:t>Reference: </a:t>
             </a:r>
             <a:r>
-              <a:rPr lang="it-IT" sz="1400" dirty="0">
+              <a:rPr lang="it-IT" sz="1000" dirty="0">
                 <a:hlinkClick r:id="rId3"/>
               </a:rPr>
               <a:t>https://www.sciencedirect.com/science/article/pii/S0140366419308539</a:t>
             </a:r>
             <a:r>
-              <a:rPr lang="it-IT" sz="1400" dirty="0"/>
+              <a:rPr lang="it-IT" sz="1000" dirty="0"/>
               <a:t> </a:t>
             </a:r>
           </a:p>
@@ -7315,7 +7585,7 @@
                 <a:latin typeface="Segoe UI" panose="020B0502040204020203" pitchFamily="34" charset="0"/>
                 <a:cs typeface="Segoe UI" panose="020B0502040204020203" pitchFamily="34" charset="0"/>
               </a:rPr>
-              <a:t>UAV Route Planning Strategies – 8/13</a:t>
+              <a:t>UAV Route Planning Strategies – 8/20</a:t>
             </a:r>
           </a:p>
         </p:txBody>
@@ -7654,7 +7924,7 @@
         <p:spPr>
           <a:xfrm>
             <a:off x="5325762" y="5500647"/>
-            <a:ext cx="3532287" cy="738664"/>
+            <a:ext cx="3532287" cy="400110"/>
           </a:xfrm>
           <a:prstGeom prst="rect">
             <a:avLst/>
@@ -7669,20 +7939,20 @@
           <a:p>
             <a:pPr algn="ctr"/>
             <a:r>
-              <a:rPr lang="it-IT" sz="1400" dirty="0"/>
+              <a:rPr lang="it-IT" sz="1000" dirty="0"/>
               <a:t>Reference: </a:t>
             </a:r>
             <a:r>
-              <a:rPr lang="en-US" sz="1400" dirty="0">
+              <a:rPr lang="en-US" sz="1000" dirty="0">
                 <a:hlinkClick r:id="rId2"/>
               </a:rPr>
               <a:t>Path Planning in Complex 3D Environments Using a Probabilistic Roadmap Method</a:t>
             </a:r>
             <a:r>
-              <a:rPr lang="en-US" sz="1400" dirty="0"/>
+              <a:rPr lang="en-US" sz="1000" dirty="0"/>
               <a:t> – (Paper 2)</a:t>
             </a:r>
-            <a:endParaRPr lang="it-IT" sz="1400" dirty="0"/>
+            <a:endParaRPr lang="it-IT" sz="1000" dirty="0"/>
           </a:p>
         </p:txBody>
       </p:sp>
@@ -7815,7 +8085,7 @@
                 <a:latin typeface="Segoe UI" panose="020B0502040204020203" pitchFamily="34" charset="0"/>
                 <a:cs typeface="Segoe UI" panose="020B0502040204020203" pitchFamily="34" charset="0"/>
               </a:rPr>
-              <a:t>UAV Route Planning Strategies – 9/13</a:t>
+              <a:t>UAV Route Planning Strategies – 9/20</a:t>
             </a:r>
           </a:p>
         </p:txBody>

</xml_diff>

<commit_message>
Closer to a definitive version
</commit_message>
<xml_diff>
--- a/2 - Slides/UAV Route Planning Strategies.pptx
+++ b/2 - Slides/UAV Route Planning Strategies.pptx
@@ -215,7 +215,7 @@
           <a:p>
             <a:fld id="{0E4AAC6D-2322-45B9-8ECA-34DF280B0776}" type="datetimeFigureOut">
               <a:rPr lang="en-US" smtClean="0"/>
-              <a:t>9/14/2024</a:t>
+              <a:t>9/15/2024</a:t>
             </a:fld>
             <a:endParaRPr lang="en-US"/>
           </a:p>
@@ -4888,7 +4888,7 @@
         <p:spPr>
           <a:xfrm>
             <a:off x="262647" y="1391055"/>
-            <a:ext cx="6397926" cy="4798750"/>
+            <a:ext cx="7061506" cy="4490973"/>
           </a:xfrm>
           <a:prstGeom prst="rect">
             <a:avLst/>
@@ -5165,8 +5165,8 @@
         </p:blipFill>
         <p:spPr bwMode="auto">
           <a:xfrm>
-            <a:off x="5604821" y="2940627"/>
-            <a:ext cx="3276532" cy="2073852"/>
+            <a:off x="5725391" y="2637772"/>
+            <a:ext cx="3155962" cy="1997538"/>
           </a:xfrm>
           <a:prstGeom prst="rect">
             <a:avLst/>
@@ -5197,7 +5197,7 @@
         </p:nvSpPr>
         <p:spPr>
           <a:xfrm>
-            <a:off x="5513000" y="5014479"/>
+            <a:off x="5524253" y="4656950"/>
             <a:ext cx="3460173" cy="400110"/>
           </a:xfrm>
           <a:prstGeom prst="rect">

</xml_diff>